<commit_message>
update doc for v17.8.0 release
</commit_message>
<xml_diff>
--- a/src/Applications/LDAS_App/doc/GEOSldas-tutorial.pptx
+++ b/src/Applications/LDAS_App/doc/GEOSldas-tutorial.pptx
@@ -11,7 +11,7 @@
     <p:sldId id="350" r:id="rId2"/>
     <p:sldId id="287" r:id="rId3"/>
     <p:sldId id="351" r:id="rId4"/>
-    <p:sldId id="379" r:id="rId5"/>
+    <p:sldId id="387" r:id="rId5"/>
     <p:sldId id="336" r:id="rId6"/>
     <p:sldId id="386" r:id="rId7"/>
     <p:sldId id="337" r:id="rId8"/>
@@ -176,7 +176,7 @@
   </p:defaultTextStyle>
   <p:extLst>
     <p:ext uri="{EFAFB233-063F-42B5-8137-9DF3F51BA10A}">
-      <p15:sldGuideLst xmlns:p15="http://schemas.microsoft.com/office/powerpoint/2012/main" xmlns="">
+      <p15:sldGuideLst xmlns:p15="http://schemas.microsoft.com/office/powerpoint/2012/main">
         <p15:guide id="1" orient="horz" pos="480" userDrawn="1">
           <p15:clr>
             <a:srgbClr val="A4A3A4"/>
@@ -190,7 +190,7 @@
       </p15:sldGuideLst>
     </p:ext>
     <p:ext uri="{2D200454-40CA-4A62-9FC3-DE9A4176ACB9}">
-      <p15:notesGuideLst xmlns:p15="http://schemas.microsoft.com/office/powerpoint/2012/main" xmlns=""/>
+      <p15:notesGuideLst xmlns:p15="http://schemas.microsoft.com/office/powerpoint/2012/main"/>
     </p:ext>
   </p:extLst>
 </p:presentation>
@@ -201,21 +201,21 @@
   <p:cmAuthor id="1" name="RR" initials="RR" lastIdx="38" clrIdx="0">
     <p:extLst>
       <p:ext uri="{19B8F6BF-5375-455C-9EA6-DF929625EA0E}">
-        <p15:presenceInfo xmlns:p15="http://schemas.microsoft.com/office/powerpoint/2012/main" xmlns="" userId="RR" providerId="None"/>
+        <p15:presenceInfo xmlns:p15="http://schemas.microsoft.com/office/powerpoint/2012/main" userId="RR" providerId="None"/>
       </p:ext>
     </p:extLst>
   </p:cmAuthor>
   <p:cmAuthor id="2" name="Reichle, Rolf H. (GSFC-6101)" initials="RRH(" lastIdx="5" clrIdx="1">
     <p:extLst>
       <p:ext uri="{19B8F6BF-5375-455C-9EA6-DF929625EA0E}">
-        <p15:presenceInfo xmlns:p15="http://schemas.microsoft.com/office/powerpoint/2012/main" xmlns="" userId="S-1-5-21-330711430-3775241029-4075259233-100029" providerId="AD"/>
+        <p15:presenceInfo xmlns:p15="http://schemas.microsoft.com/office/powerpoint/2012/main" userId="S-1-5-21-330711430-3775241029-4075259233-100029" providerId="AD"/>
       </p:ext>
     </p:extLst>
   </p:cmAuthor>
   <p:cmAuthor id="3" name="Microsoft Office User" initials="MOU" lastIdx="11" clrIdx="2">
     <p:extLst>
       <p:ext uri="{19B8F6BF-5375-455C-9EA6-DF929625EA0E}">
-        <p15:presenceInfo xmlns:p15="http://schemas.microsoft.com/office/powerpoint/2012/main" xmlns="" userId="Microsoft Office User" providerId="None"/>
+        <p15:presenceInfo xmlns:p15="http://schemas.microsoft.com/office/powerpoint/2012/main" userId="Microsoft Office User" providerId="None"/>
       </p:ext>
     </p:extLst>
   </p:cmAuthor>
@@ -335,7 +335,7 @@
               <a:pPr>
                 <a:defRPr/>
               </a:pPr>
-              <a:t>9/4/2019</a:t>
+              <a:t>12/6/19</a:t>
             </a:fld>
             <a:endParaRPr lang="en-US"/>
           </a:p>
@@ -766,19 +766,38 @@
       </p:grpSpPr>
       <p:sp>
         <p:nvSpPr>
-          <p:cNvPr id="2" name="Slide Image Placeholder 1"/>
+          <p:cNvPr id="19458" name="Slide Image Placeholder 1"/>
           <p:cNvSpPr>
-            <a:spLocks noGrp="1" noRot="1" noChangeAspect="1"/>
+            <a:spLocks noGrp="1" noRot="1" noChangeAspect="1" noTextEdit="1"/>
           </p:cNvSpPr>
           <p:nvPr>
             <p:ph type="sldImg"/>
           </p:nvPr>
         </p:nvSpPr>
-        <p:spPr/>
+        <p:spPr bwMode="auto">
+          <a:noFill/>
+          <a:ln>
+            <a:solidFill>
+              <a:srgbClr val="000000"/>
+            </a:solidFill>
+            <a:miter lim="800000"/>
+            <a:headEnd/>
+            <a:tailEnd/>
+          </a:ln>
+          <a:extLst>
+            <a:ext uri="{909E8E84-426E-40DD-AFC4-6F175D3DCCD1}">
+              <a14:hiddenFill xmlns:a14="http://schemas.microsoft.com/office/drawing/2010/main">
+                <a:solidFill>
+                  <a:srgbClr val="FFFFFF"/>
+                </a:solidFill>
+              </a14:hiddenFill>
+            </a:ext>
+          </a:extLst>
+        </p:spPr>
       </p:sp>
       <p:sp>
         <p:nvSpPr>
-          <p:cNvPr id="3" name="Notes Placeholder 2"/>
+          <p:cNvPr id="19459" name="Notes Placeholder 2"/>
           <p:cNvSpPr>
             <a:spLocks noGrp="1"/>
           </p:cNvSpPr>
@@ -786,39 +805,212 @@
             <p:ph type="body" idx="1"/>
           </p:nvPr>
         </p:nvSpPr>
-        <p:spPr/>
+        <p:spPr bwMode="auto">
+          <a:noFill/>
+          <a:extLst>
+            <a:ext uri="{909E8E84-426E-40DD-AFC4-6F175D3DCCD1}">
+              <a14:hiddenFill xmlns:a14="http://schemas.microsoft.com/office/drawing/2010/main">
+                <a:solidFill>
+                  <a:srgbClr val="FFFFFF"/>
+                </a:solidFill>
+              </a14:hiddenFill>
+            </a:ext>
+            <a:ext uri="{91240B29-F687-4F45-9708-019B960494DF}">
+              <a14:hiddenLine xmlns:a14="http://schemas.microsoft.com/office/drawing/2010/main" w="9525">
+                <a:solidFill>
+                  <a:srgbClr val="000000"/>
+                </a:solidFill>
+                <a:miter lim="800000"/>
+                <a:headEnd/>
+                <a:tailEnd/>
+              </a14:hiddenLine>
+            </a:ext>
+          </a:extLst>
+        </p:spPr>
         <p:txBody>
-          <a:bodyPr/>
+          <a:bodyPr wrap="square" numCol="1" anchor="t" anchorCtr="0" compatLnSpc="1">
+            <a:prstTxWarp prst="textNoShape">
+              <a:avLst/>
+            </a:prstTxWarp>
+          </a:bodyPr>
           <a:lstStyle/>
           <a:p>
-            <a:endParaRPr lang="en-US" dirty="0"/>
+            <a:pPr eaLnBrk="1" hangingPunct="1">
+              <a:spcBef>
+                <a:spcPct val="0"/>
+              </a:spcBef>
+            </a:pPr>
+            <a:r>
+              <a:rPr lang="en-US" altLang="en-US" dirty="0">
+                <a:latin typeface="Courier New" panose="02070309020205020404" pitchFamily="49" charset="0"/>
+                <a:cs typeface="Courier New" panose="02070309020205020404" pitchFamily="49" charset="0"/>
+              </a:rPr>
+              <a:t>   </a:t>
+            </a:r>
           </a:p>
         </p:txBody>
       </p:sp>
       <p:sp>
         <p:nvSpPr>
-          <p:cNvPr id="4" name="Slide Number Placeholder 3"/>
+          <p:cNvPr id="19460" name="Slide Number Placeholder 3"/>
           <p:cNvSpPr>
             <a:spLocks noGrp="1"/>
           </p:cNvSpPr>
           <p:nvPr>
-            <p:ph type="sldNum" sz="quarter" idx="10"/>
+            <p:ph type="sldNum" sz="quarter" idx="5"/>
           </p:nvPr>
         </p:nvSpPr>
-        <p:spPr/>
+        <p:spPr bwMode="auto">
+          <a:noFill/>
+          <a:extLst>
+            <a:ext uri="{909E8E84-426E-40DD-AFC4-6F175D3DCCD1}">
+              <a14:hiddenFill xmlns:a14="http://schemas.microsoft.com/office/drawing/2010/main">
+                <a:solidFill>
+                  <a:srgbClr val="FFFFFF"/>
+                </a:solidFill>
+              </a14:hiddenFill>
+            </a:ext>
+            <a:ext uri="{91240B29-F687-4F45-9708-019B960494DF}">
+              <a14:hiddenLine xmlns:a14="http://schemas.microsoft.com/office/drawing/2010/main" w="9525">
+                <a:solidFill>
+                  <a:srgbClr val="000000"/>
+                </a:solidFill>
+                <a:miter lim="800000"/>
+                <a:headEnd/>
+                <a:tailEnd/>
+              </a14:hiddenLine>
+            </a:ext>
+          </a:extLst>
+        </p:spPr>
         <p:txBody>
           <a:bodyPr/>
-          <a:lstStyle/>
+          <a:lstStyle>
+            <a:lvl1pPr>
+              <a:spcBef>
+                <a:spcPct val="30000"/>
+              </a:spcBef>
+              <a:defRPr sz="1200">
+                <a:solidFill>
+                  <a:schemeClr val="tx1"/>
+                </a:solidFill>
+                <a:latin typeface="Calibri" panose="020F0502020204030204" pitchFamily="34" charset="0"/>
+              </a:defRPr>
+            </a:lvl1pPr>
+            <a:lvl2pPr marL="742950" indent="-285750">
+              <a:spcBef>
+                <a:spcPct val="30000"/>
+              </a:spcBef>
+              <a:defRPr sz="1200">
+                <a:solidFill>
+                  <a:schemeClr val="tx1"/>
+                </a:solidFill>
+                <a:latin typeface="Calibri" panose="020F0502020204030204" pitchFamily="34" charset="0"/>
+              </a:defRPr>
+            </a:lvl2pPr>
+            <a:lvl3pPr marL="1143000" indent="-228600">
+              <a:spcBef>
+                <a:spcPct val="30000"/>
+              </a:spcBef>
+              <a:defRPr sz="1200">
+                <a:solidFill>
+                  <a:schemeClr val="tx1"/>
+                </a:solidFill>
+                <a:latin typeface="Calibri" panose="020F0502020204030204" pitchFamily="34" charset="0"/>
+              </a:defRPr>
+            </a:lvl3pPr>
+            <a:lvl4pPr marL="1600200" indent="-228600">
+              <a:spcBef>
+                <a:spcPct val="30000"/>
+              </a:spcBef>
+              <a:defRPr sz="1200">
+                <a:solidFill>
+                  <a:schemeClr val="tx1"/>
+                </a:solidFill>
+                <a:latin typeface="Calibri" panose="020F0502020204030204" pitchFamily="34" charset="0"/>
+              </a:defRPr>
+            </a:lvl4pPr>
+            <a:lvl5pPr marL="2057400" indent="-228600">
+              <a:spcBef>
+                <a:spcPct val="30000"/>
+              </a:spcBef>
+              <a:defRPr sz="1200">
+                <a:solidFill>
+                  <a:schemeClr val="tx1"/>
+                </a:solidFill>
+                <a:latin typeface="Calibri" panose="020F0502020204030204" pitchFamily="34" charset="0"/>
+              </a:defRPr>
+            </a:lvl5pPr>
+            <a:lvl6pPr marL="2514600" indent="-228600" eaLnBrk="0" fontAlgn="base" hangingPunct="0">
+              <a:spcBef>
+                <a:spcPct val="30000"/>
+              </a:spcBef>
+              <a:spcAft>
+                <a:spcPct val="0"/>
+              </a:spcAft>
+              <a:defRPr sz="1200">
+                <a:solidFill>
+                  <a:schemeClr val="tx1"/>
+                </a:solidFill>
+                <a:latin typeface="Calibri" panose="020F0502020204030204" pitchFamily="34" charset="0"/>
+              </a:defRPr>
+            </a:lvl6pPr>
+            <a:lvl7pPr marL="2971800" indent="-228600" eaLnBrk="0" fontAlgn="base" hangingPunct="0">
+              <a:spcBef>
+                <a:spcPct val="30000"/>
+              </a:spcBef>
+              <a:spcAft>
+                <a:spcPct val="0"/>
+              </a:spcAft>
+              <a:defRPr sz="1200">
+                <a:solidFill>
+                  <a:schemeClr val="tx1"/>
+                </a:solidFill>
+                <a:latin typeface="Calibri" panose="020F0502020204030204" pitchFamily="34" charset="0"/>
+              </a:defRPr>
+            </a:lvl7pPr>
+            <a:lvl8pPr marL="3429000" indent="-228600" eaLnBrk="0" fontAlgn="base" hangingPunct="0">
+              <a:spcBef>
+                <a:spcPct val="30000"/>
+              </a:spcBef>
+              <a:spcAft>
+                <a:spcPct val="0"/>
+              </a:spcAft>
+              <a:defRPr sz="1200">
+                <a:solidFill>
+                  <a:schemeClr val="tx1"/>
+                </a:solidFill>
+                <a:latin typeface="Calibri" panose="020F0502020204030204" pitchFamily="34" charset="0"/>
+              </a:defRPr>
+            </a:lvl8pPr>
+            <a:lvl9pPr marL="3886200" indent="-228600" eaLnBrk="0" fontAlgn="base" hangingPunct="0">
+              <a:spcBef>
+                <a:spcPct val="30000"/>
+              </a:spcBef>
+              <a:spcAft>
+                <a:spcPct val="0"/>
+              </a:spcAft>
+              <a:defRPr sz="1200">
+                <a:solidFill>
+                  <a:schemeClr val="tx1"/>
+                </a:solidFill>
+                <a:latin typeface="Calibri" panose="020F0502020204030204" pitchFamily="34" charset="0"/>
+              </a:defRPr>
+            </a:lvl9pPr>
+          </a:lstStyle>
           <a:p>
             <a:pPr>
-              <a:defRPr/>
-            </a:pPr>
-            <a:fld id="{AABC0A05-FB5D-4821-AA94-0E3148BEF131}" type="slidenum">
-              <a:rPr lang="en-US" altLang="en-US" smtClean="0"/>
+              <a:spcBef>
+                <a:spcPct val="0"/>
+              </a:spcBef>
+            </a:pPr>
+            <a:fld id="{B5412107-EFCD-4DDC-9260-3282BAA25290}" type="slidenum">
+              <a:rPr lang="en-US" altLang="en-US"/>
               <a:pPr>
-                <a:defRPr/>
+                <a:spcBef>
+                  <a:spcPct val="0"/>
+                </a:spcBef>
               </a:pPr>
-              <a:t>17</a:t>
+              <a:t>18</a:t>
             </a:fld>
             <a:endParaRPr lang="en-US" altLang="en-US"/>
           </a:p>
@@ -827,7 +1019,7 @@
     </p:spTree>
     <p:extLst>
       <p:ext uri="{BB962C8B-B14F-4D97-AF65-F5344CB8AC3E}">
-        <p14:creationId xmlns:p14="http://schemas.microsoft.com/office/powerpoint/2010/main" val="2382447883"/>
+        <p14:creationId xmlns:p14="http://schemas.microsoft.com/office/powerpoint/2010/main" val="1245022183"/>
       </p:ext>
     </p:extLst>
   </p:cSld>
@@ -856,7 +1048,7 @@
       </p:grpSpPr>
       <p:sp>
         <p:nvSpPr>
-          <p:cNvPr id="19458" name="Slide Image Placeholder 1"/>
+          <p:cNvPr id="21506" name="Slide Image Placeholder 1"/>
           <p:cNvSpPr>
             <a:spLocks noGrp="1" noRot="1" noChangeAspect="1" noTextEdit="1"/>
           </p:cNvSpPr>
@@ -887,7 +1079,7 @@
       </p:sp>
       <p:sp>
         <p:nvSpPr>
-          <p:cNvPr id="19459" name="Notes Placeholder 2"/>
+          <p:cNvPr id="21507" name="Notes Placeholder 2"/>
           <p:cNvSpPr>
             <a:spLocks noGrp="1"/>
           </p:cNvSpPr>
@@ -925,24 +1117,18 @@
           </a:bodyPr>
           <a:lstStyle/>
           <a:p>
-            <a:pPr eaLnBrk="1" hangingPunct="1">
-              <a:spcBef>
-                <a:spcPct val="0"/>
-              </a:spcBef>
-            </a:pPr>
-            <a:r>
-              <a:rPr lang="en-US" altLang="en-US" dirty="0">
-                <a:latin typeface="Courier New" panose="02070309020205020404" pitchFamily="49" charset="0"/>
-                <a:cs typeface="Courier New" panose="02070309020205020404" pitchFamily="49" charset="0"/>
-              </a:rPr>
-              <a:t>   </a:t>
-            </a:r>
+            <a:pPr marL="228600" indent="-228600" eaLnBrk="1" hangingPunct="1">
+              <a:spcBef>
+                <a:spcPct val="0"/>
+              </a:spcBef>
+            </a:pPr>
+            <a:endParaRPr lang="en-US" altLang="en-US" dirty="0"/>
           </a:p>
         </p:txBody>
       </p:sp>
       <p:sp>
         <p:nvSpPr>
-          <p:cNvPr id="19460" name="Slide Number Placeholder 3"/>
+          <p:cNvPr id="21508" name="Slide Number Placeholder 3"/>
           <p:cNvSpPr>
             <a:spLocks noGrp="1"/>
           </p:cNvSpPr>
@@ -1093,14 +1279,14 @@
                 <a:spcPct val="0"/>
               </a:spcBef>
             </a:pPr>
-            <a:fld id="{B5412107-EFCD-4DDC-9260-3282BAA25290}" type="slidenum">
+            <a:fld id="{DFF18B6A-7130-4799-A13D-559C48C75EF1}" type="slidenum">
               <a:rPr lang="en-US" altLang="en-US"/>
               <a:pPr>
                 <a:spcBef>
                   <a:spcPct val="0"/>
                 </a:spcBef>
               </a:pPr>
-              <a:t>18</a:t>
+              <a:t>19</a:t>
             </a:fld>
             <a:endParaRPr lang="en-US" altLang="en-US"/>
           </a:p>
@@ -1109,7 +1295,7 @@
     </p:spTree>
     <p:extLst>
       <p:ext uri="{BB962C8B-B14F-4D97-AF65-F5344CB8AC3E}">
-        <p14:creationId xmlns:p14="http://schemas.microsoft.com/office/powerpoint/2010/main" val="1245022183"/>
+        <p14:creationId xmlns:p14="http://schemas.microsoft.com/office/powerpoint/2010/main" val="163366979"/>
       </p:ext>
     </p:extLst>
   </p:cSld>
@@ -1376,7 +1562,7 @@
                   <a:spcPct val="0"/>
                 </a:spcBef>
               </a:pPr>
-              <a:t>19</a:t>
+              <a:t>20</a:t>
             </a:fld>
             <a:endParaRPr lang="en-US" altLang="en-US"/>
           </a:p>
@@ -1385,7 +1571,7 @@
     </p:spTree>
     <p:extLst>
       <p:ext uri="{BB962C8B-B14F-4D97-AF65-F5344CB8AC3E}">
-        <p14:creationId xmlns:p14="http://schemas.microsoft.com/office/powerpoint/2010/main" val="163366979"/>
+        <p14:creationId xmlns:p14="http://schemas.microsoft.com/office/powerpoint/2010/main" val="1357557010"/>
       </p:ext>
     </p:extLst>
   </p:cSld>
@@ -1414,38 +1600,19 @@
       </p:grpSpPr>
       <p:sp>
         <p:nvSpPr>
-          <p:cNvPr id="21506" name="Slide Image Placeholder 1"/>
+          <p:cNvPr id="2" name="Slide Image Placeholder 1"/>
           <p:cNvSpPr>
-            <a:spLocks noGrp="1" noRot="1" noChangeAspect="1" noTextEdit="1"/>
+            <a:spLocks noGrp="1" noRot="1" noChangeAspect="1"/>
           </p:cNvSpPr>
           <p:nvPr>
             <p:ph type="sldImg"/>
           </p:nvPr>
         </p:nvSpPr>
-        <p:spPr bwMode="auto">
-          <a:noFill/>
-          <a:ln>
-            <a:solidFill>
-              <a:srgbClr val="000000"/>
-            </a:solidFill>
-            <a:miter lim="800000"/>
-            <a:headEnd/>
-            <a:tailEnd/>
-          </a:ln>
-          <a:extLst>
-            <a:ext uri="{909E8E84-426E-40DD-AFC4-6F175D3DCCD1}">
-              <a14:hiddenFill xmlns:a14="http://schemas.microsoft.com/office/drawing/2010/main">
-                <a:solidFill>
-                  <a:srgbClr val="FFFFFF"/>
-                </a:solidFill>
-              </a14:hiddenFill>
-            </a:ext>
-          </a:extLst>
-        </p:spPr>
+        <p:spPr/>
       </p:sp>
       <p:sp>
         <p:nvSpPr>
-          <p:cNvPr id="21507" name="Notes Placeholder 2"/>
+          <p:cNvPr id="3" name="Notes Placeholder 2"/>
           <p:cNvSpPr>
             <a:spLocks noGrp="1"/>
           </p:cNvSpPr>
@@ -1453,206 +1620,39 @@
             <p:ph type="body" idx="1"/>
           </p:nvPr>
         </p:nvSpPr>
-        <p:spPr bwMode="auto">
-          <a:noFill/>
-          <a:extLst>
-            <a:ext uri="{909E8E84-426E-40DD-AFC4-6F175D3DCCD1}">
-              <a14:hiddenFill xmlns:a14="http://schemas.microsoft.com/office/drawing/2010/main">
-                <a:solidFill>
-                  <a:srgbClr val="FFFFFF"/>
-                </a:solidFill>
-              </a14:hiddenFill>
-            </a:ext>
-            <a:ext uri="{91240B29-F687-4F45-9708-019B960494DF}">
-              <a14:hiddenLine xmlns:a14="http://schemas.microsoft.com/office/drawing/2010/main" w="9525">
-                <a:solidFill>
-                  <a:srgbClr val="000000"/>
-                </a:solidFill>
-                <a:miter lim="800000"/>
-                <a:headEnd/>
-                <a:tailEnd/>
-              </a14:hiddenLine>
-            </a:ext>
-          </a:extLst>
-        </p:spPr>
+        <p:spPr/>
         <p:txBody>
-          <a:bodyPr wrap="square" numCol="1" anchor="t" anchorCtr="0" compatLnSpc="1">
-            <a:prstTxWarp prst="textNoShape">
-              <a:avLst/>
-            </a:prstTxWarp>
-          </a:bodyPr>
+          <a:bodyPr/>
           <a:lstStyle/>
           <a:p>
-            <a:pPr marL="228600" indent="-228600" eaLnBrk="1" hangingPunct="1">
-              <a:spcBef>
-                <a:spcPct val="0"/>
-              </a:spcBef>
-            </a:pPr>
-            <a:endParaRPr lang="en-US" altLang="en-US" dirty="0"/>
+            <a:endParaRPr lang="en-US" dirty="0"/>
           </a:p>
         </p:txBody>
       </p:sp>
       <p:sp>
         <p:nvSpPr>
-          <p:cNvPr id="21508" name="Slide Number Placeholder 3"/>
+          <p:cNvPr id="4" name="Slide Number Placeholder 3"/>
           <p:cNvSpPr>
             <a:spLocks noGrp="1"/>
           </p:cNvSpPr>
           <p:nvPr>
-            <p:ph type="sldNum" sz="quarter" idx="5"/>
+            <p:ph type="sldNum" sz="quarter" idx="10"/>
           </p:nvPr>
         </p:nvSpPr>
-        <p:spPr bwMode="auto">
-          <a:noFill/>
-          <a:extLst>
-            <a:ext uri="{909E8E84-426E-40DD-AFC4-6F175D3DCCD1}">
-              <a14:hiddenFill xmlns:a14="http://schemas.microsoft.com/office/drawing/2010/main">
-                <a:solidFill>
-                  <a:srgbClr val="FFFFFF"/>
-                </a:solidFill>
-              </a14:hiddenFill>
-            </a:ext>
-            <a:ext uri="{91240B29-F687-4F45-9708-019B960494DF}">
-              <a14:hiddenLine xmlns:a14="http://schemas.microsoft.com/office/drawing/2010/main" w="9525">
-                <a:solidFill>
-                  <a:srgbClr val="000000"/>
-                </a:solidFill>
-                <a:miter lim="800000"/>
-                <a:headEnd/>
-                <a:tailEnd/>
-              </a14:hiddenLine>
-            </a:ext>
-          </a:extLst>
-        </p:spPr>
+        <p:spPr/>
         <p:txBody>
           <a:bodyPr/>
-          <a:lstStyle>
-            <a:lvl1pPr>
-              <a:spcBef>
-                <a:spcPct val="30000"/>
-              </a:spcBef>
-              <a:defRPr sz="1200">
-                <a:solidFill>
-                  <a:schemeClr val="tx1"/>
-                </a:solidFill>
-                <a:latin typeface="Calibri" panose="020F0502020204030204" pitchFamily="34" charset="0"/>
-              </a:defRPr>
-            </a:lvl1pPr>
-            <a:lvl2pPr marL="742950" indent="-285750">
-              <a:spcBef>
-                <a:spcPct val="30000"/>
-              </a:spcBef>
-              <a:defRPr sz="1200">
-                <a:solidFill>
-                  <a:schemeClr val="tx1"/>
-                </a:solidFill>
-                <a:latin typeface="Calibri" panose="020F0502020204030204" pitchFamily="34" charset="0"/>
-              </a:defRPr>
-            </a:lvl2pPr>
-            <a:lvl3pPr marL="1143000" indent="-228600">
-              <a:spcBef>
-                <a:spcPct val="30000"/>
-              </a:spcBef>
-              <a:defRPr sz="1200">
-                <a:solidFill>
-                  <a:schemeClr val="tx1"/>
-                </a:solidFill>
-                <a:latin typeface="Calibri" panose="020F0502020204030204" pitchFamily="34" charset="0"/>
-              </a:defRPr>
-            </a:lvl3pPr>
-            <a:lvl4pPr marL="1600200" indent="-228600">
-              <a:spcBef>
-                <a:spcPct val="30000"/>
-              </a:spcBef>
-              <a:defRPr sz="1200">
-                <a:solidFill>
-                  <a:schemeClr val="tx1"/>
-                </a:solidFill>
-                <a:latin typeface="Calibri" panose="020F0502020204030204" pitchFamily="34" charset="0"/>
-              </a:defRPr>
-            </a:lvl4pPr>
-            <a:lvl5pPr marL="2057400" indent="-228600">
-              <a:spcBef>
-                <a:spcPct val="30000"/>
-              </a:spcBef>
-              <a:defRPr sz="1200">
-                <a:solidFill>
-                  <a:schemeClr val="tx1"/>
-                </a:solidFill>
-                <a:latin typeface="Calibri" panose="020F0502020204030204" pitchFamily="34" charset="0"/>
-              </a:defRPr>
-            </a:lvl5pPr>
-            <a:lvl6pPr marL="2514600" indent="-228600" eaLnBrk="0" fontAlgn="base" hangingPunct="0">
-              <a:spcBef>
-                <a:spcPct val="30000"/>
-              </a:spcBef>
-              <a:spcAft>
-                <a:spcPct val="0"/>
-              </a:spcAft>
-              <a:defRPr sz="1200">
-                <a:solidFill>
-                  <a:schemeClr val="tx1"/>
-                </a:solidFill>
-                <a:latin typeface="Calibri" panose="020F0502020204030204" pitchFamily="34" charset="0"/>
-              </a:defRPr>
-            </a:lvl6pPr>
-            <a:lvl7pPr marL="2971800" indent="-228600" eaLnBrk="0" fontAlgn="base" hangingPunct="0">
-              <a:spcBef>
-                <a:spcPct val="30000"/>
-              </a:spcBef>
-              <a:spcAft>
-                <a:spcPct val="0"/>
-              </a:spcAft>
-              <a:defRPr sz="1200">
-                <a:solidFill>
-                  <a:schemeClr val="tx1"/>
-                </a:solidFill>
-                <a:latin typeface="Calibri" panose="020F0502020204030204" pitchFamily="34" charset="0"/>
-              </a:defRPr>
-            </a:lvl7pPr>
-            <a:lvl8pPr marL="3429000" indent="-228600" eaLnBrk="0" fontAlgn="base" hangingPunct="0">
-              <a:spcBef>
-                <a:spcPct val="30000"/>
-              </a:spcBef>
-              <a:spcAft>
-                <a:spcPct val="0"/>
-              </a:spcAft>
-              <a:defRPr sz="1200">
-                <a:solidFill>
-                  <a:schemeClr val="tx1"/>
-                </a:solidFill>
-                <a:latin typeface="Calibri" panose="020F0502020204030204" pitchFamily="34" charset="0"/>
-              </a:defRPr>
-            </a:lvl8pPr>
-            <a:lvl9pPr marL="3886200" indent="-228600" eaLnBrk="0" fontAlgn="base" hangingPunct="0">
-              <a:spcBef>
-                <a:spcPct val="30000"/>
-              </a:spcBef>
-              <a:spcAft>
-                <a:spcPct val="0"/>
-              </a:spcAft>
-              <a:defRPr sz="1200">
-                <a:solidFill>
-                  <a:schemeClr val="tx1"/>
-                </a:solidFill>
-                <a:latin typeface="Calibri" panose="020F0502020204030204" pitchFamily="34" charset="0"/>
-              </a:defRPr>
-            </a:lvl9pPr>
-          </a:lstStyle>
+          <a:lstStyle/>
           <a:p>
             <a:pPr>
-              <a:spcBef>
-                <a:spcPct val="0"/>
-              </a:spcBef>
-            </a:pPr>
-            <a:fld id="{DFF18B6A-7130-4799-A13D-559C48C75EF1}" type="slidenum">
-              <a:rPr lang="en-US" altLang="en-US"/>
+              <a:defRPr/>
+            </a:pPr>
+            <a:fld id="{AABC0A05-FB5D-4821-AA94-0E3148BEF131}" type="slidenum">
+              <a:rPr lang="en-US" altLang="en-US" smtClean="0"/>
               <a:pPr>
-                <a:spcBef>
-                  <a:spcPct val="0"/>
-                </a:spcBef>
+                <a:defRPr/>
               </a:pPr>
-              <a:t>20</a:t>
+              <a:t>24</a:t>
             </a:fld>
             <a:endParaRPr lang="en-US" altLang="en-US"/>
           </a:p>
@@ -1661,7 +1661,7 @@
     </p:spTree>
     <p:extLst>
       <p:ext uri="{BB962C8B-B14F-4D97-AF65-F5344CB8AC3E}">
-        <p14:creationId xmlns:p14="http://schemas.microsoft.com/office/powerpoint/2010/main" val="1357557010"/>
+        <p14:creationId xmlns:p14="http://schemas.microsoft.com/office/powerpoint/2010/main" val="505438214"/>
       </p:ext>
     </p:extLst>
   </p:cSld>
@@ -1742,7 +1742,7 @@
               <a:pPr>
                 <a:defRPr/>
               </a:pPr>
-              <a:t>24</a:t>
+              <a:t>25</a:t>
             </a:fld>
             <a:endParaRPr lang="en-US" altLang="en-US"/>
           </a:p>
@@ -1751,7 +1751,7 @@
     </p:spTree>
     <p:extLst>
       <p:ext uri="{BB962C8B-B14F-4D97-AF65-F5344CB8AC3E}">
-        <p14:creationId xmlns:p14="http://schemas.microsoft.com/office/powerpoint/2010/main" val="505438214"/>
+        <p14:creationId xmlns:p14="http://schemas.microsoft.com/office/powerpoint/2010/main" val="1764413616"/>
       </p:ext>
     </p:extLst>
   </p:cSld>
@@ -1832,7 +1832,7 @@
               <a:pPr>
                 <a:defRPr/>
               </a:pPr>
-              <a:t>25</a:t>
+              <a:t>28</a:t>
             </a:fld>
             <a:endParaRPr lang="en-US" altLang="en-US"/>
           </a:p>
@@ -1841,7 +1841,7 @@
     </p:spTree>
     <p:extLst>
       <p:ext uri="{BB962C8B-B14F-4D97-AF65-F5344CB8AC3E}">
-        <p14:creationId xmlns:p14="http://schemas.microsoft.com/office/powerpoint/2010/main" val="1764413616"/>
+        <p14:creationId xmlns:p14="http://schemas.microsoft.com/office/powerpoint/2010/main" val="1377343750"/>
       </p:ext>
     </p:extLst>
   </p:cSld>
@@ -1895,7 +1895,42 @@
           <a:bodyPr/>
           <a:lstStyle/>
           <a:p>
-            <a:endParaRPr lang="en-US" dirty="0"/>
+            <a:r>
+              <a:rPr lang="en-US" dirty="0"/>
+              <a:t>12m56.650</a:t>
+            </a:r>
+            <a:r>
+              <a:rPr lang="en-US" baseline="0" dirty="0"/>
+              <a:t>s for two days , i.e.</a:t>
+            </a:r>
+          </a:p>
+          <a:p>
+            <a:r>
+              <a:rPr lang="de-DE" sz="1200" kern="1200" dirty="0">
+                <a:solidFill>
+                  <a:schemeClr val="dk1"/>
+                </a:solidFill>
+                <a:effectLst/>
+                <a:latin typeface="+mn-lt"/>
+                <a:ea typeface="+mn-ea"/>
+                <a:cs typeface="+mn-cs"/>
+              </a:rPr>
+              <a:t>00000000 010000</a:t>
+            </a:r>
+          </a:p>
+          <a:p>
+            <a:r>
+              <a:rPr lang="de-DE" sz="1200" kern="1200" dirty="0">
+                <a:solidFill>
+                  <a:schemeClr val="dk1"/>
+                </a:solidFill>
+                <a:effectLst/>
+                <a:latin typeface="+mn-lt"/>
+                <a:ea typeface="+mn-ea"/>
+                <a:cs typeface="+mn-cs"/>
+              </a:rPr>
+              <a:t>NUM_SGMT:48</a:t>
+            </a:r>
           </a:p>
         </p:txBody>
       </p:sp>
@@ -1922,7 +1957,7 @@
               <a:pPr>
                 <a:defRPr/>
               </a:pPr>
-              <a:t>28</a:t>
+              <a:t>29</a:t>
             </a:fld>
             <a:endParaRPr lang="en-US" altLang="en-US"/>
           </a:p>
@@ -1931,7 +1966,7 @@
     </p:spTree>
     <p:extLst>
       <p:ext uri="{BB962C8B-B14F-4D97-AF65-F5344CB8AC3E}">
-        <p14:creationId xmlns:p14="http://schemas.microsoft.com/office/powerpoint/2010/main" val="1377343750"/>
+        <p14:creationId xmlns:p14="http://schemas.microsoft.com/office/powerpoint/2010/main" val="726874274"/>
       </p:ext>
     </p:extLst>
   </p:cSld>
@@ -1985,42 +2020,7 @@
           <a:bodyPr/>
           <a:lstStyle/>
           <a:p>
-            <a:r>
-              <a:rPr lang="en-US" dirty="0"/>
-              <a:t>12m56.650</a:t>
-            </a:r>
-            <a:r>
-              <a:rPr lang="en-US" baseline="0" dirty="0"/>
-              <a:t>s for two days , i.e.</a:t>
-            </a:r>
-          </a:p>
-          <a:p>
-            <a:r>
-              <a:rPr lang="de-DE" sz="1200" kern="1200" dirty="0">
-                <a:solidFill>
-                  <a:schemeClr val="dk1"/>
-                </a:solidFill>
-                <a:effectLst/>
-                <a:latin typeface="+mn-lt"/>
-                <a:ea typeface="+mn-ea"/>
-                <a:cs typeface="+mn-cs"/>
-              </a:rPr>
-              <a:t>00000000 010000</a:t>
-            </a:r>
-          </a:p>
-          <a:p>
-            <a:r>
-              <a:rPr lang="de-DE" sz="1200" kern="1200" dirty="0">
-                <a:solidFill>
-                  <a:schemeClr val="dk1"/>
-                </a:solidFill>
-                <a:effectLst/>
-                <a:latin typeface="+mn-lt"/>
-                <a:ea typeface="+mn-ea"/>
-                <a:cs typeface="+mn-cs"/>
-              </a:rPr>
-              <a:t>NUM_SGMT:48</a:t>
-            </a:r>
+            <a:endParaRPr lang="en-US"/>
           </a:p>
         </p:txBody>
       </p:sp>
@@ -2047,7 +2047,7 @@
               <a:pPr>
                 <a:defRPr/>
               </a:pPr>
-              <a:t>29</a:t>
+              <a:t>32</a:t>
             </a:fld>
             <a:endParaRPr lang="en-US" altLang="en-US"/>
           </a:p>
@@ -2056,7 +2056,7 @@
     </p:spTree>
     <p:extLst>
       <p:ext uri="{BB962C8B-B14F-4D97-AF65-F5344CB8AC3E}">
-        <p14:creationId xmlns:p14="http://schemas.microsoft.com/office/powerpoint/2010/main" val="726874274"/>
+        <p14:creationId xmlns:p14="http://schemas.microsoft.com/office/powerpoint/2010/main" val="2262873943"/>
       </p:ext>
     </p:extLst>
   </p:cSld>
@@ -2137,7 +2137,7 @@
               <a:pPr>
                 <a:defRPr/>
               </a:pPr>
-              <a:t>32</a:t>
+              <a:t>33</a:t>
             </a:fld>
             <a:endParaRPr lang="en-US" altLang="en-US"/>
           </a:p>
@@ -2146,7 +2146,7 @@
     </p:spTree>
     <p:extLst>
       <p:ext uri="{BB962C8B-B14F-4D97-AF65-F5344CB8AC3E}">
-        <p14:creationId xmlns:p14="http://schemas.microsoft.com/office/powerpoint/2010/main" val="2262873943"/>
+        <p14:creationId xmlns:p14="http://schemas.microsoft.com/office/powerpoint/2010/main" val="409335787"/>
       </p:ext>
     </p:extLst>
   </p:cSld>
@@ -2200,7 +2200,7 @@
           <a:bodyPr/>
           <a:lstStyle/>
           <a:p>
-            <a:endParaRPr lang="en-US"/>
+            <a:endParaRPr lang="en-US" dirty="0"/>
           </a:p>
         </p:txBody>
       </p:sp>
@@ -2227,7 +2227,7 @@
               <a:pPr>
                 <a:defRPr/>
               </a:pPr>
-              <a:t>33</a:t>
+              <a:t>37</a:t>
             </a:fld>
             <a:endParaRPr lang="en-US" altLang="en-US"/>
           </a:p>
@@ -2236,7 +2236,7 @@
     </p:spTree>
     <p:extLst>
       <p:ext uri="{BB962C8B-B14F-4D97-AF65-F5344CB8AC3E}">
-        <p14:creationId xmlns:p14="http://schemas.microsoft.com/office/powerpoint/2010/main" val="409335787"/>
+        <p14:creationId xmlns:p14="http://schemas.microsoft.com/office/powerpoint/2010/main" val="3540984841"/>
       </p:ext>
     </p:extLst>
   </p:cSld>
@@ -2317,7 +2317,7 @@
               <a:pPr>
                 <a:defRPr/>
               </a:pPr>
-              <a:t>4</a:t>
+              <a:t>5</a:t>
             </a:fld>
             <a:endParaRPr lang="en-US" altLang="en-US"/>
           </a:p>
@@ -2326,7 +2326,7 @@
     </p:spTree>
     <p:extLst>
       <p:ext uri="{BB962C8B-B14F-4D97-AF65-F5344CB8AC3E}">
-        <p14:creationId xmlns:p14="http://schemas.microsoft.com/office/powerpoint/2010/main" val="3768471597"/>
+        <p14:creationId xmlns:p14="http://schemas.microsoft.com/office/powerpoint/2010/main" val="2361380221"/>
       </p:ext>
     </p:extLst>
   </p:cSld>
@@ -2337,96 +2337,6 @@
 </file>
 
 <file path=ppt/notesSlides/notesSlide20.xml><?xml version="1.0" encoding="utf-8"?>
-<p:notes xmlns:a="http://schemas.openxmlformats.org/drawingml/2006/main" xmlns:r="http://schemas.openxmlformats.org/officeDocument/2006/relationships" xmlns:p="http://schemas.openxmlformats.org/presentationml/2006/main">
-  <p:cSld>
-    <p:spTree>
-      <p:nvGrpSpPr>
-        <p:cNvPr id="1" name=""/>
-        <p:cNvGrpSpPr/>
-        <p:nvPr/>
-      </p:nvGrpSpPr>
-      <p:grpSpPr>
-        <a:xfrm>
-          <a:off x="0" y="0"/>
-          <a:ext cx="0" cy="0"/>
-          <a:chOff x="0" y="0"/>
-          <a:chExt cx="0" cy="0"/>
-        </a:xfrm>
-      </p:grpSpPr>
-      <p:sp>
-        <p:nvSpPr>
-          <p:cNvPr id="2" name="Slide Image Placeholder 1"/>
-          <p:cNvSpPr>
-            <a:spLocks noGrp="1" noRot="1" noChangeAspect="1"/>
-          </p:cNvSpPr>
-          <p:nvPr>
-            <p:ph type="sldImg"/>
-          </p:nvPr>
-        </p:nvSpPr>
-        <p:spPr/>
-      </p:sp>
-      <p:sp>
-        <p:nvSpPr>
-          <p:cNvPr id="3" name="Notes Placeholder 2"/>
-          <p:cNvSpPr>
-            <a:spLocks noGrp="1"/>
-          </p:cNvSpPr>
-          <p:nvPr>
-            <p:ph type="body" idx="1"/>
-          </p:nvPr>
-        </p:nvSpPr>
-        <p:spPr/>
-        <p:txBody>
-          <a:bodyPr/>
-          <a:lstStyle/>
-          <a:p>
-            <a:endParaRPr lang="en-US" dirty="0"/>
-          </a:p>
-        </p:txBody>
-      </p:sp>
-      <p:sp>
-        <p:nvSpPr>
-          <p:cNvPr id="4" name="Slide Number Placeholder 3"/>
-          <p:cNvSpPr>
-            <a:spLocks noGrp="1"/>
-          </p:cNvSpPr>
-          <p:nvPr>
-            <p:ph type="sldNum" sz="quarter" idx="10"/>
-          </p:nvPr>
-        </p:nvSpPr>
-        <p:spPr/>
-        <p:txBody>
-          <a:bodyPr/>
-          <a:lstStyle/>
-          <a:p>
-            <a:pPr>
-              <a:defRPr/>
-            </a:pPr>
-            <a:fld id="{AABC0A05-FB5D-4821-AA94-0E3148BEF131}" type="slidenum">
-              <a:rPr lang="en-US" altLang="en-US" smtClean="0"/>
-              <a:pPr>
-                <a:defRPr/>
-              </a:pPr>
-              <a:t>37</a:t>
-            </a:fld>
-            <a:endParaRPr lang="en-US" altLang="en-US"/>
-          </a:p>
-        </p:txBody>
-      </p:sp>
-    </p:spTree>
-    <p:extLst>
-      <p:ext uri="{BB962C8B-B14F-4D97-AF65-F5344CB8AC3E}">
-        <p14:creationId xmlns:p14="http://schemas.microsoft.com/office/powerpoint/2010/main" val="3540984841"/>
-      </p:ext>
-    </p:extLst>
-  </p:cSld>
-  <p:clrMapOvr>
-    <a:masterClrMapping/>
-  </p:clrMapOvr>
-</p:notes>
-</file>
-
-<file path=ppt/notesSlides/notesSlide21.xml><?xml version="1.0" encoding="utf-8"?>
 <p:notes xmlns:a="http://schemas.openxmlformats.org/drawingml/2006/main" xmlns:r="http://schemas.openxmlformats.org/officeDocument/2006/relationships" xmlns:p="http://schemas.openxmlformats.org/presentationml/2006/main">
   <p:cSld>
     <p:spTree>
@@ -2773,7 +2683,7 @@
               <a:pPr>
                 <a:defRPr/>
               </a:pPr>
-              <a:t>5</a:t>
+              <a:t>6</a:t>
             </a:fld>
             <a:endParaRPr lang="en-US" altLang="en-US"/>
           </a:p>
@@ -2793,6 +2703,282 @@
 </file>
 
 <file path=ppt/notesSlides/notesSlide4.xml><?xml version="1.0" encoding="utf-8"?>
+<p:notes xmlns:a="http://schemas.openxmlformats.org/drawingml/2006/main" xmlns:r="http://schemas.openxmlformats.org/officeDocument/2006/relationships" xmlns:p="http://schemas.openxmlformats.org/presentationml/2006/main">
+  <p:cSld>
+    <p:spTree>
+      <p:nvGrpSpPr>
+        <p:cNvPr id="1" name=""/>
+        <p:cNvGrpSpPr/>
+        <p:nvPr/>
+      </p:nvGrpSpPr>
+      <p:grpSpPr>
+        <a:xfrm>
+          <a:off x="0" y="0"/>
+          <a:ext cx="0" cy="0"/>
+          <a:chOff x="0" y="0"/>
+          <a:chExt cx="0" cy="0"/>
+        </a:xfrm>
+      </p:grpSpPr>
+      <p:sp>
+        <p:nvSpPr>
+          <p:cNvPr id="9218" name="Slide Image Placeholder 1"/>
+          <p:cNvSpPr>
+            <a:spLocks noGrp="1" noRot="1" noChangeAspect="1" noTextEdit="1"/>
+          </p:cNvSpPr>
+          <p:nvPr>
+            <p:ph type="sldImg"/>
+          </p:nvPr>
+        </p:nvSpPr>
+        <p:spPr bwMode="auto">
+          <a:noFill/>
+          <a:ln>
+            <a:solidFill>
+              <a:srgbClr val="000000"/>
+            </a:solidFill>
+            <a:miter lim="800000"/>
+            <a:headEnd/>
+            <a:tailEnd/>
+          </a:ln>
+          <a:extLst>
+            <a:ext uri="{909E8E84-426E-40DD-AFC4-6F175D3DCCD1}">
+              <a14:hiddenFill xmlns:a14="http://schemas.microsoft.com/office/drawing/2010/main">
+                <a:solidFill>
+                  <a:srgbClr val="FFFFFF"/>
+                </a:solidFill>
+              </a14:hiddenFill>
+            </a:ext>
+          </a:extLst>
+        </p:spPr>
+      </p:sp>
+      <p:sp>
+        <p:nvSpPr>
+          <p:cNvPr id="9219" name="Notes Placeholder 2"/>
+          <p:cNvSpPr>
+            <a:spLocks noGrp="1"/>
+          </p:cNvSpPr>
+          <p:nvPr>
+            <p:ph type="body" idx="1"/>
+          </p:nvPr>
+        </p:nvSpPr>
+        <p:spPr bwMode="auto">
+          <a:noFill/>
+          <a:extLst>
+            <a:ext uri="{909E8E84-426E-40DD-AFC4-6F175D3DCCD1}">
+              <a14:hiddenFill xmlns:a14="http://schemas.microsoft.com/office/drawing/2010/main">
+                <a:solidFill>
+                  <a:srgbClr val="FFFFFF"/>
+                </a:solidFill>
+              </a14:hiddenFill>
+            </a:ext>
+            <a:ext uri="{91240B29-F687-4F45-9708-019B960494DF}">
+              <a14:hiddenLine xmlns:a14="http://schemas.microsoft.com/office/drawing/2010/main" w="9525">
+                <a:solidFill>
+                  <a:srgbClr val="000000"/>
+                </a:solidFill>
+                <a:miter lim="800000"/>
+                <a:headEnd/>
+                <a:tailEnd/>
+              </a14:hiddenLine>
+            </a:ext>
+          </a:extLst>
+        </p:spPr>
+        <p:txBody>
+          <a:bodyPr wrap="square" numCol="1" anchor="t" anchorCtr="0" compatLnSpc="1">
+            <a:prstTxWarp prst="textNoShape">
+              <a:avLst/>
+            </a:prstTxWarp>
+          </a:bodyPr>
+          <a:lstStyle/>
+          <a:p>
+            <a:pPr eaLnBrk="1" hangingPunct="1">
+              <a:spcBef>
+                <a:spcPct val="0"/>
+              </a:spcBef>
+            </a:pPr>
+            <a:endParaRPr lang="en-US" altLang="en-US"/>
+          </a:p>
+        </p:txBody>
+      </p:sp>
+      <p:sp>
+        <p:nvSpPr>
+          <p:cNvPr id="9220" name="Slide Number Placeholder 3"/>
+          <p:cNvSpPr>
+            <a:spLocks noGrp="1"/>
+          </p:cNvSpPr>
+          <p:nvPr>
+            <p:ph type="sldNum" sz="quarter" idx="5"/>
+          </p:nvPr>
+        </p:nvSpPr>
+        <p:spPr bwMode="auto">
+          <a:noFill/>
+          <a:extLst>
+            <a:ext uri="{909E8E84-426E-40DD-AFC4-6F175D3DCCD1}">
+              <a14:hiddenFill xmlns:a14="http://schemas.microsoft.com/office/drawing/2010/main">
+                <a:solidFill>
+                  <a:srgbClr val="FFFFFF"/>
+                </a:solidFill>
+              </a14:hiddenFill>
+            </a:ext>
+            <a:ext uri="{91240B29-F687-4F45-9708-019B960494DF}">
+              <a14:hiddenLine xmlns:a14="http://schemas.microsoft.com/office/drawing/2010/main" w="9525">
+                <a:solidFill>
+                  <a:srgbClr val="000000"/>
+                </a:solidFill>
+                <a:miter lim="800000"/>
+                <a:headEnd/>
+                <a:tailEnd/>
+              </a14:hiddenLine>
+            </a:ext>
+          </a:extLst>
+        </p:spPr>
+        <p:txBody>
+          <a:bodyPr/>
+          <a:lstStyle>
+            <a:lvl1pPr>
+              <a:spcBef>
+                <a:spcPct val="30000"/>
+              </a:spcBef>
+              <a:defRPr sz="1200">
+                <a:solidFill>
+                  <a:schemeClr val="tx1"/>
+                </a:solidFill>
+                <a:latin typeface="Calibri" panose="020F0502020204030204" pitchFamily="34" charset="0"/>
+              </a:defRPr>
+            </a:lvl1pPr>
+            <a:lvl2pPr marL="742950" indent="-285750">
+              <a:spcBef>
+                <a:spcPct val="30000"/>
+              </a:spcBef>
+              <a:defRPr sz="1200">
+                <a:solidFill>
+                  <a:schemeClr val="tx1"/>
+                </a:solidFill>
+                <a:latin typeface="Calibri" panose="020F0502020204030204" pitchFamily="34" charset="0"/>
+              </a:defRPr>
+            </a:lvl2pPr>
+            <a:lvl3pPr marL="1143000" indent="-228600">
+              <a:spcBef>
+                <a:spcPct val="30000"/>
+              </a:spcBef>
+              <a:defRPr sz="1200">
+                <a:solidFill>
+                  <a:schemeClr val="tx1"/>
+                </a:solidFill>
+                <a:latin typeface="Calibri" panose="020F0502020204030204" pitchFamily="34" charset="0"/>
+              </a:defRPr>
+            </a:lvl3pPr>
+            <a:lvl4pPr marL="1600200" indent="-228600">
+              <a:spcBef>
+                <a:spcPct val="30000"/>
+              </a:spcBef>
+              <a:defRPr sz="1200">
+                <a:solidFill>
+                  <a:schemeClr val="tx1"/>
+                </a:solidFill>
+                <a:latin typeface="Calibri" panose="020F0502020204030204" pitchFamily="34" charset="0"/>
+              </a:defRPr>
+            </a:lvl4pPr>
+            <a:lvl5pPr marL="2057400" indent="-228600">
+              <a:spcBef>
+                <a:spcPct val="30000"/>
+              </a:spcBef>
+              <a:defRPr sz="1200">
+                <a:solidFill>
+                  <a:schemeClr val="tx1"/>
+                </a:solidFill>
+                <a:latin typeface="Calibri" panose="020F0502020204030204" pitchFamily="34" charset="0"/>
+              </a:defRPr>
+            </a:lvl5pPr>
+            <a:lvl6pPr marL="2514600" indent="-228600" eaLnBrk="0" fontAlgn="base" hangingPunct="0">
+              <a:spcBef>
+                <a:spcPct val="30000"/>
+              </a:spcBef>
+              <a:spcAft>
+                <a:spcPct val="0"/>
+              </a:spcAft>
+              <a:defRPr sz="1200">
+                <a:solidFill>
+                  <a:schemeClr val="tx1"/>
+                </a:solidFill>
+                <a:latin typeface="Calibri" panose="020F0502020204030204" pitchFamily="34" charset="0"/>
+              </a:defRPr>
+            </a:lvl6pPr>
+            <a:lvl7pPr marL="2971800" indent="-228600" eaLnBrk="0" fontAlgn="base" hangingPunct="0">
+              <a:spcBef>
+                <a:spcPct val="30000"/>
+              </a:spcBef>
+              <a:spcAft>
+                <a:spcPct val="0"/>
+              </a:spcAft>
+              <a:defRPr sz="1200">
+                <a:solidFill>
+                  <a:schemeClr val="tx1"/>
+                </a:solidFill>
+                <a:latin typeface="Calibri" panose="020F0502020204030204" pitchFamily="34" charset="0"/>
+              </a:defRPr>
+            </a:lvl7pPr>
+            <a:lvl8pPr marL="3429000" indent="-228600" eaLnBrk="0" fontAlgn="base" hangingPunct="0">
+              <a:spcBef>
+                <a:spcPct val="30000"/>
+              </a:spcBef>
+              <a:spcAft>
+                <a:spcPct val="0"/>
+              </a:spcAft>
+              <a:defRPr sz="1200">
+                <a:solidFill>
+                  <a:schemeClr val="tx1"/>
+                </a:solidFill>
+                <a:latin typeface="Calibri" panose="020F0502020204030204" pitchFamily="34" charset="0"/>
+              </a:defRPr>
+            </a:lvl8pPr>
+            <a:lvl9pPr marL="3886200" indent="-228600" eaLnBrk="0" fontAlgn="base" hangingPunct="0">
+              <a:spcBef>
+                <a:spcPct val="30000"/>
+              </a:spcBef>
+              <a:spcAft>
+                <a:spcPct val="0"/>
+              </a:spcAft>
+              <a:defRPr sz="1200">
+                <a:solidFill>
+                  <a:schemeClr val="tx1"/>
+                </a:solidFill>
+                <a:latin typeface="Calibri" panose="020F0502020204030204" pitchFamily="34" charset="0"/>
+              </a:defRPr>
+            </a:lvl9pPr>
+          </a:lstStyle>
+          <a:p>
+            <a:pPr>
+              <a:spcBef>
+                <a:spcPct val="0"/>
+              </a:spcBef>
+            </a:pPr>
+            <a:fld id="{F29155EF-C699-4304-A819-0F768AA796FD}" type="slidenum">
+              <a:rPr lang="en-US" altLang="en-US"/>
+              <a:pPr>
+                <a:spcBef>
+                  <a:spcPct val="0"/>
+                </a:spcBef>
+              </a:pPr>
+              <a:t>8</a:t>
+            </a:fld>
+            <a:endParaRPr lang="en-US" altLang="en-US"/>
+          </a:p>
+        </p:txBody>
+      </p:sp>
+    </p:spTree>
+    <p:extLst>
+      <p:ext uri="{BB962C8B-B14F-4D97-AF65-F5344CB8AC3E}">
+        <p14:creationId xmlns:p14="http://schemas.microsoft.com/office/powerpoint/2010/main" val="3144302244"/>
+      </p:ext>
+    </p:extLst>
+  </p:cSld>
+  <p:clrMapOvr>
+    <a:masterClrMapping/>
+  </p:clrMapOvr>
+</p:notes>
+</file>
+
+<file path=ppt/notesSlides/notesSlide5.xml><?xml version="1.0" encoding="utf-8"?>
 <p:notes xmlns:a="http://schemas.openxmlformats.org/drawingml/2006/main" xmlns:r="http://schemas.openxmlformats.org/officeDocument/2006/relationships" xmlns:p="http://schemas.openxmlformats.org/presentationml/2006/main">
   <p:cSld>
     <p:spTree>
@@ -2863,7 +3049,7 @@
               <a:pPr>
                 <a:defRPr/>
               </a:pPr>
-              <a:t>6</a:t>
+              <a:t>9</a:t>
             </a:fld>
             <a:endParaRPr lang="en-US" altLang="en-US"/>
           </a:p>
@@ -2872,283 +3058,7 @@
     </p:spTree>
     <p:extLst>
       <p:ext uri="{BB962C8B-B14F-4D97-AF65-F5344CB8AC3E}">
-        <p14:creationId xmlns:p14="http://schemas.microsoft.com/office/powerpoint/2010/main" val="2361380221"/>
-      </p:ext>
-    </p:extLst>
-  </p:cSld>
-  <p:clrMapOvr>
-    <a:masterClrMapping/>
-  </p:clrMapOvr>
-</p:notes>
-</file>
-
-<file path=ppt/notesSlides/notesSlide5.xml><?xml version="1.0" encoding="utf-8"?>
-<p:notes xmlns:a="http://schemas.openxmlformats.org/drawingml/2006/main" xmlns:r="http://schemas.openxmlformats.org/officeDocument/2006/relationships" xmlns:p="http://schemas.openxmlformats.org/presentationml/2006/main">
-  <p:cSld>
-    <p:spTree>
-      <p:nvGrpSpPr>
-        <p:cNvPr id="1" name=""/>
-        <p:cNvGrpSpPr/>
-        <p:nvPr/>
-      </p:nvGrpSpPr>
-      <p:grpSpPr>
-        <a:xfrm>
-          <a:off x="0" y="0"/>
-          <a:ext cx="0" cy="0"/>
-          <a:chOff x="0" y="0"/>
-          <a:chExt cx="0" cy="0"/>
-        </a:xfrm>
-      </p:grpSpPr>
-      <p:sp>
-        <p:nvSpPr>
-          <p:cNvPr id="9218" name="Slide Image Placeholder 1"/>
-          <p:cNvSpPr>
-            <a:spLocks noGrp="1" noRot="1" noChangeAspect="1" noTextEdit="1"/>
-          </p:cNvSpPr>
-          <p:nvPr>
-            <p:ph type="sldImg"/>
-          </p:nvPr>
-        </p:nvSpPr>
-        <p:spPr bwMode="auto">
-          <a:noFill/>
-          <a:ln>
-            <a:solidFill>
-              <a:srgbClr val="000000"/>
-            </a:solidFill>
-            <a:miter lim="800000"/>
-            <a:headEnd/>
-            <a:tailEnd/>
-          </a:ln>
-          <a:extLst>
-            <a:ext uri="{909E8E84-426E-40DD-AFC4-6F175D3DCCD1}">
-              <a14:hiddenFill xmlns:a14="http://schemas.microsoft.com/office/drawing/2010/main">
-                <a:solidFill>
-                  <a:srgbClr val="FFFFFF"/>
-                </a:solidFill>
-              </a14:hiddenFill>
-            </a:ext>
-          </a:extLst>
-        </p:spPr>
-      </p:sp>
-      <p:sp>
-        <p:nvSpPr>
-          <p:cNvPr id="9219" name="Notes Placeholder 2"/>
-          <p:cNvSpPr>
-            <a:spLocks noGrp="1"/>
-          </p:cNvSpPr>
-          <p:nvPr>
-            <p:ph type="body" idx="1"/>
-          </p:nvPr>
-        </p:nvSpPr>
-        <p:spPr bwMode="auto">
-          <a:noFill/>
-          <a:extLst>
-            <a:ext uri="{909E8E84-426E-40DD-AFC4-6F175D3DCCD1}">
-              <a14:hiddenFill xmlns:a14="http://schemas.microsoft.com/office/drawing/2010/main">
-                <a:solidFill>
-                  <a:srgbClr val="FFFFFF"/>
-                </a:solidFill>
-              </a14:hiddenFill>
-            </a:ext>
-            <a:ext uri="{91240B29-F687-4F45-9708-019B960494DF}">
-              <a14:hiddenLine xmlns:a14="http://schemas.microsoft.com/office/drawing/2010/main" w="9525">
-                <a:solidFill>
-                  <a:srgbClr val="000000"/>
-                </a:solidFill>
-                <a:miter lim="800000"/>
-                <a:headEnd/>
-                <a:tailEnd/>
-              </a14:hiddenLine>
-            </a:ext>
-          </a:extLst>
-        </p:spPr>
-        <p:txBody>
-          <a:bodyPr wrap="square" numCol="1" anchor="t" anchorCtr="0" compatLnSpc="1">
-            <a:prstTxWarp prst="textNoShape">
-              <a:avLst/>
-            </a:prstTxWarp>
-          </a:bodyPr>
-          <a:lstStyle/>
-          <a:p>
-            <a:pPr eaLnBrk="1" hangingPunct="1">
-              <a:spcBef>
-                <a:spcPct val="0"/>
-              </a:spcBef>
-            </a:pPr>
-            <a:endParaRPr lang="en-US" altLang="en-US"/>
-          </a:p>
-        </p:txBody>
-      </p:sp>
-      <p:sp>
-        <p:nvSpPr>
-          <p:cNvPr id="9220" name="Slide Number Placeholder 3"/>
-          <p:cNvSpPr>
-            <a:spLocks noGrp="1"/>
-          </p:cNvSpPr>
-          <p:nvPr>
-            <p:ph type="sldNum" sz="quarter" idx="5"/>
-          </p:nvPr>
-        </p:nvSpPr>
-        <p:spPr bwMode="auto">
-          <a:noFill/>
-          <a:extLst>
-            <a:ext uri="{909E8E84-426E-40DD-AFC4-6F175D3DCCD1}">
-              <a14:hiddenFill xmlns:a14="http://schemas.microsoft.com/office/drawing/2010/main">
-                <a:solidFill>
-                  <a:srgbClr val="FFFFFF"/>
-                </a:solidFill>
-              </a14:hiddenFill>
-            </a:ext>
-            <a:ext uri="{91240B29-F687-4F45-9708-019B960494DF}">
-              <a14:hiddenLine xmlns:a14="http://schemas.microsoft.com/office/drawing/2010/main" w="9525">
-                <a:solidFill>
-                  <a:srgbClr val="000000"/>
-                </a:solidFill>
-                <a:miter lim="800000"/>
-                <a:headEnd/>
-                <a:tailEnd/>
-              </a14:hiddenLine>
-            </a:ext>
-          </a:extLst>
-        </p:spPr>
-        <p:txBody>
-          <a:bodyPr/>
-          <a:lstStyle>
-            <a:lvl1pPr>
-              <a:spcBef>
-                <a:spcPct val="30000"/>
-              </a:spcBef>
-              <a:defRPr sz="1200">
-                <a:solidFill>
-                  <a:schemeClr val="tx1"/>
-                </a:solidFill>
-                <a:latin typeface="Calibri" panose="020F0502020204030204" pitchFamily="34" charset="0"/>
-              </a:defRPr>
-            </a:lvl1pPr>
-            <a:lvl2pPr marL="742950" indent="-285750">
-              <a:spcBef>
-                <a:spcPct val="30000"/>
-              </a:spcBef>
-              <a:defRPr sz="1200">
-                <a:solidFill>
-                  <a:schemeClr val="tx1"/>
-                </a:solidFill>
-                <a:latin typeface="Calibri" panose="020F0502020204030204" pitchFamily="34" charset="0"/>
-              </a:defRPr>
-            </a:lvl2pPr>
-            <a:lvl3pPr marL="1143000" indent="-228600">
-              <a:spcBef>
-                <a:spcPct val="30000"/>
-              </a:spcBef>
-              <a:defRPr sz="1200">
-                <a:solidFill>
-                  <a:schemeClr val="tx1"/>
-                </a:solidFill>
-                <a:latin typeface="Calibri" panose="020F0502020204030204" pitchFamily="34" charset="0"/>
-              </a:defRPr>
-            </a:lvl3pPr>
-            <a:lvl4pPr marL="1600200" indent="-228600">
-              <a:spcBef>
-                <a:spcPct val="30000"/>
-              </a:spcBef>
-              <a:defRPr sz="1200">
-                <a:solidFill>
-                  <a:schemeClr val="tx1"/>
-                </a:solidFill>
-                <a:latin typeface="Calibri" panose="020F0502020204030204" pitchFamily="34" charset="0"/>
-              </a:defRPr>
-            </a:lvl4pPr>
-            <a:lvl5pPr marL="2057400" indent="-228600">
-              <a:spcBef>
-                <a:spcPct val="30000"/>
-              </a:spcBef>
-              <a:defRPr sz="1200">
-                <a:solidFill>
-                  <a:schemeClr val="tx1"/>
-                </a:solidFill>
-                <a:latin typeface="Calibri" panose="020F0502020204030204" pitchFamily="34" charset="0"/>
-              </a:defRPr>
-            </a:lvl5pPr>
-            <a:lvl6pPr marL="2514600" indent="-228600" eaLnBrk="0" fontAlgn="base" hangingPunct="0">
-              <a:spcBef>
-                <a:spcPct val="30000"/>
-              </a:spcBef>
-              <a:spcAft>
-                <a:spcPct val="0"/>
-              </a:spcAft>
-              <a:defRPr sz="1200">
-                <a:solidFill>
-                  <a:schemeClr val="tx1"/>
-                </a:solidFill>
-                <a:latin typeface="Calibri" panose="020F0502020204030204" pitchFamily="34" charset="0"/>
-              </a:defRPr>
-            </a:lvl6pPr>
-            <a:lvl7pPr marL="2971800" indent="-228600" eaLnBrk="0" fontAlgn="base" hangingPunct="0">
-              <a:spcBef>
-                <a:spcPct val="30000"/>
-              </a:spcBef>
-              <a:spcAft>
-                <a:spcPct val="0"/>
-              </a:spcAft>
-              <a:defRPr sz="1200">
-                <a:solidFill>
-                  <a:schemeClr val="tx1"/>
-                </a:solidFill>
-                <a:latin typeface="Calibri" panose="020F0502020204030204" pitchFamily="34" charset="0"/>
-              </a:defRPr>
-            </a:lvl7pPr>
-            <a:lvl8pPr marL="3429000" indent="-228600" eaLnBrk="0" fontAlgn="base" hangingPunct="0">
-              <a:spcBef>
-                <a:spcPct val="30000"/>
-              </a:spcBef>
-              <a:spcAft>
-                <a:spcPct val="0"/>
-              </a:spcAft>
-              <a:defRPr sz="1200">
-                <a:solidFill>
-                  <a:schemeClr val="tx1"/>
-                </a:solidFill>
-                <a:latin typeface="Calibri" panose="020F0502020204030204" pitchFamily="34" charset="0"/>
-              </a:defRPr>
-            </a:lvl8pPr>
-            <a:lvl9pPr marL="3886200" indent="-228600" eaLnBrk="0" fontAlgn="base" hangingPunct="0">
-              <a:spcBef>
-                <a:spcPct val="30000"/>
-              </a:spcBef>
-              <a:spcAft>
-                <a:spcPct val="0"/>
-              </a:spcAft>
-              <a:defRPr sz="1200">
-                <a:solidFill>
-                  <a:schemeClr val="tx1"/>
-                </a:solidFill>
-                <a:latin typeface="Calibri" panose="020F0502020204030204" pitchFamily="34" charset="0"/>
-              </a:defRPr>
-            </a:lvl9pPr>
-          </a:lstStyle>
-          <a:p>
-            <a:pPr>
-              <a:spcBef>
-                <a:spcPct val="0"/>
-              </a:spcBef>
-            </a:pPr>
-            <a:fld id="{F29155EF-C699-4304-A819-0F768AA796FD}" type="slidenum">
-              <a:rPr lang="en-US" altLang="en-US"/>
-              <a:pPr>
-                <a:spcBef>
-                  <a:spcPct val="0"/>
-                </a:spcBef>
-              </a:pPr>
-              <a:t>8</a:t>
-            </a:fld>
-            <a:endParaRPr lang="en-US" altLang="en-US"/>
-          </a:p>
-        </p:txBody>
-      </p:sp>
-    </p:spTree>
-    <p:extLst>
-      <p:ext uri="{BB962C8B-B14F-4D97-AF65-F5344CB8AC3E}">
-        <p14:creationId xmlns:p14="http://schemas.microsoft.com/office/powerpoint/2010/main" val="3144302244"/>
+        <p14:creationId xmlns:p14="http://schemas.microsoft.com/office/powerpoint/2010/main" val="4174779047"/>
       </p:ext>
     </p:extLst>
   </p:cSld>
@@ -3229,7 +3139,7 @@
               <a:pPr>
                 <a:defRPr/>
               </a:pPr>
-              <a:t>9</a:t>
+              <a:t>10</a:t>
             </a:fld>
             <a:endParaRPr lang="en-US" altLang="en-US"/>
           </a:p>
@@ -3238,7 +3148,7 @@
     </p:spTree>
     <p:extLst>
       <p:ext uri="{BB962C8B-B14F-4D97-AF65-F5344CB8AC3E}">
-        <p14:creationId xmlns:p14="http://schemas.microsoft.com/office/powerpoint/2010/main" val="4174779047"/>
+        <p14:creationId xmlns:p14="http://schemas.microsoft.com/office/powerpoint/2010/main" val="2796443454"/>
       </p:ext>
     </p:extLst>
   </p:cSld>
@@ -3319,7 +3229,7 @@
               <a:pPr>
                 <a:defRPr/>
               </a:pPr>
-              <a:t>10</a:t>
+              <a:t>13</a:t>
             </a:fld>
             <a:endParaRPr lang="en-US" altLang="en-US"/>
           </a:p>
@@ -3328,7 +3238,7 @@
     </p:spTree>
     <p:extLst>
       <p:ext uri="{BB962C8B-B14F-4D97-AF65-F5344CB8AC3E}">
-        <p14:creationId xmlns:p14="http://schemas.microsoft.com/office/powerpoint/2010/main" val="2796443454"/>
+        <p14:creationId xmlns:p14="http://schemas.microsoft.com/office/powerpoint/2010/main" val="3451925870"/>
       </p:ext>
     </p:extLst>
   </p:cSld>
@@ -3409,7 +3319,7 @@
               <a:pPr>
                 <a:defRPr/>
               </a:pPr>
-              <a:t>13</a:t>
+              <a:t>16</a:t>
             </a:fld>
             <a:endParaRPr lang="en-US" altLang="en-US"/>
           </a:p>
@@ -3418,7 +3328,7 @@
     </p:spTree>
     <p:extLst>
       <p:ext uri="{BB962C8B-B14F-4D97-AF65-F5344CB8AC3E}">
-        <p14:creationId xmlns:p14="http://schemas.microsoft.com/office/powerpoint/2010/main" val="3451925870"/>
+        <p14:creationId xmlns:p14="http://schemas.microsoft.com/office/powerpoint/2010/main" val="3839478787"/>
       </p:ext>
     </p:extLst>
   </p:cSld>
@@ -3499,7 +3409,7 @@
               <a:pPr>
                 <a:defRPr/>
               </a:pPr>
-              <a:t>16</a:t>
+              <a:t>17</a:t>
             </a:fld>
             <a:endParaRPr lang="en-US" altLang="en-US"/>
           </a:p>
@@ -3508,7 +3418,7 @@
     </p:spTree>
     <p:extLst>
       <p:ext uri="{BB962C8B-B14F-4D97-AF65-F5344CB8AC3E}">
-        <p14:creationId xmlns:p14="http://schemas.microsoft.com/office/powerpoint/2010/main" val="3839478787"/>
+        <p14:creationId xmlns:p14="http://schemas.microsoft.com/office/powerpoint/2010/main" val="2382447883"/>
       </p:ext>
     </p:extLst>
   </p:cSld>
@@ -3657,7 +3567,7 @@
               <a:pPr>
                 <a:defRPr/>
               </a:pPr>
-              <a:t>9/4/2019</a:t>
+              <a:t>12/6/19</a:t>
             </a:fld>
             <a:endParaRPr lang="en-US"/>
           </a:p>
@@ -3852,7 +3762,7 @@
               <a:pPr>
                 <a:defRPr/>
               </a:pPr>
-              <a:t>9/4/2019</a:t>
+              <a:t>12/6/19</a:t>
             </a:fld>
             <a:endParaRPr lang="en-US"/>
           </a:p>
@@ -4057,7 +3967,7 @@
               <a:pPr>
                 <a:defRPr/>
               </a:pPr>
-              <a:t>9/4/2019</a:t>
+              <a:t>12/6/19</a:t>
             </a:fld>
             <a:endParaRPr lang="en-US"/>
           </a:p>
@@ -4252,7 +4162,7 @@
               <a:pPr>
                 <a:defRPr/>
               </a:pPr>
-              <a:t>9/4/2019</a:t>
+              <a:t>12/6/19</a:t>
             </a:fld>
             <a:endParaRPr lang="en-US"/>
           </a:p>
@@ -4524,7 +4434,7 @@
               <a:pPr>
                 <a:defRPr/>
               </a:pPr>
-              <a:t>9/4/2019</a:t>
+              <a:t>12/6/19</a:t>
             </a:fld>
             <a:endParaRPr lang="en-US"/>
           </a:p>
@@ -4780,7 +4690,7 @@
               <a:pPr>
                 <a:defRPr/>
               </a:pPr>
-              <a:t>9/4/2019</a:t>
+              <a:t>12/6/19</a:t>
             </a:fld>
             <a:endParaRPr lang="en-US"/>
           </a:p>
@@ -5171,7 +5081,7 @@
               <a:pPr>
                 <a:defRPr/>
               </a:pPr>
-              <a:t>9/4/2019</a:t>
+              <a:t>12/6/19</a:t>
             </a:fld>
             <a:endParaRPr lang="en-US"/>
           </a:p>
@@ -5315,7 +5225,7 @@
               <a:pPr>
                 <a:defRPr/>
               </a:pPr>
-              <a:t>9/4/2019</a:t>
+              <a:t>12/6/19</a:t>
             </a:fld>
             <a:endParaRPr lang="en-US"/>
           </a:p>
@@ -5437,7 +5347,7 @@
               <a:pPr>
                 <a:defRPr/>
               </a:pPr>
-              <a:t>9/4/2019</a:t>
+              <a:t>12/6/19</a:t>
             </a:fld>
             <a:endParaRPr lang="en-US"/>
           </a:p>
@@ -5739,7 +5649,7 @@
               <a:pPr>
                 <a:defRPr/>
               </a:pPr>
-              <a:t>9/4/2019</a:t>
+              <a:t>12/6/19</a:t>
             </a:fld>
             <a:endParaRPr lang="en-US"/>
           </a:p>
@@ -6021,7 +5931,7 @@
               <a:pPr>
                 <a:defRPr/>
               </a:pPr>
-              <a:t>9/4/2019</a:t>
+              <a:t>12/6/19</a:t>
             </a:fld>
             <a:endParaRPr lang="en-US"/>
           </a:p>
@@ -6317,7 +6227,7 @@
               <a:pPr>
                 <a:defRPr/>
               </a:pPr>
-              <a:t>9/4/2019</a:t>
+              <a:t>12/6/19</a:t>
             </a:fld>
             <a:endParaRPr lang="en-US"/>
           </a:p>
@@ -7123,8 +7033,8 @@
         </p:nvSpPr>
         <p:spPr>
           <a:xfrm>
-            <a:off x="1190625" y="2030413"/>
-            <a:ext cx="9810750" cy="3786187"/>
+            <a:off x="638630" y="2030413"/>
+            <a:ext cx="10943770" cy="4154984"/>
           </a:xfrm>
           <a:prstGeom prst="rect">
             <a:avLst/>
@@ -7132,7 +7042,7 @@
           <a:noFill/>
         </p:spPr>
         <p:txBody>
-          <a:bodyPr>
+          <a:bodyPr wrap="square">
             <a:spAutoFit/>
           </a:bodyPr>
           <a:lstStyle/>
@@ -7254,15 +7164,19 @@
                 <a:latin typeface="+mn-lt"/>
                 <a:cs typeface="+mn-cs"/>
               </a:rPr>
-              <a:t>	Last updated:			04 September </a:t>
-            </a:r>
-            <a:r>
-              <a:rPr lang="en-US" sz="2400" dirty="0" smtClean="0">
-                <a:latin typeface="+mn-lt"/>
-                <a:cs typeface="+mn-cs"/>
-              </a:rPr>
-              <a:t>2019</a:t>
-            </a:r>
+              <a:t>	Last updated:			04 September 2019</a:t>
+            </a:r>
+          </a:p>
+          <a:p>
+            <a:pPr eaLnBrk="1" fontAlgn="auto" hangingPunct="1">
+              <a:spcBef>
+                <a:spcPts val="0"/>
+              </a:spcBef>
+              <a:spcAft>
+                <a:spcPts val="0"/>
+              </a:spcAft>
+              <a:defRPr/>
+            </a:pPr>
             <a:endParaRPr lang="en-US" sz="2400" dirty="0">
               <a:latin typeface="+mn-lt"/>
               <a:cs typeface="+mn-cs"/>
@@ -7278,28 +7192,36 @@
               </a:spcAft>
               <a:defRPr/>
             </a:pPr>
+            <a:r>
+              <a:rPr lang="en-US" sz="2400" dirty="0">
+                <a:latin typeface="+mn-lt"/>
+                <a:cs typeface="+mn-cs"/>
+              </a:rPr>
+              <a:t>	LDAS git tag:			v17.8.0</a:t>
+            </a:r>
+            <a:br>
+              <a:rPr lang="en-US" sz="2400" dirty="0">
+                <a:latin typeface="+mn-lt"/>
+                <a:cs typeface="+mn-cs"/>
+              </a:rPr>
+            </a:br>
+            <a:r>
+              <a:rPr lang="en-US" sz="2400" dirty="0">
+                <a:latin typeface="+mn-lt"/>
+                <a:cs typeface="+mn-cs"/>
+              </a:rPr>
+              <a:t>					</a:t>
+            </a:r>
+            <a:r>
+              <a:rPr lang="en-US" sz="2400" dirty="0">
+                <a:hlinkClick r:id="rId3"/>
+              </a:rPr>
+              <a:t>github.com/GEOS-ESM/GEOSldas/releases</a:t>
+            </a:r>
             <a:endParaRPr lang="en-US" sz="2400" dirty="0">
               <a:latin typeface="+mn-lt"/>
               <a:cs typeface="+mn-cs"/>
             </a:endParaRPr>
-          </a:p>
-          <a:p>
-            <a:pPr eaLnBrk="1" fontAlgn="auto" hangingPunct="1">
-              <a:spcBef>
-                <a:spcPts val="0"/>
-              </a:spcBef>
-              <a:spcAft>
-                <a:spcPts val="0"/>
-              </a:spcAft>
-              <a:defRPr/>
-            </a:pPr>
-            <a:r>
-              <a:rPr lang="en-US" sz="2400" dirty="0">
-                <a:latin typeface="+mn-lt"/>
-                <a:cs typeface="+mn-cs"/>
-              </a:rPr>
-              <a:t>	LDAS tag:			GEOSldas_m4-17_7</a:t>
-            </a:r>
           </a:p>
           <a:p>
             <a:pPr eaLnBrk="1" fontAlgn="auto" hangingPunct="1">
@@ -7423,7 +7345,7 @@
           <p:cNvPr id="4" name="TextBox 1">
             <a:extLst>
               <a:ext uri="{FF2B5EF4-FFF2-40B4-BE49-F238E27FC236}">
-                <a16:creationId xmlns:a16="http://schemas.microsoft.com/office/drawing/2014/main" xmlns="" id="{43C050FF-2175-F049-90DF-CD37C29079FF}"/>
+                <a16:creationId xmlns:a16="http://schemas.microsoft.com/office/drawing/2014/main" id="{43C050FF-2175-F049-90DF-CD37C29079FF}"/>
               </a:ext>
             </a:extLst>
           </p:cNvPr>
@@ -7613,7 +7535,7 @@
           <p:cNvPr id="2" name="Rectangle 1">
             <a:extLst>
               <a:ext uri="{FF2B5EF4-FFF2-40B4-BE49-F238E27FC236}">
-                <a16:creationId xmlns:a16="http://schemas.microsoft.com/office/drawing/2014/main" xmlns="" id="{3039D0B7-AA59-FD4D-94F0-07C79BB8E8C9}"/>
+                <a16:creationId xmlns:a16="http://schemas.microsoft.com/office/drawing/2014/main" id="{3039D0B7-AA59-FD4D-94F0-07C79BB8E8C9}"/>
               </a:ext>
             </a:extLst>
           </p:cNvPr>
@@ -8885,7 +8807,7 @@
           <p:cNvPr id="4" name="TextBox 1">
             <a:extLst>
               <a:ext uri="{FF2B5EF4-FFF2-40B4-BE49-F238E27FC236}">
-                <a16:creationId xmlns:a16="http://schemas.microsoft.com/office/drawing/2014/main" xmlns="" id="{0A2C1B91-AD52-3446-BE33-E91F8B83086D}"/>
+                <a16:creationId xmlns:a16="http://schemas.microsoft.com/office/drawing/2014/main" id="{0A2C1B91-AD52-3446-BE33-E91F8B83086D}"/>
               </a:ext>
             </a:extLst>
           </p:cNvPr>
@@ -9773,7 +9695,7 @@
           <p:cNvPr id="4" name="TextBox 1">
             <a:extLst>
               <a:ext uri="{FF2B5EF4-FFF2-40B4-BE49-F238E27FC236}">
-                <a16:creationId xmlns:a16="http://schemas.microsoft.com/office/drawing/2014/main" xmlns="" id="{BC67E993-F431-2349-9828-19CB4C4AC14C}"/>
+                <a16:creationId xmlns:a16="http://schemas.microsoft.com/office/drawing/2014/main" id="{BC67E993-F431-2349-9828-19CB4C4AC14C}"/>
               </a:ext>
             </a:extLst>
           </p:cNvPr>
@@ -10574,7 +10496,7 @@
           <p:cNvPr id="4" name="TextBox 1">
             <a:extLst>
               <a:ext uri="{FF2B5EF4-FFF2-40B4-BE49-F238E27FC236}">
-                <a16:creationId xmlns:a16="http://schemas.microsoft.com/office/drawing/2014/main" xmlns="" id="{BC67E993-F431-2349-9828-19CB4C4AC14C}"/>
+                <a16:creationId xmlns:a16="http://schemas.microsoft.com/office/drawing/2014/main" id="{BC67E993-F431-2349-9828-19CB4C4AC14C}"/>
               </a:ext>
             </a:extLst>
           </p:cNvPr>
@@ -11509,7 +11431,7 @@
           <p:cNvPr id="4" name="TextBox 1">
             <a:extLst>
               <a:ext uri="{FF2B5EF4-FFF2-40B4-BE49-F238E27FC236}">
-                <a16:creationId xmlns:a16="http://schemas.microsoft.com/office/drawing/2014/main" xmlns="" id="{BC67E993-F431-2349-9828-19CB4C4AC14C}"/>
+                <a16:creationId xmlns:a16="http://schemas.microsoft.com/office/drawing/2014/main" id="{BC67E993-F431-2349-9828-19CB4C4AC14C}"/>
               </a:ext>
             </a:extLst>
           </p:cNvPr>
@@ -12352,7 +12274,7 @@
           <p:cNvPr id="4" name="TextBox 1">
             <a:extLst>
               <a:ext uri="{FF2B5EF4-FFF2-40B4-BE49-F238E27FC236}">
-                <a16:creationId xmlns:a16="http://schemas.microsoft.com/office/drawing/2014/main" xmlns="" id="{66EA72C2-1A7B-3241-9DCF-B26B9EA656CE}"/>
+                <a16:creationId xmlns:a16="http://schemas.microsoft.com/office/drawing/2014/main" id="{66EA72C2-1A7B-3241-9DCF-B26B9EA656CE}"/>
               </a:ext>
             </a:extLst>
           </p:cNvPr>
@@ -13246,7 +13168,7 @@
           <p:cNvPr id="4" name="TextBox 1">
             <a:extLst>
               <a:ext uri="{FF2B5EF4-FFF2-40B4-BE49-F238E27FC236}">
-                <a16:creationId xmlns:a16="http://schemas.microsoft.com/office/drawing/2014/main" xmlns="" id="{EA6833A0-6FF5-4144-B32D-E90F9C12D26E}"/>
+                <a16:creationId xmlns:a16="http://schemas.microsoft.com/office/drawing/2014/main" id="{EA6833A0-6FF5-4144-B32D-E90F9C12D26E}"/>
               </a:ext>
             </a:extLst>
           </p:cNvPr>
@@ -14188,7 +14110,7 @@
           <p:cNvPr id="6" name="TextBox 1">
             <a:extLst>
               <a:ext uri="{FF2B5EF4-FFF2-40B4-BE49-F238E27FC236}">
-                <a16:creationId xmlns:a16="http://schemas.microsoft.com/office/drawing/2014/main" xmlns="" id="{7FC34D51-735D-584B-862E-1A081F2B9EF9}"/>
+                <a16:creationId xmlns:a16="http://schemas.microsoft.com/office/drawing/2014/main" id="{7FC34D51-735D-584B-862E-1A081F2B9EF9}"/>
               </a:ext>
             </a:extLst>
           </p:cNvPr>
@@ -14378,7 +14300,7 @@
           <p:cNvPr id="4" name="CustomShape 3">
             <a:extLst>
               <a:ext uri="{FF2B5EF4-FFF2-40B4-BE49-F238E27FC236}">
-                <a16:creationId xmlns:a16="http://schemas.microsoft.com/office/drawing/2014/main" xmlns="" id="{35383346-C420-A848-8F58-377AA545A618}"/>
+                <a16:creationId xmlns:a16="http://schemas.microsoft.com/office/drawing/2014/main" id="{35383346-C420-A848-8F58-377AA545A618}"/>
               </a:ext>
             </a:extLst>
           </p:cNvPr>
@@ -14529,7 +14451,7 @@
           <p:cNvPr id="3" name="Straight Arrow Connector 2">
             <a:extLst>
               <a:ext uri="{FF2B5EF4-FFF2-40B4-BE49-F238E27FC236}">
-                <a16:creationId xmlns:a16="http://schemas.microsoft.com/office/drawing/2014/main" xmlns="" id="{B8552650-82DD-4847-85C5-D1578CE3985F}"/>
+                <a16:creationId xmlns:a16="http://schemas.microsoft.com/office/drawing/2014/main" id="{B8552650-82DD-4847-85C5-D1578CE3985F}"/>
               </a:ext>
             </a:extLst>
           </p:cNvPr>
@@ -29362,35 +29284,35 @@
                 <a:gridCol w="896458">
                   <a:extLst>
                     <a:ext uri="{9D8B030D-6E8A-4147-A177-3AD203B41FA5}">
-                      <a16:colId xmlns:a16="http://schemas.microsoft.com/office/drawing/2014/main" xmlns="" val="20000"/>
+                      <a16:colId xmlns:a16="http://schemas.microsoft.com/office/drawing/2014/main" val="20000"/>
                     </a:ext>
                   </a:extLst>
                 </a:gridCol>
                 <a:gridCol w="1816924">
                   <a:extLst>
                     <a:ext uri="{9D8B030D-6E8A-4147-A177-3AD203B41FA5}">
-                      <a16:colId xmlns:a16="http://schemas.microsoft.com/office/drawing/2014/main" xmlns="" val="20001"/>
+                      <a16:colId xmlns:a16="http://schemas.microsoft.com/office/drawing/2014/main" val="20001"/>
                     </a:ext>
                   </a:extLst>
                 </a:gridCol>
                 <a:gridCol w="1353787">
                   <a:extLst>
                     <a:ext uri="{9D8B030D-6E8A-4147-A177-3AD203B41FA5}">
-                      <a16:colId xmlns:a16="http://schemas.microsoft.com/office/drawing/2014/main" xmlns="" val="20002"/>
+                      <a16:colId xmlns:a16="http://schemas.microsoft.com/office/drawing/2014/main" val="20002"/>
                     </a:ext>
                   </a:extLst>
                 </a:gridCol>
                 <a:gridCol w="1104406">
                   <a:extLst>
                     <a:ext uri="{9D8B030D-6E8A-4147-A177-3AD203B41FA5}">
-                      <a16:colId xmlns:a16="http://schemas.microsoft.com/office/drawing/2014/main" xmlns="" val="20003"/>
+                      <a16:colId xmlns:a16="http://schemas.microsoft.com/office/drawing/2014/main" val="20003"/>
                     </a:ext>
                   </a:extLst>
                 </a:gridCol>
                 <a:gridCol w="5964599">
                   <a:extLst>
                     <a:ext uri="{9D8B030D-6E8A-4147-A177-3AD203B41FA5}">
-                      <a16:colId xmlns:a16="http://schemas.microsoft.com/office/drawing/2014/main" xmlns="" val="20004"/>
+                      <a16:colId xmlns:a16="http://schemas.microsoft.com/office/drawing/2014/main" val="20004"/>
                     </a:ext>
                   </a:extLst>
                 </a:gridCol>
@@ -29474,7 +29396,7 @@
                 </a:tc>
                 <a:extLst>
                   <a:ext uri="{0D108BD9-81ED-4DB2-BD59-A6C34878D82A}">
-                    <a16:rowId xmlns:a16="http://schemas.microsoft.com/office/drawing/2014/main" xmlns="" val="10000"/>
+                    <a16:rowId xmlns:a16="http://schemas.microsoft.com/office/drawing/2014/main" val="10000"/>
                   </a:ext>
                 </a:extLst>
               </a:tr>
@@ -29737,7 +29659,7 @@
                 </a:tc>
                 <a:extLst>
                   <a:ext uri="{0D108BD9-81ED-4DB2-BD59-A6C34878D82A}">
-                    <a16:rowId xmlns:a16="http://schemas.microsoft.com/office/drawing/2014/main" xmlns="" val="10001"/>
+                    <a16:rowId xmlns:a16="http://schemas.microsoft.com/office/drawing/2014/main" val="10001"/>
                   </a:ext>
                 </a:extLst>
               </a:tr>
@@ -29986,7 +29908,7 @@
                 </a:tc>
                 <a:extLst>
                   <a:ext uri="{0D108BD9-81ED-4DB2-BD59-A6C34878D82A}">
-                    <a16:rowId xmlns:a16="http://schemas.microsoft.com/office/drawing/2014/main" xmlns="" val="10002"/>
+                    <a16:rowId xmlns:a16="http://schemas.microsoft.com/office/drawing/2014/main" val="10002"/>
                   </a:ext>
                 </a:extLst>
               </a:tr>
@@ -30653,7 +30575,7 @@
         <p:spPr bwMode="auto">
           <a:xfrm>
             <a:off x="992187" y="762000"/>
-            <a:ext cx="10207625" cy="5632311"/>
+            <a:ext cx="10207625" cy="6001643"/>
           </a:xfrm>
           <a:prstGeom prst="rect">
             <a:avLst/>
@@ -30929,24 +30851,81 @@
               <a:spcBef>
                 <a:spcPct val="0"/>
               </a:spcBef>
+              <a:buFontTx/>
               <a:buNone/>
             </a:pPr>
             <a:r>
               <a:rPr lang="en-US" altLang="en-US" sz="2400" dirty="0"/>
-              <a:t>The CVS tag </a:t>
-            </a:r>
-            <a:r>
-              <a:rPr lang="en-US" altLang="en-US" sz="2400" b="1" dirty="0">
-                <a:latin typeface="Courier New" panose="02070309020205020404" pitchFamily="49" charset="0"/>
-                <a:cs typeface="Courier New" panose="02070309020205020404" pitchFamily="49" charset="0"/>
-              </a:rPr>
-              <a:t>GEOSldas_m4-17_7</a:t>
+              <a:t>In late 2019, </a:t>
+            </a:r>
+            <a:r>
+              <a:rPr lang="en-US" altLang="en-US" sz="2400" dirty="0" err="1"/>
+              <a:t>GEOSldas</a:t>
+            </a:r>
+            <a:r>
+              <a:rPr lang="en-US" altLang="en-US" sz="2400" dirty="0"/>
+              <a:t> version control transitioned from CVS to Git. The Git tag </a:t>
+            </a:r>
+            <a:r>
+              <a:rPr lang="en-US" altLang="en-US" sz="2400" b="1" dirty="0"/>
+              <a:t>v17.8.0 </a:t>
+            </a:r>
+            <a:r>
+              <a:rPr lang="en-US" altLang="en-US" sz="2400" dirty="0"/>
+              <a:t> is the close scientific equivalent the </a:t>
+            </a:r>
+            <a:r>
+              <a:rPr lang="en-US" altLang="en-US" sz="2400" dirty="0" err="1"/>
+              <a:t>LDASsa</a:t>
+            </a:r>
+            <a:r>
+              <a:rPr lang="en-US" altLang="en-US" sz="2400" dirty="0"/>
+              <a:t> CVS tag </a:t>
+            </a:r>
+            <a:r>
+              <a:rPr lang="en-US" altLang="en-US" sz="2400" b="1" dirty="0"/>
+              <a:t>LDASsa_m3-16_6_p2 </a:t>
             </a:r>
             <a:r>
               <a:rPr lang="en-US" altLang="en-US" sz="2400" dirty="0">
                 <a:cs typeface="Courier New" panose="02070309020205020404" pitchFamily="49" charset="0"/>
               </a:rPr>
-              <a:t> includes model components for Catchment and </a:t>
+              <a:t>(used to generate the Version 4 SMAP L4_SM product),</a:t>
+            </a:r>
+            <a:endParaRPr lang="en-US" altLang="en-US" sz="2400" dirty="0"/>
+          </a:p>
+          <a:p>
+            <a:pPr eaLnBrk="1" hangingPunct="1">
+              <a:lnSpc>
+                <a:spcPct val="100000"/>
+              </a:lnSpc>
+              <a:spcBef>
+                <a:spcPct val="0"/>
+              </a:spcBef>
+              <a:buFontTx/>
+              <a:buNone/>
+            </a:pPr>
+            <a:endParaRPr lang="en-US" altLang="en-US" sz="2400" dirty="0"/>
+          </a:p>
+          <a:p>
+            <a:pPr eaLnBrk="1" hangingPunct="1">
+              <a:lnSpc>
+                <a:spcPct val="100000"/>
+              </a:lnSpc>
+              <a:spcBef>
+                <a:spcPct val="0"/>
+              </a:spcBef>
+              <a:buNone/>
+            </a:pPr>
+            <a:r>
+              <a:rPr lang="en-US" altLang="en-US" sz="2400" dirty="0"/>
+              <a:t>It </a:t>
+            </a:r>
+            <a:r>
+              <a:rPr lang="en-US" altLang="en-US" sz="2400" dirty="0">
+                <a:cs typeface="Courier New" panose="02070309020205020404" pitchFamily="49" charset="0"/>
+              </a:rPr>
+              <a:t>includes model components for Catchment and </a:t>
             </a:r>
             <a:r>
               <a:rPr lang="en-US" altLang="en-US" sz="2400" dirty="0" err="1">
@@ -30958,26 +30937,7 @@
               <a:rPr lang="en-US" altLang="en-US" sz="2400" dirty="0">
                 <a:cs typeface="Courier New" panose="02070309020205020404" pitchFamily="49" charset="0"/>
               </a:rPr>
-              <a:t>.  It also includes assimilation components for Catchment.  The science version is the equivalent of the </a:t>
-            </a:r>
-            <a:r>
-              <a:rPr lang="en-US" sz="2400" b="1" dirty="0">
-                <a:latin typeface="Courier New" panose="02070309020205020404" pitchFamily="49" charset="0"/>
-                <a:cs typeface="Courier New" panose="02070309020205020404" pitchFamily="49" charset="0"/>
-              </a:rPr>
-              <a:t>reichle-LDASsa_m3-16_6_p1 </a:t>
-            </a:r>
-            <a:r>
-              <a:rPr lang="en-US" altLang="en-US" sz="2400" dirty="0" err="1">
-                <a:cs typeface="Courier New" panose="02070309020205020404" pitchFamily="49" charset="0"/>
-              </a:rPr>
-              <a:t>LDASsa</a:t>
-            </a:r>
-            <a:r>
-              <a:rPr lang="en-US" altLang="en-US" sz="2400" dirty="0">
-                <a:cs typeface="Courier New" panose="02070309020205020404" pitchFamily="49" charset="0"/>
-              </a:rPr>
-              <a:t> tag (used to generate the Version 4 SMAP L4_SM product).  New configuration parameters (LAND_PARAMS) replace the LAND_UPD compiler flag (see below).  </a:t>
+              <a:t>.  It also includes assimilation components for Catchment.</a:t>
             </a:r>
           </a:p>
           <a:p>
@@ -31006,7 +30966,7 @@
             </a:pPr>
             <a:r>
               <a:rPr lang="en-US" altLang="en-US" sz="2400" dirty="0"/>
-              <a:t>History of recent stable tags: 		</a:t>
+              <a:t>History of previous CVS tags: 		</a:t>
             </a:r>
             <a:r>
               <a:rPr lang="en-US" altLang="en-US" sz="2400" b="1" dirty="0">
@@ -31061,6 +31021,18 @@
               </a:rPr>
               <a:t>					GEOSldas_m4-17_0</a:t>
             </a:r>
+            <a:endParaRPr lang="en-US" altLang="en-US" sz="2400" dirty="0"/>
+          </a:p>
+          <a:p>
+            <a:pPr eaLnBrk="1" hangingPunct="1">
+              <a:lnSpc>
+                <a:spcPct val="100000"/>
+              </a:lnSpc>
+              <a:spcBef>
+                <a:spcPct val="0"/>
+              </a:spcBef>
+              <a:buNone/>
+            </a:pPr>
             <a:endParaRPr lang="en-US" altLang="en-US" sz="2400" dirty="0"/>
           </a:p>
         </p:txBody>
@@ -31550,52 +31522,32 @@
                 <a:ea typeface="Courier New" charset="0"/>
                 <a:cs typeface="Courier New" charset="0"/>
               </a:rPr>
-              <a:t>Don’t forget to make clean first</a:t>
-            </a:r>
-            <a:r>
-              <a:rPr lang="is-IS" altLang="en-US" sz="2000" dirty="0" smtClean="0">
+              <a:t>Don’t forget to make clean first.</a:t>
+            </a:r>
+          </a:p>
+          <a:p>
+            <a:pPr lvl="1" eaLnBrk="1" hangingPunct="1">
+              <a:lnSpc>
+                <a:spcPct val="100000"/>
+              </a:lnSpc>
+              <a:spcBef>
+                <a:spcPct val="0"/>
+              </a:spcBef>
+              <a:buNone/>
+            </a:pPr>
+            <a:r>
+              <a:rPr lang="is-IS" altLang="en-US" sz="2000" dirty="0">
                 <a:latin typeface="+mn-lt"/>
                 <a:ea typeface="Courier New" charset="0"/>
                 <a:cs typeface="Courier New" charset="0"/>
               </a:rPr>
-              <a:t>.</a:t>
-            </a:r>
-          </a:p>
-          <a:p>
-            <a:pPr lvl="1" eaLnBrk="1" hangingPunct="1">
-              <a:lnSpc>
-                <a:spcPct val="100000"/>
-              </a:lnSpc>
-              <a:spcBef>
-                <a:spcPct val="0"/>
-              </a:spcBef>
-              <a:buNone/>
-            </a:pPr>
-            <a:r>
-              <a:rPr lang="is-IS" altLang="en-US" sz="2000" dirty="0" smtClean="0">
-                <a:latin typeface="+mn-lt"/>
-                <a:ea typeface="Courier New" charset="0"/>
-                <a:cs typeface="Courier New" charset="0"/>
-              </a:rPr>
               <a:t>Parallel_build can also build with bdubbign flags, build in </a:t>
             </a:r>
             <a:r>
               <a:rPr lang="en-US" sz="2000" dirty="0"/>
-              <a:t>build-Debug/</a:t>
-            </a:r>
-            <a:r>
-              <a:rPr lang="en-US" sz="2000" dirty="0"/>
-              <a:t> and install into </a:t>
-            </a:r>
-            <a:r>
-              <a:rPr lang="en-US" sz="2000" dirty="0"/>
-              <a:t>install-Debug</a:t>
-            </a:r>
-            <a:r>
-              <a:rPr lang="en-US" sz="2000" dirty="0" smtClean="0"/>
-              <a:t>/: </a:t>
-            </a:r>
-            <a:endParaRPr lang="is-IS" altLang="en-US" sz="2000" dirty="0" smtClean="0">
+              <a:t>build-Debug/ and install into install-Debug/: </a:t>
+            </a:r>
+            <a:endParaRPr lang="is-IS" altLang="en-US" sz="2000" dirty="0">
               <a:latin typeface="+mn-lt"/>
               <a:ea typeface="Courier New" charset="0"/>
               <a:cs typeface="Courier New" charset="0"/>
@@ -31619,11 +31571,6 @@
               </a:rPr>
               <a:t>parallel_build.csh -debug</a:t>
             </a:r>
-            <a:endParaRPr lang="is-IS" altLang="en-US" sz="2000" dirty="0">
-              <a:latin typeface="Courier New" pitchFamily="49" charset="0"/>
-              <a:ea typeface="Courier New" charset="0"/>
-              <a:cs typeface="Courier New" pitchFamily="49" charset="0"/>
-            </a:endParaRPr>
           </a:p>
           <a:p>
             <a:pPr lvl="1" eaLnBrk="1" hangingPunct="1">
@@ -33214,35 +33161,7 @@
                 </a:uFill>
                 <a:latin typeface="Courier New"/>
               </a:rPr>
-              <a:t>	</a:t>
-            </a:r>
-            <a:r>
-              <a:rPr lang="en-US" sz="1400" spc="-1" dirty="0" smtClean="0">
-                <a:solidFill>
-                  <a:srgbClr val="000000"/>
-                </a:solidFill>
-                <a:uFill>
-                  <a:solidFill>
-                    <a:srgbClr val="FFFFFF"/>
-                  </a:solidFill>
-                </a:uFill>
-                <a:latin typeface="Courier New"/>
-              </a:rPr>
-              <a:t>/</a:t>
-            </a:r>
-            <a:r>
-              <a:rPr lang="en-US" sz="1400" spc="-1" dirty="0">
-                <a:solidFill>
-                  <a:srgbClr val="000000"/>
-                </a:solidFill>
-                <a:uFill>
-                  <a:solidFill>
-                    <a:srgbClr val="FFFFFF"/>
-                  </a:solidFill>
-                </a:uFill>
-                <a:latin typeface="Courier New"/>
-              </a:rPr>
-              <a:t>discover/</a:t>
+              <a:t>	/discover/</a:t>
             </a:r>
             <a:r>
               <a:rPr lang="en-US" sz="1400" spc="-1" dirty="0" err="1">
@@ -34068,7 +33987,7 @@
           <p:cNvPr id="4" name="TextBox 1">
             <a:extLst>
               <a:ext uri="{FF2B5EF4-FFF2-40B4-BE49-F238E27FC236}">
-                <a16:creationId xmlns:a16="http://schemas.microsoft.com/office/drawing/2014/main" xmlns="" id="{830FC3A9-D4AF-6C47-B748-91F5977224E9}"/>
+                <a16:creationId xmlns:a16="http://schemas.microsoft.com/office/drawing/2014/main" id="{830FC3A9-D4AF-6C47-B748-91F5977224E9}"/>
               </a:ext>
             </a:extLst>
           </p:cNvPr>
@@ -34313,21 +34232,21 @@
                 <a:gridCol w="5357879">
                   <a:extLst>
                     <a:ext uri="{9D8B030D-6E8A-4147-A177-3AD203B41FA5}">
-                      <a16:colId xmlns:a16="http://schemas.microsoft.com/office/drawing/2014/main" xmlns="" val="20000"/>
+                      <a16:colId xmlns:a16="http://schemas.microsoft.com/office/drawing/2014/main" val="20000"/>
                     </a:ext>
                   </a:extLst>
                 </a:gridCol>
                 <a:gridCol w="1662115">
                   <a:extLst>
                     <a:ext uri="{9D8B030D-6E8A-4147-A177-3AD203B41FA5}">
-                      <a16:colId xmlns:a16="http://schemas.microsoft.com/office/drawing/2014/main" xmlns="" val="20001"/>
+                      <a16:colId xmlns:a16="http://schemas.microsoft.com/office/drawing/2014/main" val="20001"/>
                     </a:ext>
                   </a:extLst>
                 </a:gridCol>
                 <a:gridCol w="1857660">
                   <a:extLst>
                     <a:ext uri="{9D8B030D-6E8A-4147-A177-3AD203B41FA5}">
-                      <a16:colId xmlns:a16="http://schemas.microsoft.com/office/drawing/2014/main" xmlns="" val="20002"/>
+                      <a16:colId xmlns:a16="http://schemas.microsoft.com/office/drawing/2014/main" val="20002"/>
                     </a:ext>
                   </a:extLst>
                 </a:gridCol>
@@ -34376,7 +34295,7 @@
                 </a:tc>
                 <a:extLst>
                   <a:ext uri="{0D108BD9-81ED-4DB2-BD59-A6C34878D82A}">
-                    <a16:rowId xmlns:a16="http://schemas.microsoft.com/office/drawing/2014/main" xmlns="" val="10000"/>
+                    <a16:rowId xmlns:a16="http://schemas.microsoft.com/office/drawing/2014/main" val="10000"/>
                   </a:ext>
                 </a:extLst>
               </a:tr>
@@ -34433,7 +34352,7 @@
                 </a:tc>
                 <a:extLst>
                   <a:ext uri="{0D108BD9-81ED-4DB2-BD59-A6C34878D82A}">
-                    <a16:rowId xmlns:a16="http://schemas.microsoft.com/office/drawing/2014/main" xmlns="" val="10001"/>
+                    <a16:rowId xmlns:a16="http://schemas.microsoft.com/office/drawing/2014/main" val="10001"/>
                   </a:ext>
                 </a:extLst>
               </a:tr>
@@ -34495,7 +34414,7 @@
                 </a:tc>
                 <a:extLst>
                   <a:ext uri="{0D108BD9-81ED-4DB2-BD59-A6C34878D82A}">
-                    <a16:rowId xmlns:a16="http://schemas.microsoft.com/office/drawing/2014/main" xmlns="" val="10002"/>
+                    <a16:rowId xmlns:a16="http://schemas.microsoft.com/office/drawing/2014/main" val="10002"/>
                   </a:ext>
                 </a:extLst>
               </a:tr>
@@ -34546,7 +34465,7 @@
                 </a:tc>
                 <a:extLst>
                   <a:ext uri="{0D108BD9-81ED-4DB2-BD59-A6C34878D82A}">
-                    <a16:rowId xmlns:a16="http://schemas.microsoft.com/office/drawing/2014/main" xmlns="" val="10003"/>
+                    <a16:rowId xmlns:a16="http://schemas.microsoft.com/office/drawing/2014/main" val="10003"/>
                   </a:ext>
                 </a:extLst>
               </a:tr>
@@ -34605,7 +34524,7 @@
                 </a:tc>
                 <a:extLst>
                   <a:ext uri="{0D108BD9-81ED-4DB2-BD59-A6C34878D82A}">
-                    <a16:rowId xmlns:a16="http://schemas.microsoft.com/office/drawing/2014/main" xmlns="" val="10004"/>
+                    <a16:rowId xmlns:a16="http://schemas.microsoft.com/office/drawing/2014/main" val="10004"/>
                   </a:ext>
                 </a:extLst>
               </a:tr>
@@ -34662,7 +34581,7 @@
                 </a:tc>
                 <a:extLst>
                   <a:ext uri="{0D108BD9-81ED-4DB2-BD59-A6C34878D82A}">
-                    <a16:rowId xmlns:a16="http://schemas.microsoft.com/office/drawing/2014/main" xmlns="" val="10005"/>
+                    <a16:rowId xmlns:a16="http://schemas.microsoft.com/office/drawing/2014/main" val="10005"/>
                   </a:ext>
                 </a:extLst>
               </a:tr>
@@ -34675,7 +34594,7 @@
           <p:cNvPr id="4" name="TextBox 1">
             <a:extLst>
               <a:ext uri="{FF2B5EF4-FFF2-40B4-BE49-F238E27FC236}">
-                <a16:creationId xmlns:a16="http://schemas.microsoft.com/office/drawing/2014/main" xmlns="" id="{AD8E181B-B8C8-6347-9D0A-E5D3F27D22A9}"/>
+                <a16:creationId xmlns:a16="http://schemas.microsoft.com/office/drawing/2014/main" id="{AD8E181B-B8C8-6347-9D0A-E5D3F27D22A9}"/>
               </a:ext>
             </a:extLst>
           </p:cNvPr>
@@ -34867,7 +34786,7 @@
           <p:cNvPr id="2" name="TextBox 1">
             <a:extLst>
               <a:ext uri="{FF2B5EF4-FFF2-40B4-BE49-F238E27FC236}">
-                <a16:creationId xmlns:a16="http://schemas.microsoft.com/office/drawing/2014/main" xmlns="" id="{08E6FEBE-4F5D-6844-9CA6-87F11DFD8BCE}"/>
+                <a16:creationId xmlns:a16="http://schemas.microsoft.com/office/drawing/2014/main" id="{08E6FEBE-4F5D-6844-9CA6-87F11DFD8BCE}"/>
               </a:ext>
             </a:extLst>
           </p:cNvPr>
@@ -34957,21 +34876,21 @@
                 <a:gridCol w="1917700">
                   <a:extLst>
                     <a:ext uri="{9D8B030D-6E8A-4147-A177-3AD203B41FA5}">
-                      <a16:colId xmlns:a16="http://schemas.microsoft.com/office/drawing/2014/main" xmlns="" val="20000"/>
+                      <a16:colId xmlns:a16="http://schemas.microsoft.com/office/drawing/2014/main" val="20000"/>
                     </a:ext>
                   </a:extLst>
                 </a:gridCol>
                 <a:gridCol w="4382517">
                   <a:extLst>
                     <a:ext uri="{9D8B030D-6E8A-4147-A177-3AD203B41FA5}">
-                      <a16:colId xmlns:a16="http://schemas.microsoft.com/office/drawing/2014/main" xmlns="" val="20001"/>
+                      <a16:colId xmlns:a16="http://schemas.microsoft.com/office/drawing/2014/main" val="20001"/>
                     </a:ext>
                   </a:extLst>
                 </a:gridCol>
                 <a:gridCol w="5358383">
                   <a:extLst>
                     <a:ext uri="{9D8B030D-6E8A-4147-A177-3AD203B41FA5}">
-                      <a16:colId xmlns:a16="http://schemas.microsoft.com/office/drawing/2014/main" xmlns="" val="20002"/>
+                      <a16:colId xmlns:a16="http://schemas.microsoft.com/office/drawing/2014/main" val="20002"/>
                     </a:ext>
                   </a:extLst>
                 </a:gridCol>
@@ -35021,7 +34940,7 @@
                 </a:tc>
                 <a:extLst>
                   <a:ext uri="{0D108BD9-81ED-4DB2-BD59-A6C34878D82A}">
-                    <a16:rowId xmlns:a16="http://schemas.microsoft.com/office/drawing/2014/main" xmlns="" val="10000"/>
+                    <a16:rowId xmlns:a16="http://schemas.microsoft.com/office/drawing/2014/main" val="10000"/>
                   </a:ext>
                 </a:extLst>
               </a:tr>
@@ -35082,7 +35001,7 @@
                 </a:tc>
                 <a:extLst>
                   <a:ext uri="{0D108BD9-81ED-4DB2-BD59-A6C34878D82A}">
-                    <a16:rowId xmlns:a16="http://schemas.microsoft.com/office/drawing/2014/main" xmlns="" val="10001"/>
+                    <a16:rowId xmlns:a16="http://schemas.microsoft.com/office/drawing/2014/main" val="10001"/>
                   </a:ext>
                 </a:extLst>
               </a:tr>
@@ -35132,7 +35051,7 @@
                 </a:tc>
                 <a:extLst>
                   <a:ext uri="{0D108BD9-81ED-4DB2-BD59-A6C34878D82A}">
-                    <a16:rowId xmlns:a16="http://schemas.microsoft.com/office/drawing/2014/main" xmlns="" val="10002"/>
+                    <a16:rowId xmlns:a16="http://schemas.microsoft.com/office/drawing/2014/main" val="10002"/>
                   </a:ext>
                 </a:extLst>
               </a:tr>
@@ -35214,7 +35133,7 @@
                 </a:tc>
                 <a:extLst>
                   <a:ext uri="{0D108BD9-81ED-4DB2-BD59-A6C34878D82A}">
-                    <a16:rowId xmlns:a16="http://schemas.microsoft.com/office/drawing/2014/main" xmlns="" val="10003"/>
+                    <a16:rowId xmlns:a16="http://schemas.microsoft.com/office/drawing/2014/main" val="10003"/>
                   </a:ext>
                 </a:extLst>
               </a:tr>
@@ -35287,7 +35206,7 @@
                 </a:tc>
                 <a:extLst>
                   <a:ext uri="{0D108BD9-81ED-4DB2-BD59-A6C34878D82A}">
-                    <a16:rowId xmlns:a16="http://schemas.microsoft.com/office/drawing/2014/main" xmlns="" val="10012"/>
+                    <a16:rowId xmlns:a16="http://schemas.microsoft.com/office/drawing/2014/main" val="10012"/>
                   </a:ext>
                 </a:extLst>
               </a:tr>
@@ -35361,7 +35280,7 @@
                 </a:tc>
                 <a:extLst>
                   <a:ext uri="{0D108BD9-81ED-4DB2-BD59-A6C34878D82A}">
-                    <a16:rowId xmlns:a16="http://schemas.microsoft.com/office/drawing/2014/main" xmlns="" val="10013"/>
+                    <a16:rowId xmlns:a16="http://schemas.microsoft.com/office/drawing/2014/main" val="10013"/>
                   </a:ext>
                 </a:extLst>
               </a:tr>
@@ -35430,7 +35349,7 @@
                 </a:tc>
                 <a:extLst>
                   <a:ext uri="{0D108BD9-81ED-4DB2-BD59-A6C34878D82A}">
-                    <a16:rowId xmlns:a16="http://schemas.microsoft.com/office/drawing/2014/main" xmlns="" val="10004"/>
+                    <a16:rowId xmlns:a16="http://schemas.microsoft.com/office/drawing/2014/main" val="10004"/>
                   </a:ext>
                 </a:extLst>
               </a:tr>
@@ -35536,7 +35455,7 @@
                 </a:tc>
                 <a:extLst>
                   <a:ext uri="{0D108BD9-81ED-4DB2-BD59-A6C34878D82A}">
-                    <a16:rowId xmlns:a16="http://schemas.microsoft.com/office/drawing/2014/main" xmlns="" val="10005"/>
+                    <a16:rowId xmlns:a16="http://schemas.microsoft.com/office/drawing/2014/main" val="10005"/>
                   </a:ext>
                 </a:extLst>
               </a:tr>
@@ -35591,7 +35510,7 @@
                 </a:tc>
                 <a:extLst>
                   <a:ext uri="{0D108BD9-81ED-4DB2-BD59-A6C34878D82A}">
-                    <a16:rowId xmlns:a16="http://schemas.microsoft.com/office/drawing/2014/main" xmlns="" val="10006"/>
+                    <a16:rowId xmlns:a16="http://schemas.microsoft.com/office/drawing/2014/main" val="10006"/>
                   </a:ext>
                 </a:extLst>
               </a:tr>
@@ -35677,7 +35596,7 @@
                 </a:tc>
                 <a:extLst>
                   <a:ext uri="{0D108BD9-81ED-4DB2-BD59-A6C34878D82A}">
-                    <a16:rowId xmlns:a16="http://schemas.microsoft.com/office/drawing/2014/main" xmlns="" val="10007"/>
+                    <a16:rowId xmlns:a16="http://schemas.microsoft.com/office/drawing/2014/main" val="10007"/>
                   </a:ext>
                 </a:extLst>
               </a:tr>
@@ -35742,7 +35661,7 @@
                 </a:tc>
                 <a:extLst>
                   <a:ext uri="{0D108BD9-81ED-4DB2-BD59-A6C34878D82A}">
-                    <a16:rowId xmlns:a16="http://schemas.microsoft.com/office/drawing/2014/main" xmlns="" val="10008"/>
+                    <a16:rowId xmlns:a16="http://schemas.microsoft.com/office/drawing/2014/main" val="10008"/>
                   </a:ext>
                 </a:extLst>
               </a:tr>
@@ -35872,7 +35791,7 @@
                 </a:tc>
                 <a:extLst>
                   <a:ext uri="{0D108BD9-81ED-4DB2-BD59-A6C34878D82A}">
-                    <a16:rowId xmlns:a16="http://schemas.microsoft.com/office/drawing/2014/main" xmlns="" val="10009"/>
+                    <a16:rowId xmlns:a16="http://schemas.microsoft.com/office/drawing/2014/main" val="10009"/>
                   </a:ext>
                 </a:extLst>
               </a:tr>
@@ -36003,7 +35922,7 @@
                 </a:tc>
                 <a:extLst>
                   <a:ext uri="{0D108BD9-81ED-4DB2-BD59-A6C34878D82A}">
-                    <a16:rowId xmlns:a16="http://schemas.microsoft.com/office/drawing/2014/main" xmlns="" val="10010"/>
+                    <a16:rowId xmlns:a16="http://schemas.microsoft.com/office/drawing/2014/main" val="10010"/>
                   </a:ext>
                 </a:extLst>
               </a:tr>
@@ -36054,7 +35973,7 @@
                 </a:tc>
                 <a:extLst>
                   <a:ext uri="{0D108BD9-81ED-4DB2-BD59-A6C34878D82A}">
-                    <a16:rowId xmlns:a16="http://schemas.microsoft.com/office/drawing/2014/main" xmlns="" val="10011"/>
+                    <a16:rowId xmlns:a16="http://schemas.microsoft.com/office/drawing/2014/main" val="10011"/>
                   </a:ext>
                 </a:extLst>
               </a:tr>
@@ -36067,7 +35986,7 @@
           <p:cNvPr id="4" name="TextBox 1">
             <a:extLst>
               <a:ext uri="{FF2B5EF4-FFF2-40B4-BE49-F238E27FC236}">
-                <a16:creationId xmlns:a16="http://schemas.microsoft.com/office/drawing/2014/main" xmlns="" id="{3A444153-FF5A-2C4B-A9F2-915E8F72EEBC}"/>
+                <a16:creationId xmlns:a16="http://schemas.microsoft.com/office/drawing/2014/main" id="{3A444153-FF5A-2C4B-A9F2-915E8F72EEBC}"/>
               </a:ext>
             </a:extLst>
           </p:cNvPr>
@@ -36312,28 +36231,28 @@
                 <a:gridCol w="3319761">
                   <a:extLst>
                     <a:ext uri="{9D8B030D-6E8A-4147-A177-3AD203B41FA5}">
-                      <a16:colId xmlns:a16="http://schemas.microsoft.com/office/drawing/2014/main" xmlns="" val="20000"/>
+                      <a16:colId xmlns:a16="http://schemas.microsoft.com/office/drawing/2014/main" val="20000"/>
                     </a:ext>
                   </a:extLst>
                 </a:gridCol>
                 <a:gridCol w="1930311">
                   <a:extLst>
                     <a:ext uri="{9D8B030D-6E8A-4147-A177-3AD203B41FA5}">
-                      <a16:colId xmlns:a16="http://schemas.microsoft.com/office/drawing/2014/main" xmlns="" val="20001"/>
+                      <a16:colId xmlns:a16="http://schemas.microsoft.com/office/drawing/2014/main" val="20001"/>
                     </a:ext>
                   </a:extLst>
                 </a:gridCol>
                 <a:gridCol w="3310437">
                   <a:extLst>
                     <a:ext uri="{9D8B030D-6E8A-4147-A177-3AD203B41FA5}">
-                      <a16:colId xmlns:a16="http://schemas.microsoft.com/office/drawing/2014/main" xmlns="" val="20002"/>
+                      <a16:colId xmlns:a16="http://schemas.microsoft.com/office/drawing/2014/main" val="20002"/>
                     </a:ext>
                   </a:extLst>
                 </a:gridCol>
                 <a:gridCol w="3310437">
                   <a:extLst>
                     <a:ext uri="{9D8B030D-6E8A-4147-A177-3AD203B41FA5}">
-                      <a16:colId xmlns:a16="http://schemas.microsoft.com/office/drawing/2014/main" xmlns="" val="2005585204"/>
+                      <a16:colId xmlns:a16="http://schemas.microsoft.com/office/drawing/2014/main" val="2005585204"/>
                     </a:ext>
                   </a:extLst>
                 </a:gridCol>
@@ -36419,7 +36338,7 @@
                 </a:tc>
                 <a:extLst>
                   <a:ext uri="{0D108BD9-81ED-4DB2-BD59-A6C34878D82A}">
-                    <a16:rowId xmlns:a16="http://schemas.microsoft.com/office/drawing/2014/main" xmlns="" val="10000"/>
+                    <a16:rowId xmlns:a16="http://schemas.microsoft.com/office/drawing/2014/main" val="10000"/>
                   </a:ext>
                 </a:extLst>
               </a:tr>
@@ -36490,7 +36409,7 @@
                 </a:tc>
                 <a:extLst>
                   <a:ext uri="{0D108BD9-81ED-4DB2-BD59-A6C34878D82A}">
-                    <a16:rowId xmlns:a16="http://schemas.microsoft.com/office/drawing/2014/main" xmlns="" val="10001"/>
+                    <a16:rowId xmlns:a16="http://schemas.microsoft.com/office/drawing/2014/main" val="10001"/>
                   </a:ext>
                 </a:extLst>
               </a:tr>
@@ -36561,7 +36480,7 @@
                 </a:tc>
                 <a:extLst>
                   <a:ext uri="{0D108BD9-81ED-4DB2-BD59-A6C34878D82A}">
-                    <a16:rowId xmlns:a16="http://schemas.microsoft.com/office/drawing/2014/main" xmlns="" val="10002"/>
+                    <a16:rowId xmlns:a16="http://schemas.microsoft.com/office/drawing/2014/main" val="10002"/>
                   </a:ext>
                 </a:extLst>
               </a:tr>
@@ -36628,7 +36547,7 @@
                 </a:tc>
                 <a:extLst>
                   <a:ext uri="{0D108BD9-81ED-4DB2-BD59-A6C34878D82A}">
-                    <a16:rowId xmlns:a16="http://schemas.microsoft.com/office/drawing/2014/main" xmlns="" val="10003"/>
+                    <a16:rowId xmlns:a16="http://schemas.microsoft.com/office/drawing/2014/main" val="10003"/>
                   </a:ext>
                 </a:extLst>
               </a:tr>
@@ -36720,7 +36639,7 @@
                 </a:tc>
                 <a:extLst>
                   <a:ext uri="{0D108BD9-81ED-4DB2-BD59-A6C34878D82A}">
-                    <a16:rowId xmlns:a16="http://schemas.microsoft.com/office/drawing/2014/main" xmlns="" val="10004"/>
+                    <a16:rowId xmlns:a16="http://schemas.microsoft.com/office/drawing/2014/main" val="10004"/>
                   </a:ext>
                 </a:extLst>
               </a:tr>
@@ -36839,7 +36758,7 @@
                 </a:tc>
                 <a:extLst>
                   <a:ext uri="{0D108BD9-81ED-4DB2-BD59-A6C34878D82A}">
-                    <a16:rowId xmlns:a16="http://schemas.microsoft.com/office/drawing/2014/main" xmlns="" val="10005"/>
+                    <a16:rowId xmlns:a16="http://schemas.microsoft.com/office/drawing/2014/main" val="10005"/>
                   </a:ext>
                 </a:extLst>
               </a:tr>
@@ -36931,7 +36850,7 @@
                 </a:tc>
                 <a:extLst>
                   <a:ext uri="{0D108BD9-81ED-4DB2-BD59-A6C34878D82A}">
-                    <a16:rowId xmlns:a16="http://schemas.microsoft.com/office/drawing/2014/main" xmlns="" val="10006"/>
+                    <a16:rowId xmlns:a16="http://schemas.microsoft.com/office/drawing/2014/main" val="10006"/>
                   </a:ext>
                 </a:extLst>
               </a:tr>
@@ -37023,7 +36942,7 @@
                 </a:tc>
                 <a:extLst>
                   <a:ext uri="{0D108BD9-81ED-4DB2-BD59-A6C34878D82A}">
-                    <a16:rowId xmlns:a16="http://schemas.microsoft.com/office/drawing/2014/main" xmlns="" val="10007"/>
+                    <a16:rowId xmlns:a16="http://schemas.microsoft.com/office/drawing/2014/main" val="10007"/>
                   </a:ext>
                 </a:extLst>
               </a:tr>
@@ -37180,7 +37099,7 @@
                 </a:tc>
                 <a:extLst>
                   <a:ext uri="{0D108BD9-81ED-4DB2-BD59-A6C34878D82A}">
-                    <a16:rowId xmlns:a16="http://schemas.microsoft.com/office/drawing/2014/main" xmlns="" val="10008"/>
+                    <a16:rowId xmlns:a16="http://schemas.microsoft.com/office/drawing/2014/main" val="10008"/>
                   </a:ext>
                 </a:extLst>
               </a:tr>
@@ -37317,7 +37236,7 @@
                 </a:tc>
                 <a:extLst>
                   <a:ext uri="{0D108BD9-81ED-4DB2-BD59-A6C34878D82A}">
-                    <a16:rowId xmlns:a16="http://schemas.microsoft.com/office/drawing/2014/main" xmlns="" val="10009"/>
+                    <a16:rowId xmlns:a16="http://schemas.microsoft.com/office/drawing/2014/main" val="10009"/>
                   </a:ext>
                 </a:extLst>
               </a:tr>
@@ -37486,7 +37405,7 @@
                 </a:tc>
                 <a:extLst>
                   <a:ext uri="{0D108BD9-81ED-4DB2-BD59-A6C34878D82A}">
-                    <a16:rowId xmlns:a16="http://schemas.microsoft.com/office/drawing/2014/main" xmlns="" val="10010"/>
+                    <a16:rowId xmlns:a16="http://schemas.microsoft.com/office/drawing/2014/main" val="10010"/>
                   </a:ext>
                 </a:extLst>
               </a:tr>
@@ -37654,7 +37573,7 @@
                 </a:tc>
                 <a:extLst>
                   <a:ext uri="{0D108BD9-81ED-4DB2-BD59-A6C34878D82A}">
-                    <a16:rowId xmlns:a16="http://schemas.microsoft.com/office/drawing/2014/main" xmlns="" val="10011"/>
+                    <a16:rowId xmlns:a16="http://schemas.microsoft.com/office/drawing/2014/main" val="10011"/>
                   </a:ext>
                 </a:extLst>
               </a:tr>
@@ -37810,7 +37729,7 @@
                 </a:tc>
                 <a:extLst>
                   <a:ext uri="{0D108BD9-81ED-4DB2-BD59-A6C34878D82A}">
-                    <a16:rowId xmlns:a16="http://schemas.microsoft.com/office/drawing/2014/main" xmlns="" val="10012"/>
+                    <a16:rowId xmlns:a16="http://schemas.microsoft.com/office/drawing/2014/main" val="10012"/>
                   </a:ext>
                 </a:extLst>
               </a:tr>
@@ -37823,7 +37742,7 @@
           <p:cNvPr id="5" name="TextBox 1">
             <a:extLst>
               <a:ext uri="{FF2B5EF4-FFF2-40B4-BE49-F238E27FC236}">
-                <a16:creationId xmlns:a16="http://schemas.microsoft.com/office/drawing/2014/main" xmlns="" id="{A4842E2F-C433-B142-AAEF-9B348933B604}"/>
+                <a16:creationId xmlns:a16="http://schemas.microsoft.com/office/drawing/2014/main" id="{A4842E2F-C433-B142-AAEF-9B348933B604}"/>
               </a:ext>
             </a:extLst>
           </p:cNvPr>
@@ -38063,21 +37982,21 @@
                 <a:gridCol w="2575158">
                   <a:extLst>
                     <a:ext uri="{9D8B030D-6E8A-4147-A177-3AD203B41FA5}">
-                      <a16:colId xmlns:a16="http://schemas.microsoft.com/office/drawing/2014/main" xmlns="" val="20000"/>
+                      <a16:colId xmlns:a16="http://schemas.microsoft.com/office/drawing/2014/main" val="20000"/>
                     </a:ext>
                   </a:extLst>
                 </a:gridCol>
                 <a:gridCol w="4626864">
                   <a:extLst>
                     <a:ext uri="{9D8B030D-6E8A-4147-A177-3AD203B41FA5}">
-                      <a16:colId xmlns:a16="http://schemas.microsoft.com/office/drawing/2014/main" xmlns="" val="20001"/>
+                      <a16:colId xmlns:a16="http://schemas.microsoft.com/office/drawing/2014/main" val="20001"/>
                     </a:ext>
                   </a:extLst>
                 </a:gridCol>
                 <a:gridCol w="4723278">
                   <a:extLst>
                     <a:ext uri="{9D8B030D-6E8A-4147-A177-3AD203B41FA5}">
-                      <a16:colId xmlns:a16="http://schemas.microsoft.com/office/drawing/2014/main" xmlns="" val="20002"/>
+                      <a16:colId xmlns:a16="http://schemas.microsoft.com/office/drawing/2014/main" val="20002"/>
                     </a:ext>
                   </a:extLst>
                 </a:gridCol>
@@ -38149,7 +38068,7 @@
                 </a:tc>
                 <a:extLst>
                   <a:ext uri="{0D108BD9-81ED-4DB2-BD59-A6C34878D82A}">
-                    <a16:rowId xmlns:a16="http://schemas.microsoft.com/office/drawing/2014/main" xmlns="" val="10000"/>
+                    <a16:rowId xmlns:a16="http://schemas.microsoft.com/office/drawing/2014/main" val="10000"/>
                   </a:ext>
                 </a:extLst>
               </a:tr>
@@ -38229,7 +38148,7 @@
                 </a:tc>
                 <a:extLst>
                   <a:ext uri="{0D108BD9-81ED-4DB2-BD59-A6C34878D82A}">
-                    <a16:rowId xmlns:a16="http://schemas.microsoft.com/office/drawing/2014/main" xmlns="" val="10001"/>
+                    <a16:rowId xmlns:a16="http://schemas.microsoft.com/office/drawing/2014/main" val="10001"/>
                   </a:ext>
                 </a:extLst>
               </a:tr>
@@ -38622,7 +38541,7 @@
                 </a:tc>
                 <a:extLst>
                   <a:ext uri="{0D108BD9-81ED-4DB2-BD59-A6C34878D82A}">
-                    <a16:rowId xmlns:a16="http://schemas.microsoft.com/office/drawing/2014/main" xmlns="" val="10002"/>
+                    <a16:rowId xmlns:a16="http://schemas.microsoft.com/office/drawing/2014/main" val="10002"/>
                   </a:ext>
                 </a:extLst>
               </a:tr>
@@ -38732,7 +38651,7 @@
                 </a:tc>
                 <a:extLst>
                   <a:ext uri="{0D108BD9-81ED-4DB2-BD59-A6C34878D82A}">
-                    <a16:rowId xmlns:a16="http://schemas.microsoft.com/office/drawing/2014/main" xmlns="" val="10003"/>
+                    <a16:rowId xmlns:a16="http://schemas.microsoft.com/office/drawing/2014/main" val="10003"/>
                   </a:ext>
                 </a:extLst>
               </a:tr>
@@ -38822,7 +38741,7 @@
                 </a:tc>
                 <a:extLst>
                   <a:ext uri="{0D108BD9-81ED-4DB2-BD59-A6C34878D82A}">
-                    <a16:rowId xmlns:a16="http://schemas.microsoft.com/office/drawing/2014/main" xmlns="" val="10004"/>
+                    <a16:rowId xmlns:a16="http://schemas.microsoft.com/office/drawing/2014/main" val="10004"/>
                   </a:ext>
                 </a:extLst>
               </a:tr>
@@ -38955,7 +38874,7 @@
                 </a:tc>
                 <a:extLst>
                   <a:ext uri="{0D108BD9-81ED-4DB2-BD59-A6C34878D82A}">
-                    <a16:rowId xmlns:a16="http://schemas.microsoft.com/office/drawing/2014/main" xmlns="" val="10005"/>
+                    <a16:rowId xmlns:a16="http://schemas.microsoft.com/office/drawing/2014/main" val="10005"/>
                   </a:ext>
                 </a:extLst>
               </a:tr>
@@ -39076,7 +38995,7 @@
                 </a:tc>
                 <a:extLst>
                   <a:ext uri="{0D108BD9-81ED-4DB2-BD59-A6C34878D82A}">
-                    <a16:rowId xmlns:a16="http://schemas.microsoft.com/office/drawing/2014/main" xmlns="" val="10006"/>
+                    <a16:rowId xmlns:a16="http://schemas.microsoft.com/office/drawing/2014/main" val="10006"/>
                   </a:ext>
                 </a:extLst>
               </a:tr>
@@ -39089,7 +39008,7 @@
           <p:cNvPr id="5" name="TextBox 1">
             <a:extLst>
               <a:ext uri="{FF2B5EF4-FFF2-40B4-BE49-F238E27FC236}">
-                <a16:creationId xmlns:a16="http://schemas.microsoft.com/office/drawing/2014/main" xmlns="" id="{221A0B40-54C6-624F-A3D0-7231E4728615}"/>
+                <a16:creationId xmlns:a16="http://schemas.microsoft.com/office/drawing/2014/main" id="{221A0B40-54C6-624F-A3D0-7231E4728615}"/>
               </a:ext>
             </a:extLst>
           </p:cNvPr>
@@ -40386,7 +40305,7 @@
         </p:nvSpPr>
         <p:spPr bwMode="auto">
           <a:xfrm>
-            <a:off x="1212850" y="-4157"/>
+            <a:off x="1212850" y="0"/>
             <a:ext cx="9766300" cy="523220"/>
           </a:xfrm>
           <a:prstGeom prst="rect">
@@ -40597,7 +40516,7 @@
               <a:rPr lang="en-US" altLang="en-US" b="1" dirty="0" err="1"/>
               <a:t>GEOSldas</a:t>
             </a:r>
-            <a:endParaRPr lang="en-US" altLang="en-US" sz="2400" dirty="0"/>
+            <a:endParaRPr lang="en-US" altLang="en-US" dirty="0"/>
           </a:p>
         </p:txBody>
       </p:sp>
@@ -40611,8 +40530,8 @@
         </p:nvSpPr>
         <p:spPr bwMode="auto">
           <a:xfrm>
-            <a:off x="992187" y="762000"/>
-            <a:ext cx="10207625" cy="4524315"/>
+            <a:off x="167268" y="762000"/>
+            <a:ext cx="11764537" cy="6740307"/>
           </a:xfrm>
           <a:prstGeom prst="rect">
             <a:avLst/>
@@ -40642,7 +40561,7 @@
           </a:extLst>
         </p:spPr>
         <p:txBody>
-          <a:bodyPr>
+          <a:bodyPr wrap="square">
             <a:spAutoFit/>
           </a:bodyPr>
           <a:lstStyle>
@@ -40818,6 +40737,78 @@
                 <a:latin typeface="Courier New" panose="02070309020205020404" pitchFamily="49" charset="0"/>
                 <a:cs typeface="Courier New" panose="02070309020205020404" pitchFamily="49" charset="0"/>
               </a:rPr>
+              <a:t>GEOSldas_m4-17_7</a:t>
+            </a:r>
+            <a:r>
+              <a:rPr lang="en-US" altLang="en-US" sz="2400" dirty="0">
+                <a:cs typeface="Courier New" panose="02070309020205020404" pitchFamily="49" charset="0"/>
+              </a:rPr>
+              <a:t> includes model components for Catchment and </a:t>
+            </a:r>
+            <a:r>
+              <a:rPr lang="en-US" altLang="en-US" sz="2400" dirty="0" err="1">
+                <a:cs typeface="Courier New" panose="02070309020205020404" pitchFamily="49" charset="0"/>
+              </a:rPr>
+              <a:t>CatchmentCN</a:t>
+            </a:r>
+            <a:r>
+              <a:rPr lang="en-US" altLang="en-US" sz="2400" dirty="0">
+                <a:cs typeface="Courier New" panose="02070309020205020404" pitchFamily="49" charset="0"/>
+              </a:rPr>
+              <a:t>.  It also includes assimilation components for Catchment.  The science version is the equivalent of the </a:t>
+            </a:r>
+            <a:r>
+              <a:rPr lang="en-US" sz="2400" b="1" dirty="0">
+                <a:latin typeface="Courier New" panose="02070309020205020404" pitchFamily="49" charset="0"/>
+                <a:cs typeface="Courier New" panose="02070309020205020404" pitchFamily="49" charset="0"/>
+              </a:rPr>
+              <a:t>reichle-LDASsa_m3-16_6_p1 </a:t>
+            </a:r>
+            <a:r>
+              <a:rPr lang="en-US" altLang="en-US" sz="2400" dirty="0" err="1">
+                <a:cs typeface="Courier New" panose="02070309020205020404" pitchFamily="49" charset="0"/>
+              </a:rPr>
+              <a:t>LDASsa</a:t>
+            </a:r>
+            <a:r>
+              <a:rPr lang="en-US" altLang="en-US" sz="2400" dirty="0">
+                <a:cs typeface="Courier New" panose="02070309020205020404" pitchFamily="49" charset="0"/>
+              </a:rPr>
+              <a:t> tag (used to generate the Version 4 SMAP L4_SM product).  New configuration parameters (LAND_PARAMS) replace the LAND_UPD compiler flag</a:t>
+            </a:r>
+          </a:p>
+          <a:p>
+            <a:pPr eaLnBrk="1" hangingPunct="1">
+              <a:lnSpc>
+                <a:spcPct val="100000"/>
+              </a:lnSpc>
+              <a:spcBef>
+                <a:spcPct val="0"/>
+              </a:spcBef>
+              <a:buNone/>
+            </a:pPr>
+            <a:r>
+              <a:rPr lang="en-US" altLang="en-US" sz="2400" dirty="0">
+                <a:cs typeface="Courier New" panose="02070309020205020404" pitchFamily="49" charset="0"/>
+              </a:rPr>
+              <a:t> </a:t>
+            </a:r>
+          </a:p>
+          <a:p>
+            <a:pPr eaLnBrk="1" hangingPunct="1">
+              <a:lnSpc>
+                <a:spcPct val="100000"/>
+              </a:lnSpc>
+              <a:spcBef>
+                <a:spcPct val="0"/>
+              </a:spcBef>
+              <a:buNone/>
+            </a:pPr>
+            <a:r>
+              <a:rPr lang="en-US" altLang="en-US" sz="2400" b="1" dirty="0">
+                <a:latin typeface="Courier New" panose="02070309020205020404" pitchFamily="49" charset="0"/>
+                <a:cs typeface="Courier New" panose="02070309020205020404" pitchFamily="49" charset="0"/>
+              </a:rPr>
               <a:t>GEOSldas_m4-17_6</a:t>
             </a:r>
             <a:r>
@@ -40912,13 +40903,40 @@
               <a:rPr lang="en-US" altLang="en-US" sz="2400" dirty="0"/>
               <a:t> are supported, as is the snow impurity module (GOSWIM).</a:t>
             </a:r>
+          </a:p>
+          <a:p>
+            <a:pPr eaLnBrk="1" hangingPunct="1">
+              <a:lnSpc>
+                <a:spcPct val="100000"/>
+              </a:lnSpc>
+              <a:spcBef>
+                <a:spcPct val="0"/>
+              </a:spcBef>
+              <a:buNone/>
+            </a:pPr>
+            <a:endParaRPr lang="en-US" altLang="en-US" sz="2400" dirty="0">
+              <a:cs typeface="Courier New" panose="02070309020205020404" pitchFamily="49" charset="0"/>
+            </a:endParaRPr>
+          </a:p>
+          <a:p>
+            <a:pPr eaLnBrk="1" hangingPunct="1">
+              <a:lnSpc>
+                <a:spcPct val="100000"/>
+              </a:lnSpc>
+              <a:spcBef>
+                <a:spcPct val="0"/>
+              </a:spcBef>
+              <a:buFontTx/>
+              <a:buNone/>
+            </a:pPr>
+            <a:endParaRPr lang="en-US" altLang="en-US" sz="2400" dirty="0"/>
           </a:p>
         </p:txBody>
       </p:sp>
     </p:spTree>
     <p:extLst>
       <p:ext uri="{BB962C8B-B14F-4D97-AF65-F5344CB8AC3E}">
-        <p14:creationId xmlns:p14="http://schemas.microsoft.com/office/powerpoint/2010/main" val="3007588966"/>
+        <p14:creationId xmlns:p14="http://schemas.microsoft.com/office/powerpoint/2010/main" val="568774605"/>
       </p:ext>
     </p:extLst>
   </p:cSld>
@@ -41197,7 +41215,7 @@
               <a:defRPr/>
             </a:pPr>
             <a:r>
-              <a:rPr lang="pt-BR" b="1" dirty="0" smtClean="0">
+              <a:rPr lang="pt-BR" b="1" dirty="0">
                 <a:latin typeface="Calibri" pitchFamily="34" charset="0"/>
                 <a:cs typeface="Calibri" pitchFamily="34" charset="0"/>
               </a:rPr>
@@ -41216,14 +41234,7 @@
                 <a:latin typeface="Calibri" pitchFamily="34" charset="0"/>
                 <a:cs typeface="Calibri" pitchFamily="34" charset="0"/>
               </a:rPr>
-              <a:t> </a:t>
-            </a:r>
-            <a:r>
-              <a:rPr lang="en-US" dirty="0" smtClean="0">
-                <a:latin typeface="Calibri" pitchFamily="34" charset="0"/>
-                <a:cs typeface="Calibri" pitchFamily="34" charset="0"/>
-              </a:rPr>
-              <a:t>for README.md details</a:t>
+              <a:t> for README.md details</a:t>
             </a:r>
           </a:p>
           <a:p>
@@ -41252,18 +41263,11 @@
               <a:defRPr/>
             </a:pPr>
             <a:r>
-              <a:rPr lang="pt-BR" b="1" dirty="0" smtClean="0">
-                <a:latin typeface="+mn-lt"/>
-                <a:cs typeface="Courier New" pitchFamily="49" charset="0"/>
-              </a:rPr>
-              <a:t>Check </a:t>
-            </a:r>
-            <a:r>
               <a:rPr lang="pt-BR" b="1" dirty="0">
                 <a:latin typeface="+mn-lt"/>
                 <a:cs typeface="Courier New" pitchFamily="49" charset="0"/>
               </a:rPr>
-              <a:t>Out :</a:t>
+              <a:t>Check Out :</a:t>
             </a:r>
           </a:p>
           <a:p>
@@ -41281,14 +41285,7 @@
                 <a:latin typeface="Courier New" pitchFamily="49" charset="0"/>
                 <a:cs typeface="Courier New" pitchFamily="49" charset="0"/>
               </a:rPr>
-              <a:t>module use -a /</a:t>
-            </a:r>
-            <a:r>
-              <a:rPr lang="pt-BR" i="1" dirty="0" smtClean="0">
-                <a:latin typeface="Courier New" pitchFamily="49" charset="0"/>
-                <a:cs typeface="Courier New" pitchFamily="49" charset="0"/>
-              </a:rPr>
-              <a:t>discover/swdev/gmao_SIteam/modulefiles-SLES11 #NCCS</a:t>
+              <a:t>module use -a /discover/swdev/gmao_SIteam/modulefiles-SLES11 #NCCS</a:t>
             </a:r>
           </a:p>
           <a:p>
@@ -41301,19 +41298,12 @@
               </a:spcAft>
               <a:defRPr/>
             </a:pPr>
-            <a:r>
-              <a:rPr lang="pt-BR" i="1" dirty="0" smtClean="0">
-                <a:latin typeface="Courier New" pitchFamily="49" charset="0"/>
-                <a:cs typeface="Courier New" pitchFamily="49" charset="0"/>
-              </a:rPr>
-              <a:t>module </a:t>
-            </a:r>
             <a:r>
               <a:rPr lang="pt-BR" i="1" dirty="0">
                 <a:latin typeface="Courier New" pitchFamily="49" charset="0"/>
                 <a:cs typeface="Courier New" pitchFamily="49" charset="0"/>
               </a:rPr>
-              <a:t>load GEOSenv</a:t>
+              <a:t>module load GEOSenv</a:t>
             </a:r>
           </a:p>
           <a:p>
@@ -41326,7 +41316,7 @@
               </a:spcAft>
               <a:defRPr/>
             </a:pPr>
-            <a:endParaRPr lang="pt-BR" i="1" dirty="0" smtClean="0">
+            <a:endParaRPr lang="pt-BR" i="1" dirty="0">
               <a:latin typeface="Courier New" pitchFamily="49" charset="0"/>
               <a:cs typeface="Courier New" pitchFamily="49" charset="0"/>
             </a:endParaRPr>
@@ -41342,18 +41332,11 @@
               <a:defRPr/>
             </a:pPr>
             <a:r>
-              <a:rPr lang="pt-BR" i="1" dirty="0" smtClean="0">
-                <a:latin typeface="Courier New" pitchFamily="49" charset="0"/>
-                <a:cs typeface="Courier New" pitchFamily="49" charset="0"/>
-              </a:rPr>
-              <a:t>git </a:t>
-            </a:r>
-            <a:r>
               <a:rPr lang="pt-BR" i="1" dirty="0">
                 <a:latin typeface="Courier New" pitchFamily="49" charset="0"/>
                 <a:cs typeface="Courier New" pitchFamily="49" charset="0"/>
               </a:rPr>
-              <a:t>clone git@github.com:GEOS-ESM/GEOSldas.git</a:t>
+              <a:t>git clone git@github.com:GEOS-ESM/GEOSldas.git</a:t>
             </a:r>
           </a:p>
           <a:p>
@@ -41382,12 +41365,41 @@
               <a:defRPr/>
             </a:pPr>
             <a:r>
-              <a:rPr lang="pt-BR" b="1" dirty="0" smtClean="0">
+              <a:rPr lang="pt-BR" b="1" dirty="0">
                 <a:latin typeface="+mn-lt"/>
                 <a:cs typeface="Courier New" pitchFamily="49" charset="0"/>
               </a:rPr>
               <a:t>Check out external repositories and build in one step:</a:t>
             </a:r>
+          </a:p>
+          <a:p>
+            <a:pPr lvl="1" eaLnBrk="1" fontAlgn="auto" hangingPunct="1">
+              <a:spcBef>
+                <a:spcPts val="0"/>
+              </a:spcBef>
+              <a:spcAft>
+                <a:spcPts val="0"/>
+              </a:spcAft>
+              <a:defRPr/>
+            </a:pPr>
+            <a:r>
+              <a:rPr lang="pt-BR" i="1" dirty="0">
+                <a:latin typeface="Courier New" pitchFamily="49" charset="0"/>
+                <a:cs typeface="Courier New" pitchFamily="49" charset="0"/>
+              </a:rPr>
+              <a:t>parallel_build.csh</a:t>
+            </a:r>
+          </a:p>
+          <a:p>
+            <a:pPr lvl="1" eaLnBrk="1" fontAlgn="auto" hangingPunct="1">
+              <a:spcBef>
+                <a:spcPts val="0"/>
+              </a:spcBef>
+              <a:spcAft>
+                <a:spcPts val="0"/>
+              </a:spcAft>
+              <a:defRPr/>
+            </a:pPr>
             <a:endParaRPr lang="pt-BR" b="1" dirty="0">
               <a:latin typeface="+mn-lt"/>
               <a:cs typeface="Courier New" pitchFamily="49" charset="0"/>
@@ -41404,46 +41416,13 @@
               <a:defRPr/>
             </a:pPr>
             <a:r>
-              <a:rPr lang="pt-BR" i="1" dirty="0" smtClean="0">
-                <a:latin typeface="Courier New" pitchFamily="49" charset="0"/>
-                <a:cs typeface="Courier New" pitchFamily="49" charset="0"/>
-              </a:rPr>
-              <a:t>parallel_build.csh</a:t>
-            </a:r>
-          </a:p>
-          <a:p>
-            <a:pPr lvl="1" eaLnBrk="1" fontAlgn="auto" hangingPunct="1">
-              <a:spcBef>
-                <a:spcPts val="0"/>
-              </a:spcBef>
-              <a:spcAft>
-                <a:spcPts val="0"/>
-              </a:spcAft>
-              <a:defRPr/>
-            </a:pPr>
-            <a:endParaRPr lang="pt-BR" b="1" dirty="0" smtClean="0">
-              <a:latin typeface="+mn-lt"/>
-              <a:cs typeface="Courier New" pitchFamily="49" charset="0"/>
-            </a:endParaRPr>
-          </a:p>
-          <a:p>
-            <a:pPr lvl="1" eaLnBrk="1" fontAlgn="auto" hangingPunct="1">
-              <a:spcBef>
-                <a:spcPts val="0"/>
-              </a:spcBef>
-              <a:spcAft>
-                <a:spcPts val="0"/>
-              </a:spcAft>
-              <a:defRPr/>
-            </a:pPr>
-            <a:r>
-              <a:rPr lang="pt-BR" b="1" dirty="0" smtClean="0">
+              <a:rPr lang="pt-BR" b="1" dirty="0">
                 <a:latin typeface="+mn-lt"/>
                 <a:cs typeface="Courier New" pitchFamily="49" charset="0"/>
               </a:rPr>
               <a:t>Can use do multiple steps:  see README.md</a:t>
             </a:r>
-            <a:endParaRPr lang="pt-BR" i="1" dirty="0" smtClean="0">
+            <a:endParaRPr lang="pt-BR" i="1" dirty="0">
               <a:latin typeface="Courier New" pitchFamily="49" charset="0"/>
               <a:cs typeface="Courier New" pitchFamily="49" charset="0"/>
             </a:endParaRPr>
@@ -41492,16 +41471,12 @@
               <a:defRPr/>
             </a:pPr>
             <a:r>
-              <a:rPr lang="pt-BR" i="1" dirty="0" smtClean="0">
+              <a:rPr lang="pt-BR" i="1" dirty="0">
                 <a:latin typeface="Courier New" pitchFamily="49" charset="0"/>
                 <a:cs typeface="Courier New" pitchFamily="49" charset="0"/>
               </a:rPr>
               <a:t>cat build/BUILD_LOG_DIR/info</a:t>
             </a:r>
-            <a:endParaRPr lang="pt-BR" i="1" dirty="0">
-              <a:latin typeface="Courier New" pitchFamily="49" charset="0"/>
-              <a:cs typeface="Courier New" pitchFamily="49" charset="0"/>
-            </a:endParaRPr>
           </a:p>
           <a:p>
             <a:pPr lvl="1" eaLnBrk="1" fontAlgn="auto" hangingPunct="1">
@@ -41800,16 +41775,12 @@
               <a:defRPr/>
             </a:pPr>
             <a:r>
-              <a:rPr lang="pt-BR" b="1" dirty="0" smtClean="0">
+              <a:rPr lang="pt-BR" b="1" dirty="0">
                 <a:latin typeface="Courier New" pitchFamily="49" charset="0"/>
                 <a:cs typeface="Courier New" pitchFamily="49" charset="0"/>
               </a:rPr>
               <a:t> </a:t>
             </a:r>
-            <a:endParaRPr lang="pt-BR" b="1" dirty="0">
-              <a:latin typeface="Courier New" pitchFamily="49" charset="0"/>
-              <a:cs typeface="Courier New" pitchFamily="49" charset="0"/>
-            </a:endParaRPr>
           </a:p>
           <a:p>
             <a:pPr eaLnBrk="1" fontAlgn="auto" hangingPunct="1">
@@ -41826,21 +41797,7 @@
                 <a:latin typeface="+mn-lt"/>
                 <a:cs typeface="Courier New" pitchFamily="49" charset="0"/>
               </a:rPr>
-              <a:t>Prepare for ldas_setup (go to </a:t>
-            </a:r>
-            <a:r>
-              <a:rPr lang="pt-BR" b="1" dirty="0" smtClean="0">
-                <a:latin typeface="+mn-lt"/>
-                <a:cs typeface="Courier New" pitchFamily="49" charset="0"/>
-              </a:rPr>
-              <a:t>install/bin </a:t>
-            </a:r>
-            <a:r>
-              <a:rPr lang="pt-BR" b="1" dirty="0">
-                <a:latin typeface="+mn-lt"/>
-                <a:cs typeface="Courier New" pitchFamily="49" charset="0"/>
-              </a:rPr>
-              <a:t>, source g5_modules if it is a new terminal window ):</a:t>
+              <a:t>Prepare for ldas_setup (go to install/bin , source g5_modules if it is a new terminal window ):</a:t>
             </a:r>
           </a:p>
           <a:p>
@@ -43132,7 +43089,6 @@
             <a:headEnd/>
             <a:tailEnd/>
           </a:ln>
-          <a:extLst/>
         </p:spPr>
         <p:txBody>
           <a:bodyPr wrap="square">
@@ -44473,7 +44429,7 @@
           <p:cNvPr id="5" name="TextBox 1">
             <a:extLst>
               <a:ext uri="{FF2B5EF4-FFF2-40B4-BE49-F238E27FC236}">
-                <a16:creationId xmlns:a16="http://schemas.microsoft.com/office/drawing/2014/main" xmlns="" id="{4EDCE236-8364-E44A-8759-8BB938FE9C32}"/>
+                <a16:creationId xmlns:a16="http://schemas.microsoft.com/office/drawing/2014/main" id="{4EDCE236-8364-E44A-8759-8BB938FE9C32}"/>
               </a:ext>
             </a:extLst>
           </p:cNvPr>
@@ -44716,7 +44672,6 @@
             <a:headEnd/>
             <a:tailEnd/>
           </a:ln>
-          <a:extLst/>
         </p:spPr>
         <p:txBody>
           <a:bodyPr wrap="square" numCol="2" spcCol="640080">
@@ -45667,7 +45622,7 @@
           <p:cNvPr id="4" name="TextBox 1">
             <a:extLst>
               <a:ext uri="{FF2B5EF4-FFF2-40B4-BE49-F238E27FC236}">
-                <a16:creationId xmlns:a16="http://schemas.microsoft.com/office/drawing/2014/main" xmlns="" id="{EF205DC1-FB95-604F-BD4A-3FC5D361C450}"/>
+                <a16:creationId xmlns:a16="http://schemas.microsoft.com/office/drawing/2014/main" id="{EF205DC1-FB95-604F-BD4A-3FC5D361C450}"/>
               </a:ext>
             </a:extLst>
           </p:cNvPr>
@@ -46120,7 +46075,7 @@
   <a:extraClrSchemeLst/>
   <a:extLst>
     <a:ext uri="{05A4C25C-085E-4340-85A3-A5531E510DB2}">
-      <thm15:themeFamily xmlns:thm15="http://schemas.microsoft.com/office/thememl/2012/main" xmlns="" name="Office Theme" id="{62F939B6-93AF-4DB8-9C6B-D6C7DFDC589F}" vid="{4A3C46E8-61CC-4603-A589-7422A47A8E4A}"/>
+      <thm15:themeFamily xmlns:thm15="http://schemas.microsoft.com/office/thememl/2012/main" name="Office Theme" id="{62F939B6-93AF-4DB8-9C6B-D6C7DFDC589F}" vid="{4A3C46E8-61CC-4603-A589-7422A47A8E4A}"/>
     </a:ext>
   </a:extLst>
 </a:theme>
@@ -46381,7 +46336,7 @@
   <a:extraClrSchemeLst/>
   <a:extLst>
     <a:ext uri="{05A4C25C-085E-4340-85A3-A5531E510DB2}">
-      <thm15:themeFamily xmlns:thm15="http://schemas.microsoft.com/office/thememl/2012/main" xmlns="" name="Office Theme" id="{62F939B6-93AF-4DB8-9C6B-D6C7DFDC589F}" vid="{4A3C46E8-61CC-4603-A589-7422A47A8E4A}"/>
+      <thm15:themeFamily xmlns:thm15="http://schemas.microsoft.com/office/thememl/2012/main" name="Office Theme" id="{62F939B6-93AF-4DB8-9C6B-D6C7DFDC589F}" vid="{4A3C46E8-61CC-4603-A589-7422A47A8E4A}"/>
     </a:ext>
   </a:extLst>
 </a:theme>

</xml_diff>

<commit_message>
changed Z0_FORM=4, prep to use INLv3
</commit_message>
<xml_diff>
--- a/src/Applications/LDAS_App/doc/GEOSldas-tutorial.pptx
+++ b/src/Applications/LDAS_App/doc/GEOSldas-tutorial.pptx
@@ -176,7 +176,7 @@
   </p:defaultTextStyle>
   <p:extLst>
     <p:ext uri="{EFAFB233-063F-42B5-8137-9DF3F51BA10A}">
-      <p15:sldGuideLst xmlns:p15="http://schemas.microsoft.com/office/powerpoint/2012/main">
+      <p15:sldGuideLst xmlns:p15="http://schemas.microsoft.com/office/powerpoint/2012/main" xmlns="">
         <p15:guide id="1" orient="horz" pos="480" userDrawn="1">
           <p15:clr>
             <a:srgbClr val="A4A3A4"/>
@@ -190,7 +190,7 @@
       </p15:sldGuideLst>
     </p:ext>
     <p:ext uri="{2D200454-40CA-4A62-9FC3-DE9A4176ACB9}">
-      <p15:notesGuideLst xmlns:p15="http://schemas.microsoft.com/office/powerpoint/2012/main"/>
+      <p15:notesGuideLst xmlns:p15="http://schemas.microsoft.com/office/powerpoint/2012/main" xmlns=""/>
     </p:ext>
   </p:extLst>
 </p:presentation>
@@ -201,21 +201,21 @@
   <p:cmAuthor id="1" name="RR" initials="RR" lastIdx="38" clrIdx="0">
     <p:extLst>
       <p:ext uri="{19B8F6BF-5375-455C-9EA6-DF929625EA0E}">
-        <p15:presenceInfo xmlns:p15="http://schemas.microsoft.com/office/powerpoint/2012/main" userId="RR" providerId="None"/>
+        <p15:presenceInfo xmlns:p15="http://schemas.microsoft.com/office/powerpoint/2012/main" xmlns="" userId="RR" providerId="None"/>
       </p:ext>
     </p:extLst>
   </p:cmAuthor>
   <p:cmAuthor id="2" name="Reichle, Rolf H. (GSFC-6101)" initials="RRH(" lastIdx="5" clrIdx="1">
     <p:extLst>
       <p:ext uri="{19B8F6BF-5375-455C-9EA6-DF929625EA0E}">
-        <p15:presenceInfo xmlns:p15="http://schemas.microsoft.com/office/powerpoint/2012/main" userId="S-1-5-21-330711430-3775241029-4075259233-100029" providerId="AD"/>
+        <p15:presenceInfo xmlns:p15="http://schemas.microsoft.com/office/powerpoint/2012/main" xmlns="" userId="S-1-5-21-330711430-3775241029-4075259233-100029" providerId="AD"/>
       </p:ext>
     </p:extLst>
   </p:cmAuthor>
   <p:cmAuthor id="3" name="Microsoft Office User" initials="MOU" lastIdx="11" clrIdx="2">
     <p:extLst>
       <p:ext uri="{19B8F6BF-5375-455C-9EA6-DF929625EA0E}">
-        <p15:presenceInfo xmlns:p15="http://schemas.microsoft.com/office/powerpoint/2012/main" userId="Microsoft Office User" providerId="None"/>
+        <p15:presenceInfo xmlns:p15="http://schemas.microsoft.com/office/powerpoint/2012/main" xmlns="" userId="Microsoft Office User" providerId="None"/>
       </p:ext>
     </p:extLst>
   </p:cmAuthor>
@@ -335,7 +335,7 @@
               <a:pPr>
                 <a:defRPr/>
               </a:pPr>
-              <a:t>12/6/19</a:t>
+              <a:t>12/10/2019</a:t>
             </a:fld>
             <a:endParaRPr lang="en-US"/>
           </a:p>
@@ -3567,7 +3567,7 @@
               <a:pPr>
                 <a:defRPr/>
               </a:pPr>
-              <a:t>12/6/19</a:t>
+              <a:t>12/10/2019</a:t>
             </a:fld>
             <a:endParaRPr lang="en-US"/>
           </a:p>
@@ -3762,7 +3762,7 @@
               <a:pPr>
                 <a:defRPr/>
               </a:pPr>
-              <a:t>12/6/19</a:t>
+              <a:t>12/10/2019</a:t>
             </a:fld>
             <a:endParaRPr lang="en-US"/>
           </a:p>
@@ -3967,7 +3967,7 @@
               <a:pPr>
                 <a:defRPr/>
               </a:pPr>
-              <a:t>12/6/19</a:t>
+              <a:t>12/10/2019</a:t>
             </a:fld>
             <a:endParaRPr lang="en-US"/>
           </a:p>
@@ -4162,7 +4162,7 @@
               <a:pPr>
                 <a:defRPr/>
               </a:pPr>
-              <a:t>12/6/19</a:t>
+              <a:t>12/10/2019</a:t>
             </a:fld>
             <a:endParaRPr lang="en-US"/>
           </a:p>
@@ -4434,7 +4434,7 @@
               <a:pPr>
                 <a:defRPr/>
               </a:pPr>
-              <a:t>12/6/19</a:t>
+              <a:t>12/10/2019</a:t>
             </a:fld>
             <a:endParaRPr lang="en-US"/>
           </a:p>
@@ -4690,7 +4690,7 @@
               <a:pPr>
                 <a:defRPr/>
               </a:pPr>
-              <a:t>12/6/19</a:t>
+              <a:t>12/10/2019</a:t>
             </a:fld>
             <a:endParaRPr lang="en-US"/>
           </a:p>
@@ -5081,7 +5081,7 @@
               <a:pPr>
                 <a:defRPr/>
               </a:pPr>
-              <a:t>12/6/19</a:t>
+              <a:t>12/10/2019</a:t>
             </a:fld>
             <a:endParaRPr lang="en-US"/>
           </a:p>
@@ -5225,7 +5225,7 @@
               <a:pPr>
                 <a:defRPr/>
               </a:pPr>
-              <a:t>12/6/19</a:t>
+              <a:t>12/10/2019</a:t>
             </a:fld>
             <a:endParaRPr lang="en-US"/>
           </a:p>
@@ -5347,7 +5347,7 @@
               <a:pPr>
                 <a:defRPr/>
               </a:pPr>
-              <a:t>12/6/19</a:t>
+              <a:t>12/10/2019</a:t>
             </a:fld>
             <a:endParaRPr lang="en-US"/>
           </a:p>
@@ -5649,7 +5649,7 @@
               <a:pPr>
                 <a:defRPr/>
               </a:pPr>
-              <a:t>12/6/19</a:t>
+              <a:t>12/10/2019</a:t>
             </a:fld>
             <a:endParaRPr lang="en-US"/>
           </a:p>
@@ -5931,7 +5931,7 @@
               <a:pPr>
                 <a:defRPr/>
               </a:pPr>
-              <a:t>12/6/19</a:t>
+              <a:t>12/10/2019</a:t>
             </a:fld>
             <a:endParaRPr lang="en-US"/>
           </a:p>
@@ -6227,7 +6227,7 @@
               <a:pPr>
                 <a:defRPr/>
               </a:pPr>
-              <a:t>12/6/19</a:t>
+              <a:t>12/10/2019</a:t>
             </a:fld>
             <a:endParaRPr lang="en-US"/>
           </a:p>
@@ -7345,7 +7345,7 @@
           <p:cNvPr id="4" name="TextBox 1">
             <a:extLst>
               <a:ext uri="{FF2B5EF4-FFF2-40B4-BE49-F238E27FC236}">
-                <a16:creationId xmlns:a16="http://schemas.microsoft.com/office/drawing/2014/main" id="{43C050FF-2175-F049-90DF-CD37C29079FF}"/>
+                <a16:creationId xmlns:a16="http://schemas.microsoft.com/office/drawing/2014/main" xmlns="" id="{43C050FF-2175-F049-90DF-CD37C29079FF}"/>
               </a:ext>
             </a:extLst>
           </p:cNvPr>
@@ -7535,7 +7535,7 @@
           <p:cNvPr id="2" name="Rectangle 1">
             <a:extLst>
               <a:ext uri="{FF2B5EF4-FFF2-40B4-BE49-F238E27FC236}">
-                <a16:creationId xmlns:a16="http://schemas.microsoft.com/office/drawing/2014/main" id="{3039D0B7-AA59-FD4D-94F0-07C79BB8E8C9}"/>
+                <a16:creationId xmlns:a16="http://schemas.microsoft.com/office/drawing/2014/main" xmlns="" id="{3039D0B7-AA59-FD4D-94F0-07C79BB8E8C9}"/>
               </a:ext>
             </a:extLst>
           </p:cNvPr>
@@ -8807,7 +8807,7 @@
           <p:cNvPr id="4" name="TextBox 1">
             <a:extLst>
               <a:ext uri="{FF2B5EF4-FFF2-40B4-BE49-F238E27FC236}">
-                <a16:creationId xmlns:a16="http://schemas.microsoft.com/office/drawing/2014/main" id="{0A2C1B91-AD52-3446-BE33-E91F8B83086D}"/>
+                <a16:creationId xmlns:a16="http://schemas.microsoft.com/office/drawing/2014/main" xmlns="" id="{0A2C1B91-AD52-3446-BE33-E91F8B83086D}"/>
               </a:ext>
             </a:extLst>
           </p:cNvPr>
@@ -9558,30 +9558,45 @@
               <a:buNone/>
             </a:pPr>
             <a:r>
+              <a:rPr lang="en-US" altLang="en-US" sz="1600" dirty="0" smtClean="0">
+                <a:latin typeface="Courier New" panose="02070309020205020404" pitchFamily="49" charset="0"/>
+                <a:cs typeface="Courier New" panose="02070309020205020404" pitchFamily="49" charset="0"/>
+              </a:rPr>
+              <a:t>#    4 : f525_land</a:t>
+            </a:r>
+            <a:endParaRPr lang="en-US" altLang="en-US" sz="1600" dirty="0">
+              <a:latin typeface="Courier New" panose="02070309020205020404" pitchFamily="49" charset="0"/>
+              <a:cs typeface="Courier New" panose="02070309020205020404" pitchFamily="49" charset="0"/>
+            </a:endParaRPr>
+          </a:p>
+          <a:p>
+            <a:pPr eaLnBrk="1" hangingPunct="1">
+              <a:lnSpc>
+                <a:spcPct val="100000"/>
+              </a:lnSpc>
+              <a:spcBef>
+                <a:spcPct val="0"/>
+              </a:spcBef>
+              <a:buNone/>
+            </a:pPr>
+            <a:r>
               <a:rPr lang="en-US" altLang="en-US" sz="1600" dirty="0">
                 <a:latin typeface="Courier New" panose="02070309020205020404" pitchFamily="49" charset="0"/>
                 <a:cs typeface="Courier New" panose="02070309020205020404" pitchFamily="49" charset="0"/>
               </a:rPr>
-              <a:t>#</a:t>
-            </a:r>
-          </a:p>
-          <a:p>
-            <a:pPr eaLnBrk="1" hangingPunct="1">
-              <a:lnSpc>
-                <a:spcPct val="100000"/>
-              </a:lnSpc>
-              <a:spcBef>
-                <a:spcPct val="0"/>
-              </a:spcBef>
-              <a:buNone/>
-            </a:pPr>
-            <a:r>
-              <a:rPr lang="en-US" altLang="en-US" sz="1600" dirty="0">
-                <a:latin typeface="Courier New" panose="02070309020205020404" pitchFamily="49" charset="0"/>
-                <a:cs typeface="Courier New" panose="02070309020205020404" pitchFamily="49" charset="0"/>
-              </a:rPr>
-              <a:t>Z0_FORMULATION                 : 3</a:t>
-            </a:r>
+              <a:t>Z0_FORMULATION                 : </a:t>
+            </a:r>
+            <a:r>
+              <a:rPr lang="en-US" altLang="en-US" sz="1600" dirty="0" smtClean="0">
+                <a:latin typeface="Courier New" panose="02070309020205020404" pitchFamily="49" charset="0"/>
+                <a:cs typeface="Courier New" panose="02070309020205020404" pitchFamily="49" charset="0"/>
+              </a:rPr>
+              <a:t>4</a:t>
+            </a:r>
+            <a:endParaRPr lang="en-US" altLang="en-US" sz="1600" dirty="0">
+              <a:latin typeface="Courier New" panose="02070309020205020404" pitchFamily="49" charset="0"/>
+              <a:cs typeface="Courier New" panose="02070309020205020404" pitchFamily="49" charset="0"/>
+            </a:endParaRPr>
           </a:p>
           <a:p>
             <a:pPr eaLnBrk="1" hangingPunct="1">
@@ -9695,7 +9710,7 @@
           <p:cNvPr id="4" name="TextBox 1">
             <a:extLst>
               <a:ext uri="{FF2B5EF4-FFF2-40B4-BE49-F238E27FC236}">
-                <a16:creationId xmlns:a16="http://schemas.microsoft.com/office/drawing/2014/main" id="{BC67E993-F431-2349-9828-19CB4C4AC14C}"/>
+                <a16:creationId xmlns:a16="http://schemas.microsoft.com/office/drawing/2014/main" xmlns="" id="{BC67E993-F431-2349-9828-19CB4C4AC14C}"/>
               </a:ext>
             </a:extLst>
           </p:cNvPr>
@@ -10496,7 +10511,7 @@
           <p:cNvPr id="4" name="TextBox 1">
             <a:extLst>
               <a:ext uri="{FF2B5EF4-FFF2-40B4-BE49-F238E27FC236}">
-                <a16:creationId xmlns:a16="http://schemas.microsoft.com/office/drawing/2014/main" id="{BC67E993-F431-2349-9828-19CB4C4AC14C}"/>
+                <a16:creationId xmlns:a16="http://schemas.microsoft.com/office/drawing/2014/main" xmlns="" id="{BC67E993-F431-2349-9828-19CB4C4AC14C}"/>
               </a:ext>
             </a:extLst>
           </p:cNvPr>
@@ -11431,7 +11446,7 @@
           <p:cNvPr id="4" name="TextBox 1">
             <a:extLst>
               <a:ext uri="{FF2B5EF4-FFF2-40B4-BE49-F238E27FC236}">
-                <a16:creationId xmlns:a16="http://schemas.microsoft.com/office/drawing/2014/main" id="{BC67E993-F431-2349-9828-19CB4C4AC14C}"/>
+                <a16:creationId xmlns:a16="http://schemas.microsoft.com/office/drawing/2014/main" xmlns="" id="{BC67E993-F431-2349-9828-19CB4C4AC14C}"/>
               </a:ext>
             </a:extLst>
           </p:cNvPr>
@@ -12274,7 +12289,7 @@
           <p:cNvPr id="4" name="TextBox 1">
             <a:extLst>
               <a:ext uri="{FF2B5EF4-FFF2-40B4-BE49-F238E27FC236}">
-                <a16:creationId xmlns:a16="http://schemas.microsoft.com/office/drawing/2014/main" id="{66EA72C2-1A7B-3241-9DCF-B26B9EA656CE}"/>
+                <a16:creationId xmlns:a16="http://schemas.microsoft.com/office/drawing/2014/main" xmlns="" id="{66EA72C2-1A7B-3241-9DCF-B26B9EA656CE}"/>
               </a:ext>
             </a:extLst>
           </p:cNvPr>
@@ -13168,7 +13183,7 @@
           <p:cNvPr id="4" name="TextBox 1">
             <a:extLst>
               <a:ext uri="{FF2B5EF4-FFF2-40B4-BE49-F238E27FC236}">
-                <a16:creationId xmlns:a16="http://schemas.microsoft.com/office/drawing/2014/main" id="{EA6833A0-6FF5-4144-B32D-E90F9C12D26E}"/>
+                <a16:creationId xmlns:a16="http://schemas.microsoft.com/office/drawing/2014/main" xmlns="" id="{EA6833A0-6FF5-4144-B32D-E90F9C12D26E}"/>
               </a:ext>
             </a:extLst>
           </p:cNvPr>
@@ -14110,7 +14125,7 @@
           <p:cNvPr id="6" name="TextBox 1">
             <a:extLst>
               <a:ext uri="{FF2B5EF4-FFF2-40B4-BE49-F238E27FC236}">
-                <a16:creationId xmlns:a16="http://schemas.microsoft.com/office/drawing/2014/main" id="{7FC34D51-735D-584B-862E-1A081F2B9EF9}"/>
+                <a16:creationId xmlns:a16="http://schemas.microsoft.com/office/drawing/2014/main" xmlns="" id="{7FC34D51-735D-584B-862E-1A081F2B9EF9}"/>
               </a:ext>
             </a:extLst>
           </p:cNvPr>
@@ -14300,7 +14315,7 @@
           <p:cNvPr id="4" name="CustomShape 3">
             <a:extLst>
               <a:ext uri="{FF2B5EF4-FFF2-40B4-BE49-F238E27FC236}">
-                <a16:creationId xmlns:a16="http://schemas.microsoft.com/office/drawing/2014/main" id="{35383346-C420-A848-8F58-377AA545A618}"/>
+                <a16:creationId xmlns:a16="http://schemas.microsoft.com/office/drawing/2014/main" xmlns="" id="{35383346-C420-A848-8F58-377AA545A618}"/>
               </a:ext>
             </a:extLst>
           </p:cNvPr>
@@ -14451,7 +14466,7 @@
           <p:cNvPr id="3" name="Straight Arrow Connector 2">
             <a:extLst>
               <a:ext uri="{FF2B5EF4-FFF2-40B4-BE49-F238E27FC236}">
-                <a16:creationId xmlns:a16="http://schemas.microsoft.com/office/drawing/2014/main" id="{B8552650-82DD-4847-85C5-D1578CE3985F}"/>
+                <a16:creationId xmlns:a16="http://schemas.microsoft.com/office/drawing/2014/main" xmlns="" id="{B8552650-82DD-4847-85C5-D1578CE3985F}"/>
               </a:ext>
             </a:extLst>
           </p:cNvPr>
@@ -26947,8 +26962,19 @@
                 <a:latin typeface="Courier New" panose="02070309020205020404" pitchFamily="49" charset="0"/>
                 <a:cs typeface="Courier New" panose="02070309020205020404" pitchFamily="49" charset="0"/>
               </a:rPr>
-              <a:t>Z0_FORMULATION:                     3</a:t>
-            </a:r>
+              <a:t>Z0_FORMULATION:                     </a:t>
+            </a:r>
+            <a:r>
+              <a:rPr lang="is-IS" altLang="en-US" sz="1200" dirty="0" smtClean="0">
+                <a:latin typeface="Courier New" panose="02070309020205020404" pitchFamily="49" charset="0"/>
+                <a:cs typeface="Courier New" panose="02070309020205020404" pitchFamily="49" charset="0"/>
+              </a:rPr>
+              <a:t>4</a:t>
+            </a:r>
+            <a:endParaRPr lang="is-IS" altLang="en-US" sz="1200" dirty="0">
+              <a:latin typeface="Courier New" panose="02070309020205020404" pitchFamily="49" charset="0"/>
+              <a:cs typeface="Courier New" panose="02070309020205020404" pitchFamily="49" charset="0"/>
+            </a:endParaRPr>
           </a:p>
           <a:p>
             <a:pPr eaLnBrk="1" hangingPunct="1">
@@ -29284,35 +29310,35 @@
                 <a:gridCol w="896458">
                   <a:extLst>
                     <a:ext uri="{9D8B030D-6E8A-4147-A177-3AD203B41FA5}">
-                      <a16:colId xmlns:a16="http://schemas.microsoft.com/office/drawing/2014/main" val="20000"/>
+                      <a16:colId xmlns:a16="http://schemas.microsoft.com/office/drawing/2014/main" xmlns="" val="20000"/>
                     </a:ext>
                   </a:extLst>
                 </a:gridCol>
                 <a:gridCol w="1816924">
                   <a:extLst>
                     <a:ext uri="{9D8B030D-6E8A-4147-A177-3AD203B41FA5}">
-                      <a16:colId xmlns:a16="http://schemas.microsoft.com/office/drawing/2014/main" val="20001"/>
+                      <a16:colId xmlns:a16="http://schemas.microsoft.com/office/drawing/2014/main" xmlns="" val="20001"/>
                     </a:ext>
                   </a:extLst>
                 </a:gridCol>
                 <a:gridCol w="1353787">
                   <a:extLst>
                     <a:ext uri="{9D8B030D-6E8A-4147-A177-3AD203B41FA5}">
-                      <a16:colId xmlns:a16="http://schemas.microsoft.com/office/drawing/2014/main" val="20002"/>
+                      <a16:colId xmlns:a16="http://schemas.microsoft.com/office/drawing/2014/main" xmlns="" val="20002"/>
                     </a:ext>
                   </a:extLst>
                 </a:gridCol>
                 <a:gridCol w="1104406">
                   <a:extLst>
                     <a:ext uri="{9D8B030D-6E8A-4147-A177-3AD203B41FA5}">
-                      <a16:colId xmlns:a16="http://schemas.microsoft.com/office/drawing/2014/main" val="20003"/>
+                      <a16:colId xmlns:a16="http://schemas.microsoft.com/office/drawing/2014/main" xmlns="" val="20003"/>
                     </a:ext>
                   </a:extLst>
                 </a:gridCol>
                 <a:gridCol w="5964599">
                   <a:extLst>
                     <a:ext uri="{9D8B030D-6E8A-4147-A177-3AD203B41FA5}">
-                      <a16:colId xmlns:a16="http://schemas.microsoft.com/office/drawing/2014/main" val="20004"/>
+                      <a16:colId xmlns:a16="http://schemas.microsoft.com/office/drawing/2014/main" xmlns="" val="20004"/>
                     </a:ext>
                   </a:extLst>
                 </a:gridCol>
@@ -29396,7 +29422,7 @@
                 </a:tc>
                 <a:extLst>
                   <a:ext uri="{0D108BD9-81ED-4DB2-BD59-A6C34878D82A}">
-                    <a16:rowId xmlns:a16="http://schemas.microsoft.com/office/drawing/2014/main" val="10000"/>
+                    <a16:rowId xmlns:a16="http://schemas.microsoft.com/office/drawing/2014/main" xmlns="" val="10000"/>
                   </a:ext>
                 </a:extLst>
               </a:tr>
@@ -29659,7 +29685,7 @@
                 </a:tc>
                 <a:extLst>
                   <a:ext uri="{0D108BD9-81ED-4DB2-BD59-A6C34878D82A}">
-                    <a16:rowId xmlns:a16="http://schemas.microsoft.com/office/drawing/2014/main" val="10001"/>
+                    <a16:rowId xmlns:a16="http://schemas.microsoft.com/office/drawing/2014/main" xmlns="" val="10001"/>
                   </a:ext>
                 </a:extLst>
               </a:tr>
@@ -29908,7 +29934,7 @@
                 </a:tc>
                 <a:extLst>
                   <a:ext uri="{0D108BD9-81ED-4DB2-BD59-A6C34878D82A}">
-                    <a16:rowId xmlns:a16="http://schemas.microsoft.com/office/drawing/2014/main" val="10002"/>
+                    <a16:rowId xmlns:a16="http://schemas.microsoft.com/office/drawing/2014/main" xmlns="" val="10002"/>
                   </a:ext>
                 </a:extLst>
               </a:tr>
@@ -33078,7 +33104,7 @@
         <p:spPr>
           <a:xfrm>
             <a:off x="504040" y="774192"/>
-            <a:ext cx="11183919" cy="6017032"/>
+            <a:ext cx="11183919" cy="6232475"/>
           </a:xfrm>
           <a:prstGeom prst="rect">
             <a:avLst/>
@@ -33141,7 +33167,7 @@
             </a:r>
           </a:p>
           <a:p>
-            <a:pPr lvl="0" eaLnBrk="1" fontAlgn="auto" hangingPunct="1">
+            <a:pPr eaLnBrk="1" fontAlgn="auto" hangingPunct="1">
               <a:spcBef>
                 <a:spcPts val="0"/>
               </a:spcBef>
@@ -33150,7 +33176,7 @@
               </a:spcAft>
             </a:pPr>
             <a:r>
-              <a:rPr lang="en-US" sz="1400" spc="-1" dirty="0">
+              <a:rPr lang="en-US" sz="1400" spc="-1" dirty="0" smtClean="0">
                 <a:solidFill>
                   <a:srgbClr val="000000"/>
                 </a:solidFill>
@@ -33161,10 +33187,10 @@
                 </a:uFill>
                 <a:latin typeface="Courier New"/>
               </a:rPr>
-              <a:t>	/discover/</a:t>
-            </a:r>
-            <a:r>
-              <a:rPr lang="en-US" sz="1400" spc="-1" dirty="0" err="1">
+              <a:t>	</a:t>
+            </a:r>
+            <a:r>
+              <a:rPr lang="en-US" sz="1400" spc="-1" dirty="0">
                 <a:solidFill>
                   <a:srgbClr val="000000"/>
                 </a:solidFill>
@@ -33175,10 +33201,10 @@
                 </a:uFill>
                 <a:latin typeface="Courier New"/>
               </a:rPr>
-              <a:t>nobackup</a:t>
-            </a:r>
-            <a:r>
-              <a:rPr lang="en-US" sz="1400" spc="-1" dirty="0">
+              <a:t>/</a:t>
+            </a:r>
+            <a:r>
+              <a:rPr lang="en-US" sz="1400" spc="-1" dirty="0" smtClean="0">
                 <a:solidFill>
                   <a:srgbClr val="000000"/>
                 </a:solidFill>
@@ -33189,10 +33215,10 @@
                 </a:uFill>
                 <a:latin typeface="Courier New"/>
               </a:rPr>
-              <a:t>/</a:t>
-            </a:r>
-            <a:r>
-              <a:rPr lang="en-US" sz="1400" spc="-1" dirty="0" err="1">
+              <a:t>discover/</a:t>
+            </a:r>
+            <a:r>
+              <a:rPr lang="en-US" sz="1400" spc="-1" dirty="0" err="1" smtClean="0">
                 <a:solidFill>
                   <a:srgbClr val="000000"/>
                 </a:solidFill>
@@ -33203,10 +33229,10 @@
                 </a:uFill>
                 <a:latin typeface="Courier New"/>
               </a:rPr>
-              <a:t>ltakacs</a:t>
-            </a:r>
-            <a:r>
-              <a:rPr lang="en-US" sz="1400" spc="-1" dirty="0">
+              <a:t>nobackup</a:t>
+            </a:r>
+            <a:r>
+              <a:rPr lang="en-US" sz="1400" spc="-1" dirty="0" smtClean="0">
                 <a:solidFill>
                   <a:srgbClr val="000000"/>
                 </a:solidFill>
@@ -33220,7 +33246,7 @@
               <a:t>/</a:t>
             </a:r>
             <a:r>
-              <a:rPr lang="en-US" sz="1400" spc="-1" dirty="0" err="1">
+              <a:rPr lang="en-US" sz="1400" spc="-1" dirty="0" err="1" smtClean="0">
                 <a:solidFill>
                   <a:srgbClr val="000000"/>
                 </a:solidFill>
@@ -33231,10 +33257,10 @@
                 </a:uFill>
                 <a:latin typeface="Courier New"/>
               </a:rPr>
-              <a:t>bcs</a:t>
-            </a:r>
-            <a:r>
-              <a:rPr lang="en-US" sz="1400" spc="-1" dirty="0">
+              <a:t>ltakacs</a:t>
+            </a:r>
+            <a:r>
+              <a:rPr lang="en-US" sz="1400" spc="-1" dirty="0" smtClean="0">
                 <a:solidFill>
                   <a:srgbClr val="000000"/>
                 </a:solidFill>
@@ -33245,9 +33271,156 @@
                 </a:uFill>
                 <a:latin typeface="Courier New"/>
               </a:rPr>
+              <a:t>/</a:t>
+            </a:r>
+            <a:r>
+              <a:rPr lang="en-US" sz="1400" spc="-1" dirty="0" err="1" smtClean="0">
+                <a:solidFill>
+                  <a:srgbClr val="000000"/>
+                </a:solidFill>
+                <a:uFill>
+                  <a:solidFill>
+                    <a:srgbClr val="FFFFFF"/>
+                  </a:solidFill>
+                </a:uFill>
+                <a:latin typeface="Courier New"/>
+              </a:rPr>
+              <a:t>bcs</a:t>
+            </a:r>
+            <a:r>
+              <a:rPr lang="en-US" sz="1400" spc="-1" dirty="0" smtClean="0">
+                <a:solidFill>
+                  <a:srgbClr val="000000"/>
+                </a:solidFill>
+                <a:uFill>
+                  <a:solidFill>
+                    <a:srgbClr val="FFFFFF"/>
+                  </a:solidFill>
+                </a:uFill>
+                <a:latin typeface="Courier New"/>
+              </a:rPr>
+              <a:t>/Icarus-NLv3/</a:t>
+            </a:r>
+            <a:endParaRPr lang="en-US" sz="1400" spc="-1" dirty="0">
+              <a:solidFill>
+                <a:srgbClr val="000000"/>
+              </a:solidFill>
+              <a:uFill>
+                <a:solidFill>
+                  <a:srgbClr val="FFFFFF"/>
+                </a:solidFill>
+              </a:uFill>
+              <a:latin typeface="Arial"/>
+            </a:endParaRPr>
+          </a:p>
+          <a:p>
+            <a:pPr lvl="0" eaLnBrk="1" fontAlgn="auto" hangingPunct="1">
+              <a:spcBef>
+                <a:spcPts val="0"/>
+              </a:spcBef>
+              <a:spcAft>
+                <a:spcPts val="0"/>
+              </a:spcAft>
+            </a:pPr>
+            <a:r>
+              <a:rPr lang="en-US" sz="1400" spc="-1" dirty="0" smtClean="0">
+                <a:solidFill>
+                  <a:srgbClr val="000000"/>
+                </a:solidFill>
+                <a:uFill>
+                  <a:solidFill>
+                    <a:srgbClr val="FFFFFF"/>
+                  </a:solidFill>
+                </a:uFill>
+                <a:latin typeface="Courier New"/>
+              </a:rPr>
+              <a:t>	/discover/</a:t>
+            </a:r>
+            <a:r>
+              <a:rPr lang="en-US" sz="1400" spc="-1" dirty="0" err="1" smtClean="0">
+                <a:solidFill>
+                  <a:srgbClr val="000000"/>
+                </a:solidFill>
+                <a:uFill>
+                  <a:solidFill>
+                    <a:srgbClr val="FFFFFF"/>
+                  </a:solidFill>
+                </a:uFill>
+                <a:latin typeface="Courier New"/>
+              </a:rPr>
+              <a:t>nobackup</a:t>
+            </a:r>
+            <a:r>
+              <a:rPr lang="en-US" sz="1400" spc="-1" dirty="0" smtClean="0">
+                <a:solidFill>
+                  <a:srgbClr val="000000"/>
+                </a:solidFill>
+                <a:uFill>
+                  <a:solidFill>
+                    <a:srgbClr val="FFFFFF"/>
+                  </a:solidFill>
+                </a:uFill>
+                <a:latin typeface="Courier New"/>
+              </a:rPr>
+              <a:t>/</a:t>
+            </a:r>
+            <a:r>
+              <a:rPr lang="en-US" sz="1400" spc="-1" dirty="0" err="1" smtClean="0">
+                <a:solidFill>
+                  <a:srgbClr val="000000"/>
+                </a:solidFill>
+                <a:uFill>
+                  <a:solidFill>
+                    <a:srgbClr val="FFFFFF"/>
+                  </a:solidFill>
+                </a:uFill>
+                <a:latin typeface="Courier New"/>
+              </a:rPr>
+              <a:t>ltakacs</a:t>
+            </a:r>
+            <a:r>
+              <a:rPr lang="en-US" sz="1400" spc="-1" dirty="0" smtClean="0">
+                <a:solidFill>
+                  <a:srgbClr val="000000"/>
+                </a:solidFill>
+                <a:uFill>
+                  <a:solidFill>
+                    <a:srgbClr val="FFFFFF"/>
+                  </a:solidFill>
+                </a:uFill>
+                <a:latin typeface="Courier New"/>
+              </a:rPr>
+              <a:t>/</a:t>
+            </a:r>
+            <a:r>
+              <a:rPr lang="en-US" sz="1400" spc="-1" dirty="0" err="1" smtClean="0">
+                <a:solidFill>
+                  <a:srgbClr val="000000"/>
+                </a:solidFill>
+                <a:uFill>
+                  <a:solidFill>
+                    <a:srgbClr val="FFFFFF"/>
+                  </a:solidFill>
+                </a:uFill>
+                <a:latin typeface="Courier New"/>
+              </a:rPr>
+              <a:t>bcs</a:t>
+            </a:r>
+            <a:r>
+              <a:rPr lang="en-US" sz="1400" spc="-1" dirty="0" smtClean="0">
+                <a:solidFill>
+                  <a:srgbClr val="000000"/>
+                </a:solidFill>
+                <a:uFill>
+                  <a:solidFill>
+                    <a:srgbClr val="FFFFFF"/>
+                  </a:solidFill>
+                </a:uFill>
+                <a:latin typeface="Courier New"/>
+              </a:rPr>
               <a:t>/Icarus-NLv2/</a:t>
             </a:r>
-            <a:endParaRPr lang="en-US" sz="1400" spc="-1" dirty="0">
+            <a:endParaRPr lang="en-US" sz="1400" spc="-1" dirty="0" smtClean="0">
               <a:solidFill>
                 <a:srgbClr val="000000"/>
               </a:solidFill>
@@ -33987,7 +34160,7 @@
           <p:cNvPr id="4" name="TextBox 1">
             <a:extLst>
               <a:ext uri="{FF2B5EF4-FFF2-40B4-BE49-F238E27FC236}">
-                <a16:creationId xmlns:a16="http://schemas.microsoft.com/office/drawing/2014/main" id="{830FC3A9-D4AF-6C47-B748-91F5977224E9}"/>
+                <a16:creationId xmlns:a16="http://schemas.microsoft.com/office/drawing/2014/main" xmlns="" id="{830FC3A9-D4AF-6C47-B748-91F5977224E9}"/>
               </a:ext>
             </a:extLst>
           </p:cNvPr>
@@ -34232,21 +34405,21 @@
                 <a:gridCol w="5357879">
                   <a:extLst>
                     <a:ext uri="{9D8B030D-6E8A-4147-A177-3AD203B41FA5}">
-                      <a16:colId xmlns:a16="http://schemas.microsoft.com/office/drawing/2014/main" val="20000"/>
+                      <a16:colId xmlns:a16="http://schemas.microsoft.com/office/drawing/2014/main" xmlns="" val="20000"/>
                     </a:ext>
                   </a:extLst>
                 </a:gridCol>
                 <a:gridCol w="1662115">
                   <a:extLst>
                     <a:ext uri="{9D8B030D-6E8A-4147-A177-3AD203B41FA5}">
-                      <a16:colId xmlns:a16="http://schemas.microsoft.com/office/drawing/2014/main" val="20001"/>
+                      <a16:colId xmlns:a16="http://schemas.microsoft.com/office/drawing/2014/main" xmlns="" val="20001"/>
                     </a:ext>
                   </a:extLst>
                 </a:gridCol>
                 <a:gridCol w="1857660">
                   <a:extLst>
                     <a:ext uri="{9D8B030D-6E8A-4147-A177-3AD203B41FA5}">
-                      <a16:colId xmlns:a16="http://schemas.microsoft.com/office/drawing/2014/main" val="20002"/>
+                      <a16:colId xmlns:a16="http://schemas.microsoft.com/office/drawing/2014/main" xmlns="" val="20002"/>
                     </a:ext>
                   </a:extLst>
                 </a:gridCol>
@@ -34295,7 +34468,7 @@
                 </a:tc>
                 <a:extLst>
                   <a:ext uri="{0D108BD9-81ED-4DB2-BD59-A6C34878D82A}">
-                    <a16:rowId xmlns:a16="http://schemas.microsoft.com/office/drawing/2014/main" val="10000"/>
+                    <a16:rowId xmlns:a16="http://schemas.microsoft.com/office/drawing/2014/main" xmlns="" val="10000"/>
                   </a:ext>
                 </a:extLst>
               </a:tr>
@@ -34352,7 +34525,7 @@
                 </a:tc>
                 <a:extLst>
                   <a:ext uri="{0D108BD9-81ED-4DB2-BD59-A6C34878D82A}">
-                    <a16:rowId xmlns:a16="http://schemas.microsoft.com/office/drawing/2014/main" val="10001"/>
+                    <a16:rowId xmlns:a16="http://schemas.microsoft.com/office/drawing/2014/main" xmlns="" val="10001"/>
                   </a:ext>
                 </a:extLst>
               </a:tr>
@@ -34414,7 +34587,7 @@
                 </a:tc>
                 <a:extLst>
                   <a:ext uri="{0D108BD9-81ED-4DB2-BD59-A6C34878D82A}">
-                    <a16:rowId xmlns:a16="http://schemas.microsoft.com/office/drawing/2014/main" val="10002"/>
+                    <a16:rowId xmlns:a16="http://schemas.microsoft.com/office/drawing/2014/main" xmlns="" val="10002"/>
                   </a:ext>
                 </a:extLst>
               </a:tr>
@@ -34465,7 +34638,7 @@
                 </a:tc>
                 <a:extLst>
                   <a:ext uri="{0D108BD9-81ED-4DB2-BD59-A6C34878D82A}">
-                    <a16:rowId xmlns:a16="http://schemas.microsoft.com/office/drawing/2014/main" val="10003"/>
+                    <a16:rowId xmlns:a16="http://schemas.microsoft.com/office/drawing/2014/main" xmlns="" val="10003"/>
                   </a:ext>
                 </a:extLst>
               </a:tr>
@@ -34524,7 +34697,7 @@
                 </a:tc>
                 <a:extLst>
                   <a:ext uri="{0D108BD9-81ED-4DB2-BD59-A6C34878D82A}">
-                    <a16:rowId xmlns:a16="http://schemas.microsoft.com/office/drawing/2014/main" val="10004"/>
+                    <a16:rowId xmlns:a16="http://schemas.microsoft.com/office/drawing/2014/main" xmlns="" val="10004"/>
                   </a:ext>
                 </a:extLst>
               </a:tr>
@@ -34581,7 +34754,7 @@
                 </a:tc>
                 <a:extLst>
                   <a:ext uri="{0D108BD9-81ED-4DB2-BD59-A6C34878D82A}">
-                    <a16:rowId xmlns:a16="http://schemas.microsoft.com/office/drawing/2014/main" val="10005"/>
+                    <a16:rowId xmlns:a16="http://schemas.microsoft.com/office/drawing/2014/main" xmlns="" val="10005"/>
                   </a:ext>
                 </a:extLst>
               </a:tr>
@@ -34594,7 +34767,7 @@
           <p:cNvPr id="4" name="TextBox 1">
             <a:extLst>
               <a:ext uri="{FF2B5EF4-FFF2-40B4-BE49-F238E27FC236}">
-                <a16:creationId xmlns:a16="http://schemas.microsoft.com/office/drawing/2014/main" id="{AD8E181B-B8C8-6347-9D0A-E5D3F27D22A9}"/>
+                <a16:creationId xmlns:a16="http://schemas.microsoft.com/office/drawing/2014/main" xmlns="" id="{AD8E181B-B8C8-6347-9D0A-E5D3F27D22A9}"/>
               </a:ext>
             </a:extLst>
           </p:cNvPr>
@@ -34786,7 +34959,7 @@
           <p:cNvPr id="2" name="TextBox 1">
             <a:extLst>
               <a:ext uri="{FF2B5EF4-FFF2-40B4-BE49-F238E27FC236}">
-                <a16:creationId xmlns:a16="http://schemas.microsoft.com/office/drawing/2014/main" id="{08E6FEBE-4F5D-6844-9CA6-87F11DFD8BCE}"/>
+                <a16:creationId xmlns:a16="http://schemas.microsoft.com/office/drawing/2014/main" xmlns="" id="{08E6FEBE-4F5D-6844-9CA6-87F11DFD8BCE}"/>
               </a:ext>
             </a:extLst>
           </p:cNvPr>
@@ -34857,7 +35030,7 @@
           <p:nvPr>
             <p:extLst>
               <p:ext uri="{D42A27DB-BD31-4B8C-83A1-F6EECF244321}">
-                <p14:modId xmlns:p14="http://schemas.microsoft.com/office/powerpoint/2010/main" val="3805991403"/>
+                <p14:modId xmlns:p14="http://schemas.microsoft.com/office/powerpoint/2010/main" val="2686219720"/>
               </p:ext>
             </p:extLst>
           </p:nvPr>
@@ -34876,21 +35049,21 @@
                 <a:gridCol w="1917700">
                   <a:extLst>
                     <a:ext uri="{9D8B030D-6E8A-4147-A177-3AD203B41FA5}">
-                      <a16:colId xmlns:a16="http://schemas.microsoft.com/office/drawing/2014/main" val="20000"/>
+                      <a16:colId xmlns:a16="http://schemas.microsoft.com/office/drawing/2014/main" xmlns="" val="20000"/>
                     </a:ext>
                   </a:extLst>
                 </a:gridCol>
                 <a:gridCol w="4382517">
                   <a:extLst>
                     <a:ext uri="{9D8B030D-6E8A-4147-A177-3AD203B41FA5}">
-                      <a16:colId xmlns:a16="http://schemas.microsoft.com/office/drawing/2014/main" val="20001"/>
+                      <a16:colId xmlns:a16="http://schemas.microsoft.com/office/drawing/2014/main" xmlns="" val="20001"/>
                     </a:ext>
                   </a:extLst>
                 </a:gridCol>
                 <a:gridCol w="5358383">
                   <a:extLst>
                     <a:ext uri="{9D8B030D-6E8A-4147-A177-3AD203B41FA5}">
-                      <a16:colId xmlns:a16="http://schemas.microsoft.com/office/drawing/2014/main" val="20002"/>
+                      <a16:colId xmlns:a16="http://schemas.microsoft.com/office/drawing/2014/main" xmlns="" val="20002"/>
                     </a:ext>
                   </a:extLst>
                 </a:gridCol>
@@ -34931,8 +35104,12 @@
                     <a:p>
                       <a:pPr algn="ctr"/>
                       <a:r>
+                        <a:rPr lang="en-US" sz="1600" dirty="0" smtClean="0"/>
+                        <a:t>Icarus-NLv3 </a:t>
+                      </a:r>
+                      <a:r>
                         <a:rPr lang="en-US" sz="1600" dirty="0"/>
-                        <a:t>Icarus-NLv2 (“New Land”)</a:t>
+                        <a:t>(“New Land”)</a:t>
                       </a:r>
                     </a:p>
                   </a:txBody>
@@ -34940,7 +35117,7 @@
                 </a:tc>
                 <a:extLst>
                   <a:ext uri="{0D108BD9-81ED-4DB2-BD59-A6C34878D82A}">
-                    <a16:rowId xmlns:a16="http://schemas.microsoft.com/office/drawing/2014/main" val="10000"/>
+                    <a16:rowId xmlns:a16="http://schemas.microsoft.com/office/drawing/2014/main" xmlns="" val="10000"/>
                   </a:ext>
                 </a:extLst>
               </a:tr>
@@ -35001,7 +35178,7 @@
                 </a:tc>
                 <a:extLst>
                   <a:ext uri="{0D108BD9-81ED-4DB2-BD59-A6C34878D82A}">
-                    <a16:rowId xmlns:a16="http://schemas.microsoft.com/office/drawing/2014/main" val="10001"/>
+                    <a16:rowId xmlns:a16="http://schemas.microsoft.com/office/drawing/2014/main" xmlns="" val="10001"/>
                   </a:ext>
                 </a:extLst>
               </a:tr>
@@ -35051,7 +35228,7 @@
                 </a:tc>
                 <a:extLst>
                   <a:ext uri="{0D108BD9-81ED-4DB2-BD59-A6C34878D82A}">
-                    <a16:rowId xmlns:a16="http://schemas.microsoft.com/office/drawing/2014/main" val="10002"/>
+                    <a16:rowId xmlns:a16="http://schemas.microsoft.com/office/drawing/2014/main" xmlns="" val="10002"/>
                   </a:ext>
                 </a:extLst>
               </a:tr>
@@ -35133,7 +35310,7 @@
                 </a:tc>
                 <a:extLst>
                   <a:ext uri="{0D108BD9-81ED-4DB2-BD59-A6C34878D82A}">
-                    <a16:rowId xmlns:a16="http://schemas.microsoft.com/office/drawing/2014/main" val="10003"/>
+                    <a16:rowId xmlns:a16="http://schemas.microsoft.com/office/drawing/2014/main" xmlns="" val="10003"/>
                   </a:ext>
                 </a:extLst>
               </a:tr>
@@ -35206,7 +35383,7 @@
                 </a:tc>
                 <a:extLst>
                   <a:ext uri="{0D108BD9-81ED-4DB2-BD59-A6C34878D82A}">
-                    <a16:rowId xmlns:a16="http://schemas.microsoft.com/office/drawing/2014/main" val="10012"/>
+                    <a16:rowId xmlns:a16="http://schemas.microsoft.com/office/drawing/2014/main" xmlns="" val="10012"/>
                   </a:ext>
                 </a:extLst>
               </a:tr>
@@ -35280,7 +35457,7 @@
                 </a:tc>
                 <a:extLst>
                   <a:ext uri="{0D108BD9-81ED-4DB2-BD59-A6C34878D82A}">
-                    <a16:rowId xmlns:a16="http://schemas.microsoft.com/office/drawing/2014/main" val="10013"/>
+                    <a16:rowId xmlns:a16="http://schemas.microsoft.com/office/drawing/2014/main" xmlns="" val="10013"/>
                   </a:ext>
                 </a:extLst>
               </a:tr>
@@ -35349,7 +35526,7 @@
                 </a:tc>
                 <a:extLst>
                   <a:ext uri="{0D108BD9-81ED-4DB2-BD59-A6C34878D82A}">
-                    <a16:rowId xmlns:a16="http://schemas.microsoft.com/office/drawing/2014/main" val="10004"/>
+                    <a16:rowId xmlns:a16="http://schemas.microsoft.com/office/drawing/2014/main" xmlns="" val="10004"/>
                   </a:ext>
                 </a:extLst>
               </a:tr>
@@ -35455,7 +35632,7 @@
                 </a:tc>
                 <a:extLst>
                   <a:ext uri="{0D108BD9-81ED-4DB2-BD59-A6C34878D82A}">
-                    <a16:rowId xmlns:a16="http://schemas.microsoft.com/office/drawing/2014/main" val="10005"/>
+                    <a16:rowId xmlns:a16="http://schemas.microsoft.com/office/drawing/2014/main" xmlns="" val="10005"/>
                   </a:ext>
                 </a:extLst>
               </a:tr>
@@ -35496,12 +35673,12 @@
                     <a:p>
                       <a:pPr algn="l"/>
                       <a:r>
-                        <a:rPr lang="en-US" sz="1550" baseline="0" dirty="0">
-                          <a:solidFill>
-                            <a:srgbClr val="FF0000"/>
-                          </a:solidFill>
-                        </a:rPr>
-                        <a:t>JPL (30-arcsec)</a:t>
+                        <a:rPr lang="en-US" sz="1550" dirty="0" smtClean="0"/>
+                        <a:t>Look-up</a:t>
+                      </a:r>
+                      <a:r>
+                        <a:rPr lang="en-US" sz="1550" baseline="0" dirty="0" smtClean="0"/>
+                        <a:t> table and simple tree SAI  (reverted JPL heights in NLv2)</a:t>
                       </a:r>
                       <a:endParaRPr lang="en-US" sz="1550" dirty="0"/>
                     </a:p>
@@ -35510,7 +35687,7 @@
                 </a:tc>
                 <a:extLst>
                   <a:ext uri="{0D108BD9-81ED-4DB2-BD59-A6C34878D82A}">
-                    <a16:rowId xmlns:a16="http://schemas.microsoft.com/office/drawing/2014/main" val="10006"/>
+                    <a16:rowId xmlns:a16="http://schemas.microsoft.com/office/drawing/2014/main" xmlns="" val="10006"/>
                   </a:ext>
                 </a:extLst>
               </a:tr>
@@ -35596,7 +35773,7 @@
                 </a:tc>
                 <a:extLst>
                   <a:ext uri="{0D108BD9-81ED-4DB2-BD59-A6C34878D82A}">
-                    <a16:rowId xmlns:a16="http://schemas.microsoft.com/office/drawing/2014/main" val="10007"/>
+                    <a16:rowId xmlns:a16="http://schemas.microsoft.com/office/drawing/2014/main" xmlns="" val="10007"/>
                   </a:ext>
                 </a:extLst>
               </a:tr>
@@ -35661,7 +35838,7 @@
                 </a:tc>
                 <a:extLst>
                   <a:ext uri="{0D108BD9-81ED-4DB2-BD59-A6C34878D82A}">
-                    <a16:rowId xmlns:a16="http://schemas.microsoft.com/office/drawing/2014/main" val="10008"/>
+                    <a16:rowId xmlns:a16="http://schemas.microsoft.com/office/drawing/2014/main" xmlns="" val="10008"/>
                   </a:ext>
                 </a:extLst>
               </a:tr>
@@ -35791,7 +35968,7 @@
                 </a:tc>
                 <a:extLst>
                   <a:ext uri="{0D108BD9-81ED-4DB2-BD59-A6C34878D82A}">
-                    <a16:rowId xmlns:a16="http://schemas.microsoft.com/office/drawing/2014/main" val="10009"/>
+                    <a16:rowId xmlns:a16="http://schemas.microsoft.com/office/drawing/2014/main" xmlns="" val="10009"/>
                   </a:ext>
                 </a:extLst>
               </a:tr>
@@ -35922,7 +36099,7 @@
                 </a:tc>
                 <a:extLst>
                   <a:ext uri="{0D108BD9-81ED-4DB2-BD59-A6C34878D82A}">
-                    <a16:rowId xmlns:a16="http://schemas.microsoft.com/office/drawing/2014/main" val="10010"/>
+                    <a16:rowId xmlns:a16="http://schemas.microsoft.com/office/drawing/2014/main" xmlns="" val="10010"/>
                   </a:ext>
                 </a:extLst>
               </a:tr>
@@ -35973,7 +36150,7 @@
                 </a:tc>
                 <a:extLst>
                   <a:ext uri="{0D108BD9-81ED-4DB2-BD59-A6C34878D82A}">
-                    <a16:rowId xmlns:a16="http://schemas.microsoft.com/office/drawing/2014/main" val="10011"/>
+                    <a16:rowId xmlns:a16="http://schemas.microsoft.com/office/drawing/2014/main" xmlns="" val="10011"/>
                   </a:ext>
                 </a:extLst>
               </a:tr>
@@ -35986,7 +36163,7 @@
           <p:cNvPr id="4" name="TextBox 1">
             <a:extLst>
               <a:ext uri="{FF2B5EF4-FFF2-40B4-BE49-F238E27FC236}">
-                <a16:creationId xmlns:a16="http://schemas.microsoft.com/office/drawing/2014/main" id="{3A444153-FF5A-2C4B-A9F2-915E8F72EEBC}"/>
+                <a16:creationId xmlns:a16="http://schemas.microsoft.com/office/drawing/2014/main" xmlns="" id="{3A444153-FF5A-2C4B-A9F2-915E8F72EEBC}"/>
               </a:ext>
             </a:extLst>
           </p:cNvPr>
@@ -36212,7 +36389,7 @@
           <p:nvPr>
             <p:extLst>
               <p:ext uri="{D42A27DB-BD31-4B8C-83A1-F6EECF244321}">
-                <p14:modId xmlns:p14="http://schemas.microsoft.com/office/powerpoint/2010/main" val="3602681501"/>
+                <p14:modId xmlns:p14="http://schemas.microsoft.com/office/powerpoint/2010/main" val="2747365152"/>
               </p:ext>
             </p:extLst>
           </p:nvPr>
@@ -36231,28 +36408,28 @@
                 <a:gridCol w="3319761">
                   <a:extLst>
                     <a:ext uri="{9D8B030D-6E8A-4147-A177-3AD203B41FA5}">
-                      <a16:colId xmlns:a16="http://schemas.microsoft.com/office/drawing/2014/main" val="20000"/>
+                      <a16:colId xmlns:a16="http://schemas.microsoft.com/office/drawing/2014/main" xmlns="" val="20000"/>
                     </a:ext>
                   </a:extLst>
                 </a:gridCol>
                 <a:gridCol w="1930311">
                   <a:extLst>
                     <a:ext uri="{9D8B030D-6E8A-4147-A177-3AD203B41FA5}">
-                      <a16:colId xmlns:a16="http://schemas.microsoft.com/office/drawing/2014/main" val="20001"/>
+                      <a16:colId xmlns:a16="http://schemas.microsoft.com/office/drawing/2014/main" xmlns="" val="20001"/>
                     </a:ext>
                   </a:extLst>
                 </a:gridCol>
                 <a:gridCol w="3310437">
                   <a:extLst>
                     <a:ext uri="{9D8B030D-6E8A-4147-A177-3AD203B41FA5}">
-                      <a16:colId xmlns:a16="http://schemas.microsoft.com/office/drawing/2014/main" val="20002"/>
+                      <a16:colId xmlns:a16="http://schemas.microsoft.com/office/drawing/2014/main" xmlns="" val="20002"/>
                     </a:ext>
                   </a:extLst>
                 </a:gridCol>
                 <a:gridCol w="3310437">
                   <a:extLst>
                     <a:ext uri="{9D8B030D-6E8A-4147-A177-3AD203B41FA5}">
-                      <a16:colId xmlns:a16="http://schemas.microsoft.com/office/drawing/2014/main" val="2005585204"/>
+                      <a16:colId xmlns:a16="http://schemas.microsoft.com/office/drawing/2014/main" xmlns="" val="2005585204"/>
                     </a:ext>
                   </a:extLst>
                 </a:gridCol>
@@ -36322,23 +36499,32 @@
                     <a:p>
                       <a:pPr algn="ctr"/>
                       <a:r>
-                        <a:rPr lang="en-US" sz="1600" dirty="0"/>
-                        <a:t>GEOSldas_m4-17_7 (and *17_6)</a:t>
+                        <a:rPr lang="en-US" sz="1600" dirty="0" err="1" smtClean="0"/>
+                        <a:t>GEOSldas</a:t>
                       </a:r>
-                    </a:p>
-                    <a:p>
-                      <a:pPr algn="ctr"/>
                       <a:r>
-                        <a:rPr lang="en-US" sz="1600" dirty="0"/>
-                        <a:t>(NRv7.2)</a:t>
+                        <a:rPr lang="en-US" sz="1600" dirty="0" smtClean="0"/>
+                        <a:t> </a:t>
                       </a:r>
+                      <a:r>
+                        <a:rPr lang="en-US" sz="1600" dirty="0" smtClean="0">
+                          <a:latin typeface="+mn-lt"/>
+                          <a:cs typeface="+mn-cs"/>
+                        </a:rPr>
+                        <a:t>v17.8.0 (and </a:t>
+                      </a:r>
+                      <a:r>
+                        <a:rPr lang="en-US" sz="1600" dirty="0" smtClean="0"/>
+                        <a:t>GEOSldas_m4-17_7)</a:t>
+                      </a:r>
+                      <a:endParaRPr lang="en-US" sz="1600" dirty="0"/>
                     </a:p>
                   </a:txBody>
                   <a:tcPr marT="45727" marB="45727"/>
                 </a:tc>
                 <a:extLst>
                   <a:ext uri="{0D108BD9-81ED-4DB2-BD59-A6C34878D82A}">
-                    <a16:rowId xmlns:a16="http://schemas.microsoft.com/office/drawing/2014/main" val="10000"/>
+                    <a16:rowId xmlns:a16="http://schemas.microsoft.com/office/drawing/2014/main" xmlns="" val="10000"/>
                   </a:ext>
                 </a:extLst>
               </a:tr>
@@ -36409,7 +36595,7 @@
                 </a:tc>
                 <a:extLst>
                   <a:ext uri="{0D108BD9-81ED-4DB2-BD59-A6C34878D82A}">
-                    <a16:rowId xmlns:a16="http://schemas.microsoft.com/office/drawing/2014/main" val="10001"/>
+                    <a16:rowId xmlns:a16="http://schemas.microsoft.com/office/drawing/2014/main" xmlns="" val="10001"/>
                   </a:ext>
                 </a:extLst>
               </a:tr>
@@ -36480,7 +36666,7 @@
                 </a:tc>
                 <a:extLst>
                   <a:ext uri="{0D108BD9-81ED-4DB2-BD59-A6C34878D82A}">
-                    <a16:rowId xmlns:a16="http://schemas.microsoft.com/office/drawing/2014/main" val="10002"/>
+                    <a16:rowId xmlns:a16="http://schemas.microsoft.com/office/drawing/2014/main" xmlns="" val="10002"/>
                   </a:ext>
                 </a:extLst>
               </a:tr>
@@ -36547,7 +36733,7 @@
                 </a:tc>
                 <a:extLst>
                   <a:ext uri="{0D108BD9-81ED-4DB2-BD59-A6C34878D82A}">
-                    <a16:rowId xmlns:a16="http://schemas.microsoft.com/office/drawing/2014/main" val="10003"/>
+                    <a16:rowId xmlns:a16="http://schemas.microsoft.com/office/drawing/2014/main" xmlns="" val="10003"/>
                   </a:ext>
                 </a:extLst>
               </a:tr>
@@ -36639,7 +36825,7 @@
                 </a:tc>
                 <a:extLst>
                   <a:ext uri="{0D108BD9-81ED-4DB2-BD59-A6C34878D82A}">
-                    <a16:rowId xmlns:a16="http://schemas.microsoft.com/office/drawing/2014/main" val="10004"/>
+                    <a16:rowId xmlns:a16="http://schemas.microsoft.com/office/drawing/2014/main" xmlns="" val="10004"/>
                   </a:ext>
                 </a:extLst>
               </a:tr>
@@ -36758,7 +36944,7 @@
                 </a:tc>
                 <a:extLst>
                   <a:ext uri="{0D108BD9-81ED-4DB2-BD59-A6C34878D82A}">
-                    <a16:rowId xmlns:a16="http://schemas.microsoft.com/office/drawing/2014/main" val="10005"/>
+                    <a16:rowId xmlns:a16="http://schemas.microsoft.com/office/drawing/2014/main" xmlns="" val="10005"/>
                   </a:ext>
                 </a:extLst>
               </a:tr>
@@ -36850,7 +37036,7 @@
                 </a:tc>
                 <a:extLst>
                   <a:ext uri="{0D108BD9-81ED-4DB2-BD59-A6C34878D82A}">
-                    <a16:rowId xmlns:a16="http://schemas.microsoft.com/office/drawing/2014/main" val="10006"/>
+                    <a16:rowId xmlns:a16="http://schemas.microsoft.com/office/drawing/2014/main" xmlns="" val="10006"/>
                   </a:ext>
                 </a:extLst>
               </a:tr>
@@ -36942,7 +37128,7 @@
                 </a:tc>
                 <a:extLst>
                   <a:ext uri="{0D108BD9-81ED-4DB2-BD59-A6C34878D82A}">
-                    <a16:rowId xmlns:a16="http://schemas.microsoft.com/office/drawing/2014/main" val="10007"/>
+                    <a16:rowId xmlns:a16="http://schemas.microsoft.com/office/drawing/2014/main" xmlns="" val="10007"/>
                   </a:ext>
                 </a:extLst>
               </a:tr>
@@ -37099,7 +37285,7 @@
                 </a:tc>
                 <a:extLst>
                   <a:ext uri="{0D108BD9-81ED-4DB2-BD59-A6C34878D82A}">
-                    <a16:rowId xmlns:a16="http://schemas.microsoft.com/office/drawing/2014/main" val="10008"/>
+                    <a16:rowId xmlns:a16="http://schemas.microsoft.com/office/drawing/2014/main" xmlns="" val="10008"/>
                   </a:ext>
                 </a:extLst>
               </a:tr>
@@ -37236,7 +37422,7 @@
                 </a:tc>
                 <a:extLst>
                   <a:ext uri="{0D108BD9-81ED-4DB2-BD59-A6C34878D82A}">
-                    <a16:rowId xmlns:a16="http://schemas.microsoft.com/office/drawing/2014/main" val="10009"/>
+                    <a16:rowId xmlns:a16="http://schemas.microsoft.com/office/drawing/2014/main" xmlns="" val="10009"/>
                   </a:ext>
                 </a:extLst>
               </a:tr>
@@ -37405,7 +37591,7 @@
                 </a:tc>
                 <a:extLst>
                   <a:ext uri="{0D108BD9-81ED-4DB2-BD59-A6C34878D82A}">
-                    <a16:rowId xmlns:a16="http://schemas.microsoft.com/office/drawing/2014/main" val="10010"/>
+                    <a16:rowId xmlns:a16="http://schemas.microsoft.com/office/drawing/2014/main" xmlns="" val="10010"/>
                   </a:ext>
                 </a:extLst>
               </a:tr>
@@ -37573,7 +37759,7 @@
                 </a:tc>
                 <a:extLst>
                   <a:ext uri="{0D108BD9-81ED-4DB2-BD59-A6C34878D82A}">
-                    <a16:rowId xmlns:a16="http://schemas.microsoft.com/office/drawing/2014/main" val="10011"/>
+                    <a16:rowId xmlns:a16="http://schemas.microsoft.com/office/drawing/2014/main" xmlns="" val="10011"/>
                   </a:ext>
                 </a:extLst>
               </a:tr>
@@ -37729,7 +37915,7 @@
                 </a:tc>
                 <a:extLst>
                   <a:ext uri="{0D108BD9-81ED-4DB2-BD59-A6C34878D82A}">
-                    <a16:rowId xmlns:a16="http://schemas.microsoft.com/office/drawing/2014/main" val="10012"/>
+                    <a16:rowId xmlns:a16="http://schemas.microsoft.com/office/drawing/2014/main" xmlns="" val="10012"/>
                   </a:ext>
                 </a:extLst>
               </a:tr>
@@ -37742,7 +37928,7 @@
           <p:cNvPr id="5" name="TextBox 1">
             <a:extLst>
               <a:ext uri="{FF2B5EF4-FFF2-40B4-BE49-F238E27FC236}">
-                <a16:creationId xmlns:a16="http://schemas.microsoft.com/office/drawing/2014/main" id="{A4842E2F-C433-B142-AAEF-9B348933B604}"/>
+                <a16:creationId xmlns:a16="http://schemas.microsoft.com/office/drawing/2014/main" xmlns="" id="{A4842E2F-C433-B142-AAEF-9B348933B604}"/>
               </a:ext>
             </a:extLst>
           </p:cNvPr>
@@ -37963,14 +38149,14 @@
           <p:nvPr>
             <p:extLst>
               <p:ext uri="{D42A27DB-BD31-4B8C-83A1-F6EECF244321}">
-                <p14:modId xmlns:p14="http://schemas.microsoft.com/office/powerpoint/2010/main" val="1323667902"/>
+                <p14:modId xmlns:p14="http://schemas.microsoft.com/office/powerpoint/2010/main" val="601545969"/>
               </p:ext>
             </p:extLst>
           </p:nvPr>
         </p:nvGraphicFramePr>
         <p:xfrm>
-          <a:off x="133350" y="480131"/>
-          <a:ext cx="11925300" cy="6350993"/>
+          <a:off x="133350" y="359811"/>
+          <a:ext cx="11925300" cy="6594833"/>
         </p:xfrm>
         <a:graphic>
           <a:graphicData uri="http://schemas.openxmlformats.org/drawingml/2006/table">
@@ -37982,21 +38168,21 @@
                 <a:gridCol w="2575158">
                   <a:extLst>
                     <a:ext uri="{9D8B030D-6E8A-4147-A177-3AD203B41FA5}">
-                      <a16:colId xmlns:a16="http://schemas.microsoft.com/office/drawing/2014/main" val="20000"/>
+                      <a16:colId xmlns:a16="http://schemas.microsoft.com/office/drawing/2014/main" xmlns="" val="20000"/>
                     </a:ext>
                   </a:extLst>
                 </a:gridCol>
                 <a:gridCol w="4626864">
                   <a:extLst>
                     <a:ext uri="{9D8B030D-6E8A-4147-A177-3AD203B41FA5}">
-                      <a16:colId xmlns:a16="http://schemas.microsoft.com/office/drawing/2014/main" val="20001"/>
+                      <a16:colId xmlns:a16="http://schemas.microsoft.com/office/drawing/2014/main" xmlns="" val="20001"/>
                     </a:ext>
                   </a:extLst>
                 </a:gridCol>
                 <a:gridCol w="4723278">
                   <a:extLst>
                     <a:ext uri="{9D8B030D-6E8A-4147-A177-3AD203B41FA5}">
-                      <a16:colId xmlns:a16="http://schemas.microsoft.com/office/drawing/2014/main" val="20002"/>
+                      <a16:colId xmlns:a16="http://schemas.microsoft.com/office/drawing/2014/main" xmlns="" val="20002"/>
                     </a:ext>
                   </a:extLst>
                 </a:gridCol>
@@ -38044,8 +38230,12 @@
                     <a:p>
                       <a:pPr algn="ctr"/>
                       <a:r>
+                        <a:rPr lang="en-US" sz="1600" dirty="0" smtClean="0"/>
+                        <a:t>GEOSldas_m4-17_7 </a:t>
+                      </a:r>
+                      <a:r>
                         <a:rPr lang="en-US" sz="1600" dirty="0"/>
-                        <a:t>GEOSldas_m4-17_7 (and *17_6 and *17_0)      </a:t>
+                        <a:t>(and *17_6 and *17_0)      </a:t>
                       </a:r>
                     </a:p>
                     <a:p>
@@ -38068,7 +38258,7 @@
                 </a:tc>
                 <a:extLst>
                   <a:ext uri="{0D108BD9-81ED-4DB2-BD59-A6C34878D82A}">
-                    <a16:rowId xmlns:a16="http://schemas.microsoft.com/office/drawing/2014/main" val="10000"/>
+                    <a16:rowId xmlns:a16="http://schemas.microsoft.com/office/drawing/2014/main" xmlns="" val="10000"/>
                   </a:ext>
                 </a:extLst>
               </a:tr>
@@ -38148,7 +38338,7 @@
                 </a:tc>
                 <a:extLst>
                   <a:ext uri="{0D108BD9-81ED-4DB2-BD59-A6C34878D82A}">
-                    <a16:rowId xmlns:a16="http://schemas.microsoft.com/office/drawing/2014/main" val="10001"/>
+                    <a16:rowId xmlns:a16="http://schemas.microsoft.com/office/drawing/2014/main" xmlns="" val="10001"/>
                   </a:ext>
                 </a:extLst>
               </a:tr>
@@ -38514,25 +38704,66 @@
                     </a:p>
                     <a:p>
                       <a:pPr algn="l"/>
-                      <a:endParaRPr lang="en-US" sz="1600" baseline="0" dirty="0">
-                        <a:solidFill>
-                          <a:srgbClr val="FF0000"/>
-                        </a:solidFill>
+                      <a:endParaRPr lang="en-US" sz="1600" dirty="0" smtClean="0">
+                        <a:latin typeface="+mn-lt"/>
+                        <a:cs typeface="+mn-cs"/>
                       </a:endParaRPr>
                     </a:p>
                     <a:p>
                       <a:pPr algn="l"/>
                       <a:r>
-                        <a:rPr lang="en-US" sz="1600" baseline="0" dirty="0">
+                        <a:rPr lang="en-US" sz="1600" b="1" dirty="0" smtClean="0">
                           <a:solidFill>
-                            <a:srgbClr val="FF0000"/>
+                            <a:srgbClr val="C00000"/>
                           </a:solidFill>
+                          <a:latin typeface="+mn-lt"/>
+                          <a:cs typeface="+mn-cs"/>
                         </a:rPr>
-                        <a:t>Unintentionally, the default in GEOSldas_m4-17_6 and *17_0 was Z0_FORMULATION=2.</a:t>
+                        <a:t>**</a:t>
                       </a:r>
-                      <a:endParaRPr lang="en-US" sz="1600" dirty="0">
+                      <a:r>
+                        <a:rPr lang="en-US" sz="1600" b="1" dirty="0" err="1" smtClean="0">
+                          <a:solidFill>
+                            <a:srgbClr val="C00000"/>
+                          </a:solidFill>
+                          <a:latin typeface="+mn-lt"/>
+                          <a:cs typeface="+mn-cs"/>
+                        </a:rPr>
+                        <a:t>GEOSldas</a:t>
+                      </a:r>
+                      <a:r>
+                        <a:rPr lang="en-US" sz="1600" b="1" baseline="0" dirty="0" smtClean="0">
+                          <a:solidFill>
+                            <a:srgbClr val="C00000"/>
+                          </a:solidFill>
+                          <a:latin typeface="+mn-lt"/>
+                          <a:cs typeface="+mn-cs"/>
+                        </a:rPr>
+                        <a:t> </a:t>
+                      </a:r>
+                      <a:r>
+                        <a:rPr lang="en-US" sz="1600" b="1" dirty="0" smtClean="0">
+                          <a:solidFill>
+                            <a:srgbClr val="C00000"/>
+                          </a:solidFill>
+                          <a:latin typeface="+mn-lt"/>
+                          <a:cs typeface="+mn-cs"/>
+                        </a:rPr>
+                        <a:t>v17.8.0 reverts</a:t>
+                      </a:r>
+                      <a:r>
+                        <a:rPr lang="en-US" sz="1600" b="1" baseline="0" dirty="0" smtClean="0">
+                          <a:solidFill>
+                            <a:srgbClr val="C00000"/>
+                          </a:solidFill>
+                          <a:latin typeface="+mn-lt"/>
+                          <a:cs typeface="+mn-cs"/>
+                        </a:rPr>
+                        <a:t> to modified Z0_FORM=2, adding simple tree SAI, mean to be used with Z2 from lookup table**</a:t>
+                      </a:r>
+                      <a:endParaRPr lang="en-US" sz="1600" b="1" baseline="0" dirty="0">
                         <a:solidFill>
-                          <a:srgbClr val="FF0000"/>
+                          <a:srgbClr val="C00000"/>
                         </a:solidFill>
                       </a:endParaRPr>
                     </a:p>
@@ -38541,7 +38772,7 @@
                 </a:tc>
                 <a:extLst>
                   <a:ext uri="{0D108BD9-81ED-4DB2-BD59-A6C34878D82A}">
-                    <a16:rowId xmlns:a16="http://schemas.microsoft.com/office/drawing/2014/main" val="10002"/>
+                    <a16:rowId xmlns:a16="http://schemas.microsoft.com/office/drawing/2014/main" xmlns="" val="10002"/>
                   </a:ext>
                 </a:extLst>
               </a:tr>
@@ -38651,7 +38882,7 @@
                 </a:tc>
                 <a:extLst>
                   <a:ext uri="{0D108BD9-81ED-4DB2-BD59-A6C34878D82A}">
-                    <a16:rowId xmlns:a16="http://schemas.microsoft.com/office/drawing/2014/main" val="10003"/>
+                    <a16:rowId xmlns:a16="http://schemas.microsoft.com/office/drawing/2014/main" xmlns="" val="10003"/>
                   </a:ext>
                 </a:extLst>
               </a:tr>
@@ -38741,7 +38972,7 @@
                 </a:tc>
                 <a:extLst>
                   <a:ext uri="{0D108BD9-81ED-4DB2-BD59-A6C34878D82A}">
-                    <a16:rowId xmlns:a16="http://schemas.microsoft.com/office/drawing/2014/main" val="10004"/>
+                    <a16:rowId xmlns:a16="http://schemas.microsoft.com/office/drawing/2014/main" xmlns="" val="10004"/>
                   </a:ext>
                 </a:extLst>
               </a:tr>
@@ -38874,7 +39105,7 @@
                 </a:tc>
                 <a:extLst>
                   <a:ext uri="{0D108BD9-81ED-4DB2-BD59-A6C34878D82A}">
-                    <a16:rowId xmlns:a16="http://schemas.microsoft.com/office/drawing/2014/main" val="10005"/>
+                    <a16:rowId xmlns:a16="http://schemas.microsoft.com/office/drawing/2014/main" xmlns="" val="10005"/>
                   </a:ext>
                 </a:extLst>
               </a:tr>
@@ -38995,7 +39226,7 @@
                 </a:tc>
                 <a:extLst>
                   <a:ext uri="{0D108BD9-81ED-4DB2-BD59-A6C34878D82A}">
-                    <a16:rowId xmlns:a16="http://schemas.microsoft.com/office/drawing/2014/main" val="10006"/>
+                    <a16:rowId xmlns:a16="http://schemas.microsoft.com/office/drawing/2014/main" xmlns="" val="10006"/>
                   </a:ext>
                 </a:extLst>
               </a:tr>
@@ -39008,7 +39239,7 @@
           <p:cNvPr id="5" name="TextBox 1">
             <a:extLst>
               <a:ext uri="{FF2B5EF4-FFF2-40B4-BE49-F238E27FC236}">
-                <a16:creationId xmlns:a16="http://schemas.microsoft.com/office/drawing/2014/main" id="{221A0B40-54C6-624F-A3D0-7231E4728615}"/>
+                <a16:creationId xmlns:a16="http://schemas.microsoft.com/office/drawing/2014/main" xmlns="" id="{221A0B40-54C6-624F-A3D0-7231E4728615}"/>
               </a:ext>
             </a:extLst>
           </p:cNvPr>
@@ -44133,49 +44364,63 @@
                 <a:latin typeface="Courier New" panose="02070309020205020404" pitchFamily="49" charset="0"/>
                 <a:cs typeface="Courier New" panose="02070309020205020404" pitchFamily="49" charset="0"/>
               </a:rPr>
-              <a:t>/discover/</a:t>
-            </a:r>
-            <a:r>
-              <a:rPr lang="en-US" altLang="en-US" sz="1200" dirty="0" err="1">
+              <a:t>/</a:t>
+            </a:r>
+            <a:r>
+              <a:rPr lang="en-US" altLang="en-US" sz="1200" dirty="0" smtClean="0">
+                <a:latin typeface="Courier New" panose="02070309020205020404" pitchFamily="49" charset="0"/>
+                <a:cs typeface="Courier New" panose="02070309020205020404" pitchFamily="49" charset="0"/>
+              </a:rPr>
+              <a:t>discover/</a:t>
+            </a:r>
+            <a:r>
+              <a:rPr lang="en-US" altLang="en-US" sz="1200" dirty="0" err="1" smtClean="0">
                 <a:latin typeface="Courier New" panose="02070309020205020404" pitchFamily="49" charset="0"/>
                 <a:cs typeface="Courier New" panose="02070309020205020404" pitchFamily="49" charset="0"/>
               </a:rPr>
               <a:t>nobackup</a:t>
             </a:r>
             <a:r>
+              <a:rPr lang="en-US" altLang="en-US" sz="1200" dirty="0" smtClean="0">
+                <a:latin typeface="Courier New" panose="02070309020205020404" pitchFamily="49" charset="0"/>
+                <a:cs typeface="Courier New" panose="02070309020205020404" pitchFamily="49" charset="0"/>
+              </a:rPr>
+              <a:t>/</a:t>
+            </a:r>
+            <a:r>
+              <a:rPr lang="en-US" altLang="en-US" sz="1200" dirty="0" err="1" smtClean="0">
+                <a:latin typeface="Courier New" panose="02070309020205020404" pitchFamily="49" charset="0"/>
+                <a:cs typeface="Courier New" panose="02070309020205020404" pitchFamily="49" charset="0"/>
+              </a:rPr>
+              <a:t>ltakacs</a:t>
+            </a:r>
+            <a:r>
+              <a:rPr lang="en-US" altLang="en-US" sz="1200" dirty="0" smtClean="0">
+                <a:latin typeface="Courier New" panose="02070309020205020404" pitchFamily="49" charset="0"/>
+                <a:cs typeface="Courier New" panose="02070309020205020404" pitchFamily="49" charset="0"/>
+              </a:rPr>
+              <a:t>/</a:t>
+            </a:r>
+            <a:r>
+              <a:rPr lang="en-US" altLang="en-US" sz="1200" dirty="0" err="1" smtClean="0">
+                <a:latin typeface="Courier New" panose="02070309020205020404" pitchFamily="49" charset="0"/>
+                <a:cs typeface="Courier New" panose="02070309020205020404" pitchFamily="49" charset="0"/>
+              </a:rPr>
+              <a:t>bcs</a:t>
+            </a:r>
+            <a:r>
+              <a:rPr lang="en-US" altLang="en-US" sz="1200" dirty="0" smtClean="0">
+                <a:latin typeface="Courier New" panose="02070309020205020404" pitchFamily="49" charset="0"/>
+                <a:cs typeface="Courier New" panose="02070309020205020404" pitchFamily="49" charset="0"/>
+              </a:rPr>
+              <a:t>/Icarus-NLv3/Icarus-NLv3_EASE/SMAP_EASEv2_M36</a:t>
+            </a:r>
+            <a:r>
               <a:rPr lang="en-US" altLang="en-US" sz="1200" dirty="0">
                 <a:latin typeface="Courier New" panose="02070309020205020404" pitchFamily="49" charset="0"/>
                 <a:cs typeface="Courier New" panose="02070309020205020404" pitchFamily="49" charset="0"/>
               </a:rPr>
               <a:t>/</a:t>
-            </a:r>
-            <a:r>
-              <a:rPr lang="en-US" altLang="en-US" sz="1200" dirty="0" err="1">
-                <a:latin typeface="Courier New" panose="02070309020205020404" pitchFamily="49" charset="0"/>
-                <a:cs typeface="Courier New" panose="02070309020205020404" pitchFamily="49" charset="0"/>
-              </a:rPr>
-              <a:t>ltakacs</a:t>
-            </a:r>
-            <a:r>
-              <a:rPr lang="en-US" altLang="en-US" sz="1200" dirty="0">
-                <a:latin typeface="Courier New" panose="02070309020205020404" pitchFamily="49" charset="0"/>
-                <a:cs typeface="Courier New" panose="02070309020205020404" pitchFamily="49" charset="0"/>
-              </a:rPr>
-              <a:t>/</a:t>
-            </a:r>
-            <a:r>
-              <a:rPr lang="en-US" altLang="en-US" sz="1200" dirty="0" err="1">
-                <a:latin typeface="Courier New" panose="02070309020205020404" pitchFamily="49" charset="0"/>
-                <a:cs typeface="Courier New" panose="02070309020205020404" pitchFamily="49" charset="0"/>
-              </a:rPr>
-              <a:t>bcs</a:t>
-            </a:r>
-            <a:r>
-              <a:rPr lang="en-US" altLang="en-US" sz="1200" dirty="0">
-                <a:latin typeface="Courier New" panose="02070309020205020404" pitchFamily="49" charset="0"/>
-                <a:cs typeface="Courier New" panose="02070309020205020404" pitchFamily="49" charset="0"/>
-              </a:rPr>
-              <a:t>/Icarus-NLv2/Icarus-NLv2_EASE/SMAP_EASEv2_M36/</a:t>
             </a:r>
             <a:endParaRPr lang="en-US" altLang="en-US" sz="1800" dirty="0">
               <a:latin typeface="Courier New" panose="02070309020205020404" pitchFamily="49" charset="0"/>
@@ -44429,7 +44674,7 @@
           <p:cNvPr id="5" name="TextBox 1">
             <a:extLst>
               <a:ext uri="{FF2B5EF4-FFF2-40B4-BE49-F238E27FC236}">
-                <a16:creationId xmlns:a16="http://schemas.microsoft.com/office/drawing/2014/main" id="{4EDCE236-8364-E44A-8759-8BB938FE9C32}"/>
+                <a16:creationId xmlns:a16="http://schemas.microsoft.com/office/drawing/2014/main" xmlns="" id="{4EDCE236-8364-E44A-8759-8BB938FE9C32}"/>
               </a:ext>
             </a:extLst>
           </p:cNvPr>
@@ -45622,7 +45867,7 @@
           <p:cNvPr id="4" name="TextBox 1">
             <a:extLst>
               <a:ext uri="{FF2B5EF4-FFF2-40B4-BE49-F238E27FC236}">
-                <a16:creationId xmlns:a16="http://schemas.microsoft.com/office/drawing/2014/main" id="{EF205DC1-FB95-604F-BD4A-3FC5D361C450}"/>
+                <a16:creationId xmlns:a16="http://schemas.microsoft.com/office/drawing/2014/main" xmlns="" id="{EF205DC1-FB95-604F-BD4A-3FC5D361C450}"/>
               </a:ext>
             </a:extLst>
           </p:cNvPr>
@@ -46075,7 +46320,7 @@
   <a:extraClrSchemeLst/>
   <a:extLst>
     <a:ext uri="{05A4C25C-085E-4340-85A3-A5531E510DB2}">
-      <thm15:themeFamily xmlns:thm15="http://schemas.microsoft.com/office/thememl/2012/main" name="Office Theme" id="{62F939B6-93AF-4DB8-9C6B-D6C7DFDC589F}" vid="{4A3C46E8-61CC-4603-A589-7422A47A8E4A}"/>
+      <thm15:themeFamily xmlns:thm15="http://schemas.microsoft.com/office/thememl/2012/main" xmlns="" name="Office Theme" id="{62F939B6-93AF-4DB8-9C6B-D6C7DFDC589F}" vid="{4A3C46E8-61CC-4603-A589-7422A47A8E4A}"/>
     </a:ext>
   </a:extLst>
 </a:theme>
@@ -46336,7 +46581,7 @@
   <a:extraClrSchemeLst/>
   <a:extLst>
     <a:ext uri="{05A4C25C-085E-4340-85A3-A5531E510DB2}">
-      <thm15:themeFamily xmlns:thm15="http://schemas.microsoft.com/office/thememl/2012/main" name="Office Theme" id="{62F939B6-93AF-4DB8-9C6B-D6C7DFDC589F}" vid="{4A3C46E8-61CC-4603-A589-7422A47A8E4A}"/>
+      <thm15:themeFamily xmlns:thm15="http://schemas.microsoft.com/office/thememl/2012/main" xmlns="" name="Office Theme" id="{62F939B6-93AF-4DB8-9C6B-D6C7DFDC589F}" vid="{4A3C46E8-61CC-4603-A589-7422A47A8E4A}"/>
     </a:ext>
   </a:extLst>
 </a:theme>

</xml_diff>